<commit_message>
Update lecture presentation slides
</commit_message>
<xml_diff>
--- a/L4-1.pptx
+++ b/L4-1.pptx
@@ -5,27 +5,28 @@
     <p:sldMasterId id="2147483648" r:id="rId1"/>
   </p:sldMasterIdLst>
   <p:notesMasterIdLst>
-    <p:notesMasterId r:id="rId20"/>
+    <p:notesMasterId r:id="rId21"/>
   </p:notesMasterIdLst>
   <p:sldIdLst>
     <p:sldId id="369" r:id="rId2"/>
-    <p:sldId id="263" r:id="rId3"/>
-    <p:sldId id="361" r:id="rId4"/>
-    <p:sldId id="293" r:id="rId5"/>
-    <p:sldId id="370" r:id="rId6"/>
-    <p:sldId id="332" r:id="rId7"/>
-    <p:sldId id="334" r:id="rId8"/>
-    <p:sldId id="371" r:id="rId9"/>
-    <p:sldId id="346" r:id="rId10"/>
-    <p:sldId id="363" r:id="rId11"/>
-    <p:sldId id="349" r:id="rId12"/>
-    <p:sldId id="355" r:id="rId13"/>
-    <p:sldId id="367" r:id="rId14"/>
-    <p:sldId id="357" r:id="rId15"/>
-    <p:sldId id="358" r:id="rId16"/>
-    <p:sldId id="368" r:id="rId17"/>
-    <p:sldId id="360" r:id="rId18"/>
-    <p:sldId id="283" r:id="rId19"/>
+    <p:sldId id="372" r:id="rId3"/>
+    <p:sldId id="263" r:id="rId4"/>
+    <p:sldId id="361" r:id="rId5"/>
+    <p:sldId id="293" r:id="rId6"/>
+    <p:sldId id="370" r:id="rId7"/>
+    <p:sldId id="332" r:id="rId8"/>
+    <p:sldId id="334" r:id="rId9"/>
+    <p:sldId id="371" r:id="rId10"/>
+    <p:sldId id="346" r:id="rId11"/>
+    <p:sldId id="363" r:id="rId12"/>
+    <p:sldId id="349" r:id="rId13"/>
+    <p:sldId id="355" r:id="rId14"/>
+    <p:sldId id="367" r:id="rId15"/>
+    <p:sldId id="357" r:id="rId16"/>
+    <p:sldId id="358" r:id="rId17"/>
+    <p:sldId id="368" r:id="rId18"/>
+    <p:sldId id="360" r:id="rId19"/>
+    <p:sldId id="283" r:id="rId20"/>
   </p:sldIdLst>
   <p:sldSz cx="9144000" cy="6858000" type="screen4x3"/>
   <p:notesSz cx="6858000" cy="9144000"/>
@@ -283,7 +284,7 @@
 <file path=ppt/revisionInfo.xml><?xml version="1.0" encoding="utf-8"?>
 <p1510:revInfo xmlns:a="http://schemas.openxmlformats.org/drawingml/2006/main" xmlns:r="http://schemas.openxmlformats.org/officeDocument/2006/relationships" xmlns:p1510="http://schemas.microsoft.com/office/powerpoint/2015/10/main">
   <p1510:revLst>
-    <p1510:client id="{8EA9600F-9558-4455-AFBB-BDC15B20C410}" v="1" dt="2025-02-25T16:32:19.012"/>
+    <p1510:client id="{8EA9600F-9558-4455-AFBB-BDC15B20C410}" v="36" dt="2025-02-27T16:33:03.045"/>
   </p1510:revLst>
 </p1510:revInfo>
 </file>
@@ -292,8 +293,8 @@
 <pc:chgInfo xmlns:a="http://schemas.openxmlformats.org/drawingml/2006/main" xmlns:r="http://schemas.openxmlformats.org/officeDocument/2006/relationships" xmlns:ac="http://schemas.microsoft.com/office/drawing/2013/main/command" xmlns:pc="http://schemas.microsoft.com/office/powerpoint/2013/main/command">
   <pc:docChgLst>
     <pc:chgData name="Colson, Robert" userId="25586c2a-52f0-4ea1-8d29-b1cb0db384a0" providerId="ADAL" clId="{8EA9600F-9558-4455-AFBB-BDC15B20C410}"/>
-    <pc:docChg chg="custSel addSld delSld modSld sldOrd">
-      <pc:chgData name="Colson, Robert" userId="25586c2a-52f0-4ea1-8d29-b1cb0db384a0" providerId="ADAL" clId="{8EA9600F-9558-4455-AFBB-BDC15B20C410}" dt="2025-02-25T16:41:29.406" v="47" actId="47"/>
+    <pc:docChg chg="undo custSel addSld delSld modSld sldOrd">
+      <pc:chgData name="Colson, Robert" userId="25586c2a-52f0-4ea1-8d29-b1cb0db384a0" providerId="ADAL" clId="{8EA9600F-9558-4455-AFBB-BDC15B20C410}" dt="2025-03-03T16:04:43.035" v="122" actId="20577"/>
       <pc:docMkLst>
         <pc:docMk/>
       </pc:docMkLst>
@@ -310,6 +311,29 @@
           <pc:docMk/>
           <pc:sldMk cId="1747861727" sldId="258"/>
         </pc:sldMkLst>
+      </pc:sldChg>
+      <pc:sldChg chg="delSp modSp mod">
+        <pc:chgData name="Colson, Robert" userId="25586c2a-52f0-4ea1-8d29-b1cb0db384a0" providerId="ADAL" clId="{8EA9600F-9558-4455-AFBB-BDC15B20C410}" dt="2025-03-03T15:22:12.556" v="117" actId="1076"/>
+        <pc:sldMkLst>
+          <pc:docMk/>
+          <pc:sldMk cId="1099024985" sldId="263"/>
+        </pc:sldMkLst>
+        <pc:spChg chg="del">
+          <ac:chgData name="Colson, Robert" userId="25586c2a-52f0-4ea1-8d29-b1cb0db384a0" providerId="ADAL" clId="{8EA9600F-9558-4455-AFBB-BDC15B20C410}" dt="2025-03-03T15:21:49.845" v="115" actId="478"/>
+          <ac:spMkLst>
+            <pc:docMk/>
+            <pc:sldMk cId="1099024985" sldId="263"/>
+            <ac:spMk id="7" creationId="{D2050617-67D1-BB84-DF8A-1209E459E5AD}"/>
+          </ac:spMkLst>
+        </pc:spChg>
+        <pc:picChg chg="mod modCrop">
+          <ac:chgData name="Colson, Robert" userId="25586c2a-52f0-4ea1-8d29-b1cb0db384a0" providerId="ADAL" clId="{8EA9600F-9558-4455-AFBB-BDC15B20C410}" dt="2025-03-03T15:22:12.556" v="117" actId="1076"/>
+          <ac:picMkLst>
+            <pc:docMk/>
+            <pc:sldMk cId="1099024985" sldId="263"/>
+            <ac:picMk id="6" creationId="{E59E87E0-9DBA-B1D9-F15A-FC0E6FE70CD6}"/>
+          </ac:picMkLst>
+        </pc:picChg>
       </pc:sldChg>
       <pc:sldChg chg="del">
         <pc:chgData name="Colson, Robert" userId="25586c2a-52f0-4ea1-8d29-b1cb0db384a0" providerId="ADAL" clId="{8EA9600F-9558-4455-AFBB-BDC15B20C410}" dt="2025-02-25T16:41:29.406" v="47" actId="47"/>
@@ -339,14 +363,6 @@
             <ac:spMk id="5" creationId="{6E8F0502-F26D-4842-97A7-E6A7B55ABA0B}"/>
           </ac:spMkLst>
         </pc:spChg>
-        <pc:picChg chg="del">
-          <ac:chgData name="Colson, Robert" userId="25586c2a-52f0-4ea1-8d29-b1cb0db384a0" providerId="ADAL" clId="{8EA9600F-9558-4455-AFBB-BDC15B20C410}" dt="2025-02-25T16:33:25.022" v="8" actId="478"/>
-          <ac:picMkLst>
-            <pc:docMk/>
-            <pc:sldMk cId="1472477715" sldId="293"/>
-            <ac:picMk id="7" creationId="{00000000-0000-0000-0000-000000000000}"/>
-          </ac:picMkLst>
-        </pc:picChg>
       </pc:sldChg>
       <pc:sldChg chg="modSp mod">
         <pc:chgData name="Colson, Robert" userId="25586c2a-52f0-4ea1-8d29-b1cb0db384a0" providerId="ADAL" clId="{8EA9600F-9558-4455-AFBB-BDC15B20C410}" dt="2025-02-25T16:36:11.519" v="31" actId="5793"/>
@@ -369,14 +385,6 @@
           <pc:docMk/>
           <pc:sldMk cId="2370629198" sldId="346"/>
         </pc:sldMkLst>
-        <pc:spChg chg="del">
-          <ac:chgData name="Colson, Robert" userId="25586c2a-52f0-4ea1-8d29-b1cb0db384a0" providerId="ADAL" clId="{8EA9600F-9558-4455-AFBB-BDC15B20C410}" dt="2025-02-25T16:38:30.692" v="41" actId="478"/>
-          <ac:spMkLst>
-            <pc:docMk/>
-            <pc:sldMk cId="2370629198" sldId="346"/>
-            <ac:spMk id="9" creationId="{E7A370C1-14D5-AF43-A796-AF0540DA76D8}"/>
-          </ac:spMkLst>
-        </pc:spChg>
       </pc:sldChg>
       <pc:sldChg chg="delSp modSp mod">
         <pc:chgData name="Colson, Robert" userId="25586c2a-52f0-4ea1-8d29-b1cb0db384a0" providerId="ADAL" clId="{8EA9600F-9558-4455-AFBB-BDC15B20C410}" dt="2025-02-25T16:39:36.763" v="43" actId="6549"/>
@@ -392,14 +400,6 @@
             <ac:spMk id="5" creationId="{6E8F0502-F26D-4842-97A7-E6A7B55ABA0B}"/>
           </ac:spMkLst>
         </pc:spChg>
-        <pc:picChg chg="del">
-          <ac:chgData name="Colson, Robert" userId="25586c2a-52f0-4ea1-8d29-b1cb0db384a0" providerId="ADAL" clId="{8EA9600F-9558-4455-AFBB-BDC15B20C410}" dt="2025-02-25T16:39:18.729" v="42" actId="478"/>
-          <ac:picMkLst>
-            <pc:docMk/>
-            <pc:sldMk cId="2240166599" sldId="355"/>
-            <ac:picMk id="16" creationId="{3AFECD8F-D8F3-6AB5-F910-82951DD7CA73}"/>
-          </ac:picMkLst>
-        </pc:picChg>
       </pc:sldChg>
       <pc:sldChg chg="modSp mod">
         <pc:chgData name="Colson, Robert" userId="25586c2a-52f0-4ea1-8d29-b1cb0db384a0" providerId="ADAL" clId="{8EA9600F-9558-4455-AFBB-BDC15B20C410}" dt="2025-02-25T16:33:09.589" v="6" actId="1076"/>
@@ -429,14 +429,6 @@
           <pc:docMk/>
           <pc:sldMk cId="3299242804" sldId="363"/>
         </pc:sldMkLst>
-        <pc:spChg chg="del mod">
-          <ac:chgData name="Colson, Robert" userId="25586c2a-52f0-4ea1-8d29-b1cb0db384a0" providerId="ADAL" clId="{8EA9600F-9558-4455-AFBB-BDC15B20C410}" dt="2025-02-25T16:38:22.465" v="40" actId="478"/>
-          <ac:spMkLst>
-            <pc:docMk/>
-            <pc:sldMk cId="3299242804" sldId="363"/>
-            <ac:spMk id="11" creationId="{7DBBE5F8-EB03-1640-9E31-56DC3F7CB5E2}"/>
-          </ac:spMkLst>
-        </pc:spChg>
       </pc:sldChg>
       <pc:sldChg chg="delSp mod">
         <pc:chgData name="Colson, Robert" userId="25586c2a-52f0-4ea1-8d29-b1cb0db384a0" providerId="ADAL" clId="{8EA9600F-9558-4455-AFBB-BDC15B20C410}" dt="2025-02-25T16:41:11" v="46" actId="478"/>
@@ -444,45 +436,21 @@
           <pc:docMk/>
           <pc:sldMk cId="3767592872" sldId="368"/>
         </pc:sldMkLst>
-        <pc:spChg chg="del">
-          <ac:chgData name="Colson, Robert" userId="25586c2a-52f0-4ea1-8d29-b1cb0db384a0" providerId="ADAL" clId="{8EA9600F-9558-4455-AFBB-BDC15B20C410}" dt="2025-02-25T16:41:07.444" v="44" actId="478"/>
-          <ac:spMkLst>
-            <pc:docMk/>
-            <pc:sldMk cId="3767592872" sldId="368"/>
-            <ac:spMk id="6" creationId="{9DE555E4-284A-D679-34C3-A88C3445D864}"/>
-          </ac:spMkLst>
-        </pc:spChg>
-        <pc:picChg chg="del">
-          <ac:chgData name="Colson, Robert" userId="25586c2a-52f0-4ea1-8d29-b1cb0db384a0" providerId="ADAL" clId="{8EA9600F-9558-4455-AFBB-BDC15B20C410}" dt="2025-02-25T16:41:09.290" v="45" actId="478"/>
-          <ac:picMkLst>
-            <pc:docMk/>
-            <pc:sldMk cId="3767592872" sldId="368"/>
-            <ac:picMk id="8" creationId="{F21530A2-216C-9CF5-07CB-22DF9D465610}"/>
-          </ac:picMkLst>
-        </pc:picChg>
-        <pc:picChg chg="del">
-          <ac:chgData name="Colson, Robert" userId="25586c2a-52f0-4ea1-8d29-b1cb0db384a0" providerId="ADAL" clId="{8EA9600F-9558-4455-AFBB-BDC15B20C410}" dt="2025-02-25T16:41:11" v="46" actId="478"/>
-          <ac:picMkLst>
-            <pc:docMk/>
-            <pc:sldMk cId="3767592872" sldId="368"/>
-            <ac:picMk id="9" creationId="{F672E728-1C91-209C-9BB6-72886F439BF0}"/>
-          </ac:picMkLst>
-        </pc:picChg>
       </pc:sldChg>
-      <pc:sldChg chg="addSp modSp new mod ord">
-        <pc:chgData name="Colson, Robert" userId="25586c2a-52f0-4ea1-8d29-b1cb0db384a0" providerId="ADAL" clId="{8EA9600F-9558-4455-AFBB-BDC15B20C410}" dt="2025-02-25T16:32:21.099" v="5" actId="1076"/>
+      <pc:sldChg chg="addSp delSp modSp new mod ord">
+        <pc:chgData name="Colson, Robert" userId="25586c2a-52f0-4ea1-8d29-b1cb0db384a0" providerId="ADAL" clId="{8EA9600F-9558-4455-AFBB-BDC15B20C410}" dt="2025-03-03T16:04:43.035" v="122" actId="20577"/>
         <pc:sldMkLst>
           <pc:docMk/>
           <pc:sldMk cId="257288875" sldId="369"/>
         </pc:sldMkLst>
-        <pc:picChg chg="add mod">
-          <ac:chgData name="Colson, Robert" userId="25586c2a-52f0-4ea1-8d29-b1cb0db384a0" providerId="ADAL" clId="{8EA9600F-9558-4455-AFBB-BDC15B20C410}" dt="2025-02-25T16:32:21.099" v="5" actId="1076"/>
-          <ac:picMkLst>
+        <pc:spChg chg="add mod">
+          <ac:chgData name="Colson, Robert" userId="25586c2a-52f0-4ea1-8d29-b1cb0db384a0" providerId="ADAL" clId="{8EA9600F-9558-4455-AFBB-BDC15B20C410}" dt="2025-03-03T16:04:43.035" v="122" actId="20577"/>
+          <ac:spMkLst>
             <pc:docMk/>
             <pc:sldMk cId="257288875" sldId="369"/>
-            <ac:picMk id="2" creationId="{AD96B729-F619-A084-44C2-FCC7A5250F30}"/>
-          </ac:picMkLst>
-        </pc:picChg>
+            <ac:spMk id="7" creationId="{074DD5B1-B987-8F44-E270-6914C00A3C4F}"/>
+          </ac:spMkLst>
+        </pc:spChg>
       </pc:sldChg>
       <pc:sldChg chg="delSp modSp add mod">
         <pc:chgData name="Colson, Robert" userId="25586c2a-52f0-4ea1-8d29-b1cb0db384a0" providerId="ADAL" clId="{8EA9600F-9558-4455-AFBB-BDC15B20C410}" dt="2025-02-25T16:35:15.968" v="27" actId="5793"/>
@@ -498,14 +466,6 @@
             <ac:spMk id="5" creationId="{27A5B7F4-EBDD-F5BF-C4D1-9ECF039B8777}"/>
           </ac:spMkLst>
         </pc:spChg>
-        <pc:picChg chg="del">
-          <ac:chgData name="Colson, Robert" userId="25586c2a-52f0-4ea1-8d29-b1cb0db384a0" providerId="ADAL" clId="{8EA9600F-9558-4455-AFBB-BDC15B20C410}" dt="2025-02-25T16:33:31.845" v="12" actId="478"/>
-          <ac:picMkLst>
-            <pc:docMk/>
-            <pc:sldMk cId="3989809570" sldId="370"/>
-            <ac:picMk id="2" creationId="{346B05ED-0A1C-54DD-6859-D8E7BD9AFECC}"/>
-          </ac:picMkLst>
-        </pc:picChg>
       </pc:sldChg>
       <pc:sldChg chg="modSp add mod">
         <pc:chgData name="Colson, Robert" userId="25586c2a-52f0-4ea1-8d29-b1cb0db384a0" providerId="ADAL" clId="{8EA9600F-9558-4455-AFBB-BDC15B20C410}" dt="2025-02-25T16:36:28.303" v="37" actId="20577"/>
@@ -521,6 +481,21 @@
             <ac:spMk id="5" creationId="{CB91F443-0FD7-FF83-4862-D8BF30FE6AA2}"/>
           </ac:spMkLst>
         </pc:spChg>
+      </pc:sldChg>
+      <pc:sldChg chg="addSp modSp new mod">
+        <pc:chgData name="Colson, Robert" userId="25586c2a-52f0-4ea1-8d29-b1cb0db384a0" providerId="ADAL" clId="{8EA9600F-9558-4455-AFBB-BDC15B20C410}" dt="2025-02-27T16:22:27.721" v="55" actId="1076"/>
+        <pc:sldMkLst>
+          <pc:docMk/>
+          <pc:sldMk cId="3166759269" sldId="372"/>
+        </pc:sldMkLst>
+        <pc:picChg chg="add mod">
+          <ac:chgData name="Colson, Robert" userId="25586c2a-52f0-4ea1-8d29-b1cb0db384a0" providerId="ADAL" clId="{8EA9600F-9558-4455-AFBB-BDC15B20C410}" dt="2025-02-27T16:22:27.721" v="55" actId="1076"/>
+          <ac:picMkLst>
+            <pc:docMk/>
+            <pc:sldMk cId="3166759269" sldId="372"/>
+            <ac:picMk id="2" creationId="{AD96B729-F619-A084-44C2-FCC7A5250F30}"/>
+          </ac:picMkLst>
+        </pc:picChg>
       </pc:sldChg>
     </pc:docChg>
   </pc:docChgLst>
@@ -2143,7 +2118,7 @@
             </a:pPr>
             <a:fld id="{00000000-1234-1234-1234-123412341234}" type="slidenum">
               <a:rPr lang="en-US"/>
-              <a:t>2</a:t>
+              <a:t>3</a:t>
             </a:fld>
             <a:endParaRPr/>
           </a:p>
@@ -2252,7 +2227,7 @@
                 <a:cs typeface="Calibri"/>
                 <a:sym typeface="Calibri"/>
               </a:rPr>
-              <a:t>11</a:t>
+              <a:t>12</a:t>
             </a:fld>
             <a:endParaRPr lang="en-US" sz="1200" b="0" i="0" u="none" strike="noStrike" cap="none">
               <a:solidFill>
@@ -2369,7 +2344,7 @@
                 <a:cs typeface="Calibri"/>
                 <a:sym typeface="Calibri"/>
               </a:rPr>
-              <a:t>12</a:t>
+              <a:t>13</a:t>
             </a:fld>
             <a:endParaRPr lang="en-US" sz="1200" b="0" i="0" u="none" strike="noStrike" cap="none">
               <a:solidFill>
@@ -2486,7 +2461,7 @@
                 <a:cs typeface="Calibri"/>
                 <a:sym typeface="Calibri"/>
               </a:rPr>
-              <a:t>13</a:t>
+              <a:t>14</a:t>
             </a:fld>
             <a:endParaRPr lang="en-US" sz="1200" b="0" i="0" u="none" strike="noStrike" cap="none">
               <a:solidFill>
@@ -2603,7 +2578,7 @@
                 <a:cs typeface="Calibri"/>
                 <a:sym typeface="Calibri"/>
               </a:rPr>
-              <a:t>14</a:t>
+              <a:t>15</a:t>
             </a:fld>
             <a:endParaRPr lang="en-US" sz="1200" b="0" i="0" u="none" strike="noStrike" cap="none">
               <a:solidFill>
@@ -2720,7 +2695,7 @@
                 <a:cs typeface="Calibri"/>
                 <a:sym typeface="Calibri"/>
               </a:rPr>
-              <a:t>15</a:t>
+              <a:t>16</a:t>
             </a:fld>
             <a:endParaRPr lang="en-US" sz="1200" b="0" i="0" u="none" strike="noStrike" cap="none">
               <a:solidFill>
@@ -2837,7 +2812,7 @@
                 <a:cs typeface="Calibri"/>
                 <a:sym typeface="Calibri"/>
               </a:rPr>
-              <a:t>16</a:t>
+              <a:t>17</a:t>
             </a:fld>
             <a:endParaRPr lang="en-US" sz="1200" b="0" i="0" u="none" strike="noStrike" cap="none">
               <a:solidFill>
@@ -2954,7 +2929,7 @@
                 <a:cs typeface="Calibri"/>
                 <a:sym typeface="Calibri"/>
               </a:rPr>
-              <a:t>17</a:t>
+              <a:t>18</a:t>
             </a:fld>
             <a:endParaRPr lang="en-US" sz="1200" b="0" i="0" u="none" strike="noStrike" cap="none">
               <a:solidFill>
@@ -3139,7 +3114,7 @@
             </a:pPr>
             <a:fld id="{00000000-1234-1234-1234-123412341234}" type="slidenum">
               <a:rPr lang="en-US"/>
-              <a:t>18</a:t>
+              <a:t>19</a:t>
             </a:fld>
             <a:endParaRPr/>
           </a:p>
@@ -3316,7 +3291,7 @@
             </a:pPr>
             <a:fld id="{00000000-1234-1234-1234-123412341234}" type="slidenum">
               <a:rPr lang="en-US"/>
-              <a:t>3</a:t>
+              <a:t>4</a:t>
             </a:fld>
             <a:endParaRPr/>
           </a:p>
@@ -3425,7 +3400,7 @@
                 <a:cs typeface="Calibri"/>
                 <a:sym typeface="Calibri"/>
               </a:rPr>
-              <a:t>4</a:t>
+              <a:t>5</a:t>
             </a:fld>
             <a:endParaRPr lang="en-US" sz="1200" b="0" i="0" u="none" strike="noStrike" cap="none">
               <a:solidFill>
@@ -3566,7 +3541,7 @@
                 <a:cs typeface="Calibri"/>
                 <a:sym typeface="Calibri"/>
               </a:rPr>
-              <a:t>5</a:t>
+              <a:t>6</a:t>
             </a:fld>
             <a:endParaRPr lang="en-US" sz="1200" b="0" i="0" u="none" strike="noStrike" cap="none">
               <a:solidFill>
@@ -3683,7 +3658,7 @@
                 <a:cs typeface="Calibri"/>
                 <a:sym typeface="Calibri"/>
               </a:rPr>
-              <a:t>6</a:t>
+              <a:t>7</a:t>
             </a:fld>
             <a:endParaRPr lang="en-US" sz="1200" b="0" i="0" u="none" strike="noStrike" cap="none">
               <a:solidFill>
@@ -3800,7 +3775,7 @@
                 <a:cs typeface="Calibri"/>
                 <a:sym typeface="Calibri"/>
               </a:rPr>
-              <a:t>7</a:t>
+              <a:t>8</a:t>
             </a:fld>
             <a:endParaRPr lang="en-US" sz="1200" b="0" i="0" u="none" strike="noStrike" cap="none">
               <a:solidFill>
@@ -3941,7 +3916,7 @@
                 <a:cs typeface="Calibri"/>
                 <a:sym typeface="Calibri"/>
               </a:rPr>
-              <a:t>8</a:t>
+              <a:t>9</a:t>
             </a:fld>
             <a:endParaRPr lang="en-US" sz="1200" b="0" i="0" u="none" strike="noStrike" cap="none">
               <a:solidFill>
@@ -4058,7 +4033,7 @@
                 <a:cs typeface="Calibri"/>
                 <a:sym typeface="Calibri"/>
               </a:rPr>
-              <a:t>9</a:t>
+              <a:t>10</a:t>
             </a:fld>
             <a:endParaRPr lang="en-US" sz="1200" b="0" i="0" u="none" strike="noStrike" cap="none">
               <a:solidFill>
@@ -4175,7 +4150,7 @@
                 <a:cs typeface="Calibri"/>
                 <a:sym typeface="Calibri"/>
               </a:rPr>
-              <a:t>10</a:t>
+              <a:t>11</a:t>
             </a:fld>
             <a:endParaRPr lang="en-US" sz="1200" b="0" i="0" u="none" strike="noStrike" cap="none">
               <a:solidFill>
@@ -5363,43 +5338,350 @@
           <a:chExt cx="0" cy="0"/>
         </a:xfrm>
       </p:grpSpPr>
-      <p:pic>
-        <p:nvPicPr>
-          <p:cNvPr id="2" name="Picture 1" descr="A white background with black text&#10;&#10;Description automatically generated">
+      <p:sp>
+        <p:nvSpPr>
+          <p:cNvPr id="7" name="Rectangle 3">
             <a:extLst>
               <a:ext uri="{FF2B5EF4-FFF2-40B4-BE49-F238E27FC236}">
-                <a16:creationId xmlns:a16="http://schemas.microsoft.com/office/drawing/2014/main" id="{AD96B729-F619-A084-44C2-FCC7A5250F30}"/>
+                <a16:creationId xmlns:a16="http://schemas.microsoft.com/office/drawing/2014/main" id="{074DD5B1-B987-8F44-E270-6914C00A3C4F}"/>
               </a:ext>
             </a:extLst>
           </p:cNvPr>
-          <p:cNvPicPr>
-            <a:picLocks noChangeAspect="1"/>
-          </p:cNvPicPr>
+          <p:cNvSpPr>
+            <a:spLocks noChangeArrowheads="1"/>
+          </p:cNvSpPr>
           <p:nvPr/>
-        </p:nvPicPr>
-        <p:blipFill rotWithShape="1">
-          <a:blip r:embed="rId2"/>
-          <a:srcRect b="24585"/>
-          <a:stretch/>
-        </p:blipFill>
+        </p:nvSpPr>
         <p:spPr bwMode="auto">
           <a:xfrm>
-            <a:off x="340261" y="493158"/>
-            <a:ext cx="3219450" cy="1244600"/>
+            <a:off x="286438" y="1720839"/>
+            <a:ext cx="8769427" cy="3416320"/>
           </a:xfrm>
           <a:prstGeom prst="rect">
             <a:avLst/>
           </a:prstGeom>
+          <a:noFill/>
           <a:ln>
             <a:noFill/>
           </a:ln>
+          <a:effectLst/>
           <a:extLst>
-            <a:ext uri="{53640926-AAD7-44D8-BBD7-CCE9431645EC}">
-              <a14:shadowObscured xmlns:a14="http://schemas.microsoft.com/office/drawing/2010/main"/>
+            <a:ext uri="{909E8E84-426E-40DD-AFC4-6F175D3DCCD1}">
+              <a14:hiddenFill xmlns:a14="http://schemas.microsoft.com/office/drawing/2010/main">
+                <a:solidFill>
+                  <a:schemeClr val="accent1"/>
+                </a:solidFill>
+              </a14:hiddenFill>
+            </a:ext>
+            <a:ext uri="{91240B29-F687-4F45-9708-019B960494DF}">
+              <a14:hiddenLine xmlns:a14="http://schemas.microsoft.com/office/drawing/2010/main" w="9525">
+                <a:solidFill>
+                  <a:schemeClr val="tx1"/>
+                </a:solidFill>
+                <a:miter lim="800000"/>
+                <a:headEnd/>
+                <a:tailEnd/>
+              </a14:hiddenLine>
+            </a:ext>
+            <a:ext uri="{AF507438-7753-43E0-B8FC-AC1667EBCBE1}">
+              <a14:hiddenEffects xmlns:a14="http://schemas.microsoft.com/office/drawing/2010/main">
+                <a:effectLst>
+                  <a:outerShdw dist="35921" dir="2700000" algn="ctr" rotWithShape="0">
+                    <a:schemeClr val="bg2"/>
+                  </a:outerShdw>
+                </a:effectLst>
+              </a14:hiddenEffects>
             </a:ext>
           </a:extLst>
         </p:spPr>
-      </p:pic>
+        <p:txBody>
+          <a:bodyPr vert="horz" wrap="square" lIns="91440" tIns="45720" rIns="91440" bIns="45720" numCol="1" anchor="ctr" anchorCtr="0" compatLnSpc="1">
+            <a:prstTxWarp prst="textNoShape">
+              <a:avLst/>
+            </a:prstTxWarp>
+            <a:spAutoFit/>
+          </a:bodyPr>
+          <a:lstStyle/>
+          <a:p>
+            <a:pPr marL="0" marR="0" lvl="0" indent="0" algn="l" defTabSz="914400" rtl="0" eaLnBrk="0" fontAlgn="base" latinLnBrk="0" hangingPunct="0">
+              <a:lnSpc>
+                <a:spcPct val="100000"/>
+              </a:lnSpc>
+              <a:spcBef>
+                <a:spcPct val="0"/>
+              </a:spcBef>
+              <a:spcAft>
+                <a:spcPct val="0"/>
+              </a:spcAft>
+              <a:buClrTx/>
+              <a:buSzTx/>
+              <a:buFontTx/>
+              <a:buChar char="•"/>
+              <a:tabLst/>
+            </a:pPr>
+            <a:r>
+              <a:rPr kumimoji="0" lang="en-US" altLang="ja-JP" sz="1800" b="1" i="0" u="none" strike="noStrike" cap="none" normalizeH="0" baseline="0" dirty="0">
+                <a:ln>
+                  <a:noFill/>
+                </a:ln>
+                <a:solidFill>
+                  <a:schemeClr val="tx1"/>
+                </a:solidFill>
+                <a:effectLst/>
+                <a:latin typeface="Arial" panose="020B0604020202020204" pitchFamily="34" charset="0"/>
+              </a:rPr>
+              <a:t>- **Asymptote**: A line that a graph approaches but never touches as it extends toward infinity</a:t>
+            </a:r>
+            <a:endParaRPr lang="en-US" altLang="ja-JP" sz="1800" b="1" dirty="0">
+              <a:solidFill>
+                <a:schemeClr val="tx1"/>
+              </a:solidFill>
+              <a:latin typeface="Arial" panose="020B0604020202020204" pitchFamily="34" charset="0"/>
+            </a:endParaRPr>
+          </a:p>
+          <a:p>
+            <a:pPr marL="0" marR="0" lvl="0" indent="0" algn="l" defTabSz="914400" rtl="0" eaLnBrk="0" fontAlgn="base" latinLnBrk="0" hangingPunct="0">
+              <a:lnSpc>
+                <a:spcPct val="100000"/>
+              </a:lnSpc>
+              <a:spcBef>
+                <a:spcPct val="0"/>
+              </a:spcBef>
+              <a:spcAft>
+                <a:spcPct val="0"/>
+              </a:spcAft>
+              <a:buClrTx/>
+              <a:buSzTx/>
+              <a:buFontTx/>
+              <a:buChar char="•"/>
+              <a:tabLst/>
+            </a:pPr>
+            <a:endParaRPr kumimoji="0" lang="en-US" altLang="ja-JP" sz="1800" b="1" i="0" u="none" strike="noStrike" cap="none" normalizeH="0" baseline="0" dirty="0">
+              <a:ln>
+                <a:noFill/>
+              </a:ln>
+              <a:solidFill>
+                <a:schemeClr val="tx1"/>
+              </a:solidFill>
+              <a:effectLst/>
+              <a:latin typeface="Arial" panose="020B0604020202020204" pitchFamily="34" charset="0"/>
+            </a:endParaRPr>
+          </a:p>
+          <a:p>
+            <a:pPr marL="0" marR="0" lvl="0" indent="0" algn="l" defTabSz="914400" rtl="0" eaLnBrk="0" fontAlgn="base" latinLnBrk="0" hangingPunct="0">
+              <a:lnSpc>
+                <a:spcPct val="100000"/>
+              </a:lnSpc>
+              <a:spcBef>
+                <a:spcPct val="0"/>
+              </a:spcBef>
+              <a:spcAft>
+                <a:spcPct val="0"/>
+              </a:spcAft>
+              <a:buClrTx/>
+              <a:buSzTx/>
+              <a:buFontTx/>
+              <a:buChar char="•"/>
+              <a:tabLst/>
+            </a:pPr>
+            <a:r>
+              <a:rPr kumimoji="0" lang="en-US" altLang="ja-JP" sz="1800" b="1" i="0" u="none" strike="noStrike" cap="none" normalizeH="0" baseline="0" dirty="0">
+                <a:ln>
+                  <a:noFill/>
+                </a:ln>
+                <a:solidFill>
+                  <a:schemeClr val="tx1"/>
+                </a:solidFill>
+                <a:effectLst/>
+                <a:latin typeface="Arial" panose="020B0604020202020204" pitchFamily="34" charset="0"/>
+              </a:rPr>
+              <a:t>- **Constant of variation**: A fixed number that relates two variables in a direct or inverse variation equation</a:t>
+            </a:r>
+            <a:endParaRPr lang="en-US" altLang="ja-JP" sz="1800" b="1" dirty="0">
+              <a:solidFill>
+                <a:schemeClr val="tx1"/>
+              </a:solidFill>
+              <a:latin typeface="Arial" panose="020B0604020202020204" pitchFamily="34" charset="0"/>
+            </a:endParaRPr>
+          </a:p>
+          <a:p>
+            <a:pPr marL="0" marR="0" lvl="0" indent="0" algn="l" defTabSz="914400" rtl="0" eaLnBrk="0" fontAlgn="base" latinLnBrk="0" hangingPunct="0">
+              <a:lnSpc>
+                <a:spcPct val="100000"/>
+              </a:lnSpc>
+              <a:spcBef>
+                <a:spcPct val="0"/>
+              </a:spcBef>
+              <a:spcAft>
+                <a:spcPct val="0"/>
+              </a:spcAft>
+              <a:buClrTx/>
+              <a:buSzTx/>
+              <a:buFontTx/>
+              <a:buChar char="•"/>
+              <a:tabLst/>
+            </a:pPr>
+            <a:endParaRPr kumimoji="0" lang="en-US" altLang="ja-JP" sz="1800" b="1" i="0" u="none" strike="noStrike" cap="none" normalizeH="0" baseline="0" dirty="0">
+              <a:ln>
+                <a:noFill/>
+              </a:ln>
+              <a:solidFill>
+                <a:schemeClr val="tx1"/>
+              </a:solidFill>
+              <a:effectLst/>
+              <a:latin typeface="Arial" panose="020B0604020202020204" pitchFamily="34" charset="0"/>
+            </a:endParaRPr>
+          </a:p>
+          <a:p>
+            <a:pPr marL="0" marR="0" lvl="0" indent="0" algn="l" defTabSz="914400" rtl="0" eaLnBrk="0" fontAlgn="base" latinLnBrk="0" hangingPunct="0">
+              <a:lnSpc>
+                <a:spcPct val="100000"/>
+              </a:lnSpc>
+              <a:spcBef>
+                <a:spcPct val="0"/>
+              </a:spcBef>
+              <a:spcAft>
+                <a:spcPct val="0"/>
+              </a:spcAft>
+              <a:buClrTx/>
+              <a:buSzTx/>
+              <a:buFontTx/>
+              <a:buChar char="•"/>
+              <a:tabLst/>
+            </a:pPr>
+            <a:r>
+              <a:rPr kumimoji="0" lang="en-US" altLang="ja-JP" sz="1800" b="1" i="0" u="none" strike="noStrike" cap="none" normalizeH="0" baseline="0" dirty="0">
+                <a:ln>
+                  <a:noFill/>
+                </a:ln>
+                <a:solidFill>
+                  <a:schemeClr val="tx1"/>
+                </a:solidFill>
+                <a:effectLst/>
+                <a:latin typeface="Arial" panose="020B0604020202020204" pitchFamily="34" charset="0"/>
+              </a:rPr>
+              <a:t>- **Inverse variation**: A relationship where one variable increases as the other decreases, typically expressed as y = k/x, where k is a constant. </a:t>
+            </a:r>
+            <a:endParaRPr lang="en-US" altLang="ja-JP" sz="1800" b="1" dirty="0">
+              <a:solidFill>
+                <a:schemeClr val="tx1"/>
+              </a:solidFill>
+              <a:latin typeface="Arial" panose="020B0604020202020204" pitchFamily="34" charset="0"/>
+            </a:endParaRPr>
+          </a:p>
+          <a:p>
+            <a:pPr marL="0" marR="0" lvl="0" indent="0" algn="l" defTabSz="914400" rtl="0" eaLnBrk="0" fontAlgn="base" latinLnBrk="0" hangingPunct="0">
+              <a:lnSpc>
+                <a:spcPct val="100000"/>
+              </a:lnSpc>
+              <a:spcBef>
+                <a:spcPct val="0"/>
+              </a:spcBef>
+              <a:spcAft>
+                <a:spcPct val="0"/>
+              </a:spcAft>
+              <a:buClrTx/>
+              <a:buSzTx/>
+              <a:buFontTx/>
+              <a:buChar char="•"/>
+              <a:tabLst/>
+            </a:pPr>
+            <a:endParaRPr kumimoji="0" lang="en-US" altLang="ja-JP" sz="1800" b="1" i="0" u="none" strike="noStrike" cap="none" normalizeH="0" baseline="0" dirty="0">
+              <a:ln>
+                <a:noFill/>
+              </a:ln>
+              <a:solidFill>
+                <a:schemeClr val="tx1"/>
+              </a:solidFill>
+              <a:effectLst/>
+              <a:latin typeface="Arial" panose="020B0604020202020204" pitchFamily="34" charset="0"/>
+            </a:endParaRPr>
+          </a:p>
+          <a:p>
+            <a:pPr marL="0" marR="0" lvl="0" indent="0" algn="l" defTabSz="914400" rtl="0" eaLnBrk="0" fontAlgn="base" latinLnBrk="0" hangingPunct="0">
+              <a:lnSpc>
+                <a:spcPct val="100000"/>
+              </a:lnSpc>
+              <a:spcBef>
+                <a:spcPct val="0"/>
+              </a:spcBef>
+              <a:spcAft>
+                <a:spcPct val="0"/>
+              </a:spcAft>
+              <a:buClrTx/>
+              <a:buSzTx/>
+              <a:tabLst/>
+            </a:pPr>
+            <a:r>
+              <a:rPr kumimoji="0" lang="en-US" altLang="ja-JP" sz="1800" b="1" i="0" u="none" strike="noStrike" cap="none" normalizeH="0" baseline="0" dirty="0">
+                <a:ln>
+                  <a:noFill/>
+                </a:ln>
+                <a:solidFill>
+                  <a:schemeClr val="tx1"/>
+                </a:solidFill>
+                <a:effectLst/>
+                <a:latin typeface="Arial" panose="020B0604020202020204" pitchFamily="34" charset="0"/>
+              </a:rPr>
+              <a:t>  </a:t>
+            </a:r>
+          </a:p>
+          <a:p>
+            <a:pPr marL="0" marR="0" lvl="0" indent="0" algn="l" defTabSz="914400" rtl="0" eaLnBrk="0" fontAlgn="base" latinLnBrk="0" hangingPunct="0">
+              <a:lnSpc>
+                <a:spcPct val="100000"/>
+              </a:lnSpc>
+              <a:spcBef>
+                <a:spcPct val="0"/>
+              </a:spcBef>
+              <a:spcAft>
+                <a:spcPct val="0"/>
+              </a:spcAft>
+              <a:buClrTx/>
+              <a:buSzTx/>
+              <a:buFontTx/>
+              <a:buChar char="•"/>
+              <a:tabLst/>
+            </a:pPr>
+            <a:r>
+              <a:rPr kumimoji="0" lang="en-US" altLang="ja-JP" sz="1800" b="1" i="0" u="none" strike="noStrike" cap="none" normalizeH="0" baseline="0" dirty="0">
+                <a:ln>
+                  <a:noFill/>
+                </a:ln>
+                <a:solidFill>
+                  <a:schemeClr val="tx1"/>
+                </a:solidFill>
+                <a:effectLst/>
+                <a:latin typeface="Arial" panose="020B0604020202020204" pitchFamily="34" charset="0"/>
+              </a:rPr>
+              <a:t>- **Reciprocal function**: A function of the form f(x) = 1/x, where the output is the reciprocal of </a:t>
+            </a:r>
+            <a:r>
+              <a:rPr kumimoji="0" lang="en-US" altLang="ja-JP" sz="1800" b="1" i="0" u="none" strike="noStrike" cap="none" normalizeH="0" baseline="0">
+                <a:ln>
+                  <a:noFill/>
+                </a:ln>
+                <a:solidFill>
+                  <a:schemeClr val="tx1"/>
+                </a:solidFill>
+                <a:effectLst/>
+                <a:latin typeface="Arial" panose="020B0604020202020204" pitchFamily="34" charset="0"/>
+              </a:rPr>
+              <a:t>the input.</a:t>
+            </a:r>
+            <a:endParaRPr kumimoji="0" lang="ja-JP" altLang="ja-JP" sz="1800" b="0" i="0" u="none" strike="noStrike" cap="none" normalizeH="0" baseline="0" dirty="0">
+              <a:ln>
+                <a:noFill/>
+              </a:ln>
+              <a:solidFill>
+                <a:schemeClr val="tx1"/>
+              </a:solidFill>
+              <a:effectLst/>
+              <a:latin typeface="Arial" panose="020B0604020202020204" pitchFamily="34" charset="0"/>
+            </a:endParaRPr>
+          </a:p>
+        </p:txBody>
+      </p:sp>
     </p:spTree>
     <p:extLst>
       <p:ext uri="{BB962C8B-B14F-4D97-AF65-F5344CB8AC3E}">
@@ -5414,6 +5696,350 @@
 </file>
 
 <file path=ppt/slides/slide10.xml><?xml version="1.0" encoding="utf-8"?>
+<p:sld xmlns:a="http://schemas.openxmlformats.org/drawingml/2006/main" xmlns:r="http://schemas.openxmlformats.org/officeDocument/2006/relationships" xmlns:p="http://schemas.openxmlformats.org/presentationml/2006/main">
+  <p:cSld>
+    <p:spTree>
+      <p:nvGrpSpPr>
+        <p:cNvPr id="1" name="Shape 173"/>
+        <p:cNvGrpSpPr/>
+        <p:nvPr/>
+      </p:nvGrpSpPr>
+      <p:grpSpPr>
+        <a:xfrm>
+          <a:off x="0" y="0"/>
+          <a:ext cx="0" cy="0"/>
+          <a:chOff x="0" y="0"/>
+          <a:chExt cx="0" cy="0"/>
+        </a:xfrm>
+      </p:grpSpPr>
+      <p:pic>
+        <p:nvPicPr>
+          <p:cNvPr id="3" name="Picture 2" descr="Screen Shot 2022-04-07 at 1.01.16 PM.png"/>
+          <p:cNvPicPr>
+            <a:picLocks noChangeAspect="1"/>
+          </p:cNvPicPr>
+          <p:nvPr/>
+        </p:nvPicPr>
+        <p:blipFill>
+          <a:blip r:embed="rId3">
+            <a:extLst>
+              <a:ext uri="{28A0092B-C50C-407E-A947-70E740481C1C}">
+                <a14:useLocalDpi xmlns:a14="http://schemas.microsoft.com/office/drawing/2010/main" val="0"/>
+              </a:ext>
+            </a:extLst>
+          </a:blip>
+          <a:stretch>
+            <a:fillRect/>
+          </a:stretch>
+        </p:blipFill>
+        <p:spPr>
+          <a:xfrm>
+            <a:off x="1829983" y="1461640"/>
+            <a:ext cx="4369926" cy="2349731"/>
+          </a:xfrm>
+          <a:prstGeom prst="rect">
+            <a:avLst/>
+          </a:prstGeom>
+        </p:spPr>
+      </p:pic>
+      <p:sp>
+        <p:nvSpPr>
+          <p:cNvPr id="5" name="TextBox 4">
+            <a:extLst>
+              <a:ext uri="{FF2B5EF4-FFF2-40B4-BE49-F238E27FC236}">
+                <a16:creationId xmlns:a16="http://schemas.microsoft.com/office/drawing/2014/main" id="{6E8F0502-F26D-4842-97A7-E6A7B55ABA0B}"/>
+              </a:ext>
+            </a:extLst>
+          </p:cNvPr>
+          <p:cNvSpPr txBox="1"/>
+          <p:nvPr/>
+        </p:nvSpPr>
+        <p:spPr>
+          <a:xfrm>
+            <a:off x="355758" y="706927"/>
+            <a:ext cx="8321209" cy="990015"/>
+          </a:xfrm>
+          <a:prstGeom prst="rect">
+            <a:avLst/>
+          </a:prstGeom>
+          <a:noFill/>
+        </p:spPr>
+        <p:txBody>
+          <a:bodyPr wrap="square" rIns="36000" rtlCol="0">
+            <a:spAutoFit/>
+          </a:bodyPr>
+          <a:lstStyle/>
+          <a:p>
+            <a:pPr>
+              <a:spcAft>
+                <a:spcPts val="1000"/>
+              </a:spcAft>
+              <a:tabLst>
+                <a:tab pos="1584000" algn="l"/>
+              </a:tabLst>
+            </a:pPr>
+            <a:r>
+              <a:rPr lang="en-IN" sz="1800" b="1" dirty="0">
+                <a:solidFill>
+                  <a:srgbClr val="0078AE"/>
+                </a:solidFill>
+              </a:rPr>
+              <a:t>	</a:t>
+            </a:r>
+            <a:r>
+              <a:rPr lang="de-DE" sz="1800" b="1" dirty="0">
+                <a:solidFill>
+                  <a:srgbClr val="58585A"/>
+                </a:solidFill>
+              </a:rPr>
+              <a:t>Use an Inverse Variation Model</a:t>
+            </a:r>
+            <a:endParaRPr lang="en-US" sz="1800" b="1" dirty="0">
+              <a:solidFill>
+                <a:srgbClr val="58585A"/>
+              </a:solidFill>
+            </a:endParaRPr>
+          </a:p>
+          <a:p>
+            <a:pPr>
+              <a:spcAft>
+                <a:spcPts val="16800"/>
+              </a:spcAft>
+            </a:pPr>
+            <a:r>
+              <a:rPr lang="en-US" sz="1600" b="1" dirty="0"/>
+              <a:t>On a Greek bouzouki, the string length </a:t>
+            </a:r>
+            <a:r>
+              <a:rPr lang="en-US" sz="1600" b="1" i="1" dirty="0"/>
+              <a:t>s</a:t>
+            </a:r>
+            <a:r>
+              <a:rPr lang="en-US" sz="1600" b="1" dirty="0"/>
+              <a:t> varies inversely with the </a:t>
+            </a:r>
+            <a:br>
+              <a:rPr lang="en-US" sz="1600" b="1" dirty="0"/>
+            </a:br>
+            <a:r>
+              <a:rPr lang="en-US" sz="1600" b="1" dirty="0"/>
+              <a:t>frequency </a:t>
+            </a:r>
+            <a:r>
+              <a:rPr lang="en-US" sz="1600" b="1" i="1" dirty="0"/>
+              <a:t>f</a:t>
+            </a:r>
+            <a:r>
+              <a:rPr lang="en-US" sz="1600" b="1" dirty="0"/>
+              <a:t> of its vibrations.</a:t>
+            </a:r>
+          </a:p>
+        </p:txBody>
+      </p:sp>
+      <p:sp>
+        <p:nvSpPr>
+          <p:cNvPr id="6" name="Rectangle 5">
+            <a:extLst>
+              <a:ext uri="{FF2B5EF4-FFF2-40B4-BE49-F238E27FC236}">
+                <a16:creationId xmlns:a16="http://schemas.microsoft.com/office/drawing/2014/main" id="{33341DDE-51A7-BB4A-A5D0-B99BDB557C68}"/>
+              </a:ext>
+            </a:extLst>
+          </p:cNvPr>
+          <p:cNvSpPr/>
+          <p:nvPr/>
+        </p:nvSpPr>
+        <p:spPr>
+          <a:xfrm>
+            <a:off x="452746" y="749488"/>
+            <a:ext cx="1480557" cy="295175"/>
+          </a:xfrm>
+          <a:prstGeom prst="rect">
+            <a:avLst/>
+          </a:prstGeom>
+          <a:solidFill>
+            <a:srgbClr val="1A4F8D"/>
+          </a:solidFill>
+          <a:ln>
+            <a:noFill/>
+          </a:ln>
+        </p:spPr>
+        <p:style>
+          <a:lnRef idx="2">
+            <a:schemeClr val="accent1">
+              <a:shade val="50000"/>
+            </a:schemeClr>
+          </a:lnRef>
+          <a:fillRef idx="1">
+            <a:schemeClr val="accent1"/>
+          </a:fillRef>
+          <a:effectRef idx="0">
+            <a:schemeClr val="accent1"/>
+          </a:effectRef>
+          <a:fontRef idx="minor">
+            <a:schemeClr val="lt1"/>
+          </a:fontRef>
+        </p:style>
+        <p:txBody>
+          <a:bodyPr wrap="square" tIns="0" bIns="18000" rtlCol="0" anchor="ctr">
+            <a:spAutoFit/>
+          </a:bodyPr>
+          <a:lstStyle/>
+          <a:p>
+            <a:r>
+              <a:rPr lang="en-IN" sz="1800" b="1" cap="all" dirty="0">
+                <a:solidFill>
+                  <a:schemeClr val="bg1"/>
+                </a:solidFill>
+              </a:rPr>
+              <a:t>Example 3</a:t>
+            </a:r>
+            <a:endParaRPr lang="en-US" sz="1800" cap="all" dirty="0"/>
+          </a:p>
+        </p:txBody>
+      </p:sp>
+      <p:sp>
+        <p:nvSpPr>
+          <p:cNvPr id="8" name="TextBox 7">
+            <a:extLst>
+              <a:ext uri="{FF2B5EF4-FFF2-40B4-BE49-F238E27FC236}">
+                <a16:creationId xmlns:a16="http://schemas.microsoft.com/office/drawing/2014/main" id="{E2AF600D-6F8E-AF4F-9F8A-7A6BE3BFBF7F}"/>
+              </a:ext>
+            </a:extLst>
+          </p:cNvPr>
+          <p:cNvSpPr txBox="1"/>
+          <p:nvPr/>
+        </p:nvSpPr>
+        <p:spPr>
+          <a:xfrm>
+            <a:off x="355758" y="351588"/>
+            <a:ext cx="8341433" cy="369332"/>
+          </a:xfrm>
+          <a:prstGeom prst="rect">
+            <a:avLst/>
+          </a:prstGeom>
+          <a:noFill/>
+        </p:spPr>
+        <p:txBody>
+          <a:bodyPr wrap="square" rIns="36000" rtlCol="0">
+            <a:spAutoFit/>
+          </a:bodyPr>
+          <a:lstStyle/>
+          <a:p>
+            <a:r>
+              <a:rPr lang="en-IN" sz="1800" b="1" dirty="0">
+                <a:solidFill>
+                  <a:srgbClr val="137F97"/>
+                </a:solidFill>
+              </a:rPr>
+              <a:t>APPLICATION</a:t>
+            </a:r>
+            <a:endParaRPr lang="en-IN" sz="1800" dirty="0">
+              <a:solidFill>
+                <a:srgbClr val="137F97"/>
+              </a:solidFill>
+            </a:endParaRPr>
+          </a:p>
+        </p:txBody>
+      </p:sp>
+      <p:sp>
+        <p:nvSpPr>
+          <p:cNvPr id="2" name="Google Shape;195;g10c86f8f910_0_5">
+            <a:extLst>
+              <a:ext uri="{FF2B5EF4-FFF2-40B4-BE49-F238E27FC236}">
+                <a16:creationId xmlns:a16="http://schemas.microsoft.com/office/drawing/2014/main" id="{24C7DF14-301A-91C8-0A63-2BA080B601D5}"/>
+              </a:ext>
+            </a:extLst>
+          </p:cNvPr>
+          <p:cNvSpPr/>
+          <p:nvPr/>
+        </p:nvSpPr>
+        <p:spPr>
+          <a:xfrm>
+            <a:off x="280675" y="6385788"/>
+            <a:ext cx="8614500" cy="165000"/>
+          </a:xfrm>
+          <a:prstGeom prst="rect">
+            <a:avLst/>
+          </a:prstGeom>
+          <a:noFill/>
+          <a:ln>
+            <a:noFill/>
+          </a:ln>
+        </p:spPr>
+        <p:txBody>
+          <a:bodyPr spcFirstLastPara="1" wrap="square" lIns="91425" tIns="45700" rIns="91425" bIns="45700" anchor="t" anchorCtr="0">
+            <a:noAutofit/>
+          </a:bodyPr>
+          <a:lstStyle/>
+          <a:p>
+            <a:pPr lvl="0" algn="ctr">
+              <a:buSzPts val="1800"/>
+            </a:pPr>
+            <a:r>
+              <a:rPr lang="en-US" sz="800" dirty="0">
+                <a:solidFill>
+                  <a:srgbClr val="595959"/>
+                </a:solidFill>
+                <a:latin typeface="Arial" panose="020B0604020202020204" pitchFamily="34" charset="0"/>
+                <a:ea typeface="Avenir"/>
+                <a:cs typeface="Arial" panose="020B0604020202020204" pitchFamily="34" charset="0"/>
+                <a:sym typeface="Avenir"/>
+              </a:rPr>
+              <a:t>Photo credit: </a:t>
+            </a:r>
+            <a:r>
+              <a:rPr lang="en-US" sz="800" dirty="0" err="1">
+                <a:solidFill>
+                  <a:srgbClr val="595959"/>
+                </a:solidFill>
+                <a:latin typeface="Arial" panose="020B0604020202020204" pitchFamily="34" charset="0"/>
+                <a:ea typeface="Avenir"/>
+                <a:cs typeface="Arial" panose="020B0604020202020204" pitchFamily="34" charset="0"/>
+                <a:sym typeface="Avenir"/>
+              </a:rPr>
+              <a:t>Vectorshape</a:t>
+            </a:r>
+            <a:r>
+              <a:rPr lang="en-US" sz="800" dirty="0">
+                <a:solidFill>
+                  <a:srgbClr val="595959"/>
+                </a:solidFill>
+                <a:latin typeface="Arial" panose="020B0604020202020204" pitchFamily="34" charset="0"/>
+                <a:ea typeface="Avenir"/>
+                <a:cs typeface="Arial" panose="020B0604020202020204" pitchFamily="34" charset="0"/>
+                <a:sym typeface="Avenir"/>
+              </a:rPr>
+              <a:t>/Shutterstock</a:t>
+            </a:r>
+            <a:endParaRPr lang="en-US" sz="800" dirty="0">
+              <a:solidFill>
+                <a:schemeClr val="tx1">
+                  <a:lumMod val="50000"/>
+                  <a:lumOff val="50000"/>
+                </a:schemeClr>
+              </a:solidFill>
+              <a:latin typeface="Arial" panose="020B0604020202020204" pitchFamily="34" charset="0"/>
+              <a:ea typeface="Avenir"/>
+              <a:cs typeface="Arial" panose="020B0604020202020204" pitchFamily="34" charset="0"/>
+              <a:sym typeface="Avenir"/>
+            </a:endParaRPr>
+          </a:p>
+        </p:txBody>
+      </p:sp>
+    </p:spTree>
+    <p:extLst>
+      <p:ext uri="{BB962C8B-B14F-4D97-AF65-F5344CB8AC3E}">
+        <p14:creationId xmlns:p14="http://schemas.microsoft.com/office/powerpoint/2010/main" val="2370629198"/>
+      </p:ext>
+    </p:extLst>
+  </p:cSld>
+  <p:clrMapOvr>
+    <a:masterClrMapping/>
+  </p:clrMapOvr>
+</p:sld>
+</file>
+
+<file path=ppt/slides/slide11.xml><?xml version="1.0" encoding="utf-8"?>
 <p:sld xmlns:a="http://schemas.openxmlformats.org/drawingml/2006/main" xmlns:r="http://schemas.openxmlformats.org/officeDocument/2006/relationships" xmlns:p="http://schemas.openxmlformats.org/presentationml/2006/main">
   <p:cSld>
     <p:spTree>
@@ -5773,7 +6399,7 @@
 </p:sld>
 </file>
 
-<file path=ppt/slides/slide11.xml><?xml version="1.0" encoding="utf-8"?>
+<file path=ppt/slides/slide12.xml><?xml version="1.0" encoding="utf-8"?>
 <p:sld xmlns:a="http://schemas.openxmlformats.org/drawingml/2006/main" xmlns:r="http://schemas.openxmlformats.org/officeDocument/2006/relationships" xmlns:p="http://schemas.openxmlformats.org/presentationml/2006/main">
   <p:cSld>
     <p:spTree>
@@ -6019,7 +6645,7 @@
 </p:sld>
 </file>
 
-<file path=ppt/slides/slide12.xml><?xml version="1.0" encoding="utf-8"?>
+<file path=ppt/slides/slide13.xml><?xml version="1.0" encoding="utf-8"?>
 <p:sld xmlns:a="http://schemas.openxmlformats.org/drawingml/2006/main" xmlns:r="http://schemas.openxmlformats.org/officeDocument/2006/relationships" xmlns:p="http://schemas.openxmlformats.org/presentationml/2006/main">
   <p:cSld>
     <p:spTree>
@@ -6440,7 +7066,7 @@
 </p:sld>
 </file>
 
-<file path=ppt/slides/slide13.xml><?xml version="1.0" encoding="utf-8"?>
+<file path=ppt/slides/slide14.xml><?xml version="1.0" encoding="utf-8"?>
 <p:sld xmlns:a="http://schemas.openxmlformats.org/drawingml/2006/main" xmlns:r="http://schemas.openxmlformats.org/officeDocument/2006/relationships" xmlns:p="http://schemas.openxmlformats.org/presentationml/2006/main">
   <p:cSld>
     <p:spTree>
@@ -7112,7 +7738,7 @@
 </p:sld>
 </file>
 
-<file path=ppt/slides/slide14.xml><?xml version="1.0" encoding="utf-8"?>
+<file path=ppt/slides/slide15.xml><?xml version="1.0" encoding="utf-8"?>
 <p:sld xmlns:a="http://schemas.openxmlformats.org/drawingml/2006/main" xmlns:r="http://schemas.openxmlformats.org/officeDocument/2006/relationships" xmlns:p="http://schemas.openxmlformats.org/presentationml/2006/main">
   <p:cSld>
     <p:spTree>
@@ -7410,7 +8036,7 @@
 </p:sld>
 </file>
 
-<file path=ppt/slides/slide15.xml><?xml version="1.0" encoding="utf-8"?>
+<file path=ppt/slides/slide16.xml><?xml version="1.0" encoding="utf-8"?>
 <p:sld xmlns:a="http://schemas.openxmlformats.org/drawingml/2006/main" xmlns:r="http://schemas.openxmlformats.org/officeDocument/2006/relationships" xmlns:p="http://schemas.openxmlformats.org/presentationml/2006/main">
   <p:cSld>
     <p:spTree>
@@ -7704,7 +8330,7 @@
 </p:sld>
 </file>
 
-<file path=ppt/slides/slide16.xml><?xml version="1.0" encoding="utf-8"?>
+<file path=ppt/slides/slide17.xml><?xml version="1.0" encoding="utf-8"?>
 <p:sld xmlns:a="http://schemas.openxmlformats.org/drawingml/2006/main" xmlns:r="http://schemas.openxmlformats.org/officeDocument/2006/relationships" xmlns:p="http://schemas.openxmlformats.org/presentationml/2006/main">
   <p:cSld>
     <p:spTree>
@@ -8205,7 +8831,7 @@
 </p:sld>
 </file>
 
-<file path=ppt/slides/slide17.xml><?xml version="1.0" encoding="utf-8"?>
+<file path=ppt/slides/slide18.xml><?xml version="1.0" encoding="utf-8"?>
 <p:sld xmlns:a="http://schemas.openxmlformats.org/drawingml/2006/main" xmlns:r="http://schemas.openxmlformats.org/officeDocument/2006/relationships" xmlns:p="http://schemas.openxmlformats.org/presentationml/2006/main">
   <p:cSld>
     <p:spTree>
@@ -8489,7 +9115,7 @@
 </p:sld>
 </file>
 
-<file path=ppt/slides/slide18.xml><?xml version="1.0" encoding="utf-8"?>
+<file path=ppt/slides/slide19.xml><?xml version="1.0" encoding="utf-8"?>
 <p:sld xmlns:a="http://schemas.openxmlformats.org/drawingml/2006/main" xmlns:r="http://schemas.openxmlformats.org/officeDocument/2006/relationships" xmlns:p="http://schemas.openxmlformats.org/presentationml/2006/main">
   <p:cSld>
     <p:spTree>
@@ -9947,6 +10573,73 @@
   <p:cSld>
     <p:spTree>
       <p:nvGrpSpPr>
+        <p:cNvPr id="1" name=""/>
+        <p:cNvGrpSpPr/>
+        <p:nvPr/>
+      </p:nvGrpSpPr>
+      <p:grpSpPr>
+        <a:xfrm>
+          <a:off x="0" y="0"/>
+          <a:ext cx="0" cy="0"/>
+          <a:chOff x="0" y="0"/>
+          <a:chExt cx="0" cy="0"/>
+        </a:xfrm>
+      </p:grpSpPr>
+      <p:pic>
+        <p:nvPicPr>
+          <p:cNvPr id="2" name="Picture 1" descr="A white background with black text&#10;&#10;Description automatically generated">
+            <a:extLst>
+              <a:ext uri="{FF2B5EF4-FFF2-40B4-BE49-F238E27FC236}">
+                <a16:creationId xmlns:a16="http://schemas.microsoft.com/office/drawing/2014/main" id="{AD96B729-F619-A084-44C2-FCC7A5250F30}"/>
+              </a:ext>
+            </a:extLst>
+          </p:cNvPr>
+          <p:cNvPicPr>
+            <a:picLocks noChangeAspect="1"/>
+          </p:cNvPicPr>
+          <p:nvPr/>
+        </p:nvPicPr>
+        <p:blipFill rotWithShape="1">
+          <a:blip r:embed="rId2"/>
+          <a:srcRect b="24585"/>
+          <a:stretch/>
+        </p:blipFill>
+        <p:spPr bwMode="auto">
+          <a:xfrm>
+            <a:off x="-287701" y="1374507"/>
+            <a:ext cx="4680352" cy="1809367"/>
+          </a:xfrm>
+          <a:prstGeom prst="rect">
+            <a:avLst/>
+          </a:prstGeom>
+          <a:ln>
+            <a:noFill/>
+          </a:ln>
+          <a:extLst>
+            <a:ext uri="{53640926-AAD7-44D8-BBD7-CCE9431645EC}">
+              <a14:shadowObscured xmlns:a14="http://schemas.microsoft.com/office/drawing/2010/main"/>
+            </a:ext>
+          </a:extLst>
+        </p:spPr>
+      </p:pic>
+    </p:spTree>
+    <p:extLst>
+      <p:ext uri="{BB962C8B-B14F-4D97-AF65-F5344CB8AC3E}">
+        <p14:creationId xmlns:p14="http://schemas.microsoft.com/office/powerpoint/2010/main" val="3166759269"/>
+      </p:ext>
+    </p:extLst>
+  </p:cSld>
+  <p:clrMapOvr>
+    <a:masterClrMapping/>
+  </p:clrMapOvr>
+</p:sld>
+</file>
+
+<file path=ppt/slides/slide3.xml><?xml version="1.0" encoding="utf-8"?>
+<p:sld xmlns:a="http://schemas.openxmlformats.org/drawingml/2006/main" xmlns:r="http://schemas.openxmlformats.org/officeDocument/2006/relationships" xmlns:p="http://schemas.openxmlformats.org/presentationml/2006/main">
+  <p:cSld>
+    <p:spTree>
+      <p:nvGrpSpPr>
         <p:cNvPr id="1" name="Shape 173"/>
         <p:cNvGrpSpPr/>
         <p:nvPr/>
@@ -10445,108 +11138,19 @@
         </p:nvPicPr>
         <p:blipFill>
           <a:blip r:embed="rId4"/>
-          <a:stretch>
-            <a:fillRect/>
-          </a:stretch>
+          <a:srcRect r="54372"/>
+          <a:stretch/>
         </p:blipFill>
         <p:spPr>
           <a:xfrm>
-            <a:off x="686202" y="3968035"/>
-            <a:ext cx="6870023" cy="1219841"/>
+            <a:off x="2482346" y="4357774"/>
+            <a:ext cx="3134684" cy="1219841"/>
           </a:xfrm>
           <a:prstGeom prst="rect">
             <a:avLst/>
           </a:prstGeom>
         </p:spPr>
       </p:pic>
-      <p:sp>
-        <p:nvSpPr>
-          <p:cNvPr id="7" name="Rounded Rectangle 6">
-            <a:extLst>
-              <a:ext uri="{FF2B5EF4-FFF2-40B4-BE49-F238E27FC236}">
-                <a16:creationId xmlns:a16="http://schemas.microsoft.com/office/drawing/2014/main" id="{D2050617-67D1-BB84-DF8A-1209E459E5AD}"/>
-              </a:ext>
-            </a:extLst>
-          </p:cNvPr>
-          <p:cNvSpPr/>
-          <p:nvPr/>
-        </p:nvSpPr>
-        <p:spPr>
-          <a:xfrm>
-            <a:off x="779436" y="5461436"/>
-            <a:ext cx="5830077" cy="585255"/>
-          </a:xfrm>
-          <a:prstGeom prst="roundRect">
-            <a:avLst/>
-          </a:prstGeom>
-          <a:noFill/>
-          <a:ln w="12700">
-            <a:solidFill>
-              <a:schemeClr val="tx1">
-                <a:lumMod val="50000"/>
-                <a:lumOff val="50000"/>
-              </a:schemeClr>
-            </a:solidFill>
-          </a:ln>
-        </p:spPr>
-        <p:style>
-          <a:lnRef idx="2">
-            <a:schemeClr val="accent1">
-              <a:shade val="50000"/>
-            </a:schemeClr>
-          </a:lnRef>
-          <a:fillRef idx="1">
-            <a:schemeClr val="accent1"/>
-          </a:fillRef>
-          <a:effectRef idx="0">
-            <a:schemeClr val="accent1"/>
-          </a:effectRef>
-          <a:fontRef idx="minor">
-            <a:schemeClr val="lt1"/>
-          </a:fontRef>
-        </p:style>
-        <p:txBody>
-          <a:bodyPr rtlCol="0" anchor="ctr"/>
-          <a:lstStyle/>
-          <a:p>
-            <a:pPr>
-              <a:spcAft>
-                <a:spcPts val="300"/>
-              </a:spcAft>
-            </a:pPr>
-            <a:r>
-              <a:rPr lang="x-none" sz="1200" b="1" dirty="0">
-                <a:solidFill>
-                  <a:srgbClr val="137F97"/>
-                </a:solidFill>
-              </a:rPr>
-              <a:t>STUDY TIP</a:t>
-            </a:r>
-            <a:endParaRPr lang="en-IN" sz="1200" b="1" dirty="0">
-              <a:solidFill>
-                <a:srgbClr val="137F97"/>
-              </a:solidFill>
-            </a:endParaRPr>
-          </a:p>
-          <a:p>
-            <a:r>
-              <a:rPr lang="en-US" sz="1200" dirty="0">
-                <a:solidFill>
-                  <a:srgbClr val="000000"/>
-                </a:solidFill>
-              </a:rPr>
-              <a:t>Be sure to check the products for every pair of values before drawing a conclusion.</a:t>
-            </a:r>
-            <a:endParaRPr lang="en-IN" sz="1200" dirty="0">
-              <a:solidFill>
-                <a:srgbClr val="000000"/>
-              </a:solidFill>
-              <a:latin typeface="Arial" panose="020B0604020202020204" pitchFamily="34" charset="0"/>
-              <a:cs typeface="Arial" panose="020B0604020202020204" pitchFamily="34" charset="0"/>
-            </a:endParaRPr>
-          </a:p>
-        </p:txBody>
-      </p:sp>
     </p:spTree>
     <p:extLst>
       <p:ext uri="{BB962C8B-B14F-4D97-AF65-F5344CB8AC3E}">
@@ -10560,7 +11164,7 @@
 </p:sld>
 </file>
 
-<file path=ppt/slides/slide3.xml><?xml version="1.0" encoding="utf-8"?>
+<file path=ppt/slides/slide4.xml><?xml version="1.0" encoding="utf-8"?>
 <p:sld xmlns:a="http://schemas.openxmlformats.org/drawingml/2006/main" xmlns:r="http://schemas.openxmlformats.org/officeDocument/2006/relationships" xmlns:p="http://schemas.openxmlformats.org/presentationml/2006/main">
   <p:cSld>
     <p:spTree>
@@ -10858,7 +11462,7 @@
 </p:sld>
 </file>
 
-<file path=ppt/slides/slide4.xml><?xml version="1.0" encoding="utf-8"?>
+<file path=ppt/slides/slide5.xml><?xml version="1.0" encoding="utf-8"?>
 <p:sld xmlns:a="http://schemas.openxmlformats.org/drawingml/2006/main" xmlns:r="http://schemas.openxmlformats.org/officeDocument/2006/relationships" xmlns:p="http://schemas.openxmlformats.org/presentationml/2006/main">
   <p:cSld>
     <p:spTree>
@@ -11137,7 +11741,7 @@
 </p:sld>
 </file>
 
-<file path=ppt/slides/slide5.xml><?xml version="1.0" encoding="utf-8"?>
+<file path=ppt/slides/slide6.xml><?xml version="1.0" encoding="utf-8"?>
 <p:sld xmlns:a="http://schemas.openxmlformats.org/drawingml/2006/main" xmlns:r="http://schemas.openxmlformats.org/officeDocument/2006/relationships" xmlns:p="http://schemas.openxmlformats.org/presentationml/2006/main">
   <p:cSld>
     <p:spTree>
@@ -11454,7 +12058,7 @@
 </p:sld>
 </file>
 
-<file path=ppt/slides/slide6.xml><?xml version="1.0" encoding="utf-8"?>
+<file path=ppt/slides/slide7.xml><?xml version="1.0" encoding="utf-8"?>
 <p:sld xmlns:a="http://schemas.openxmlformats.org/drawingml/2006/main" xmlns:r="http://schemas.openxmlformats.org/officeDocument/2006/relationships" xmlns:p="http://schemas.openxmlformats.org/presentationml/2006/main">
   <p:cSld>
     <p:spTree>
@@ -12036,7 +12640,7 @@
 </p:sld>
 </file>
 
-<file path=ppt/slides/slide7.xml><?xml version="1.0" encoding="utf-8"?>
+<file path=ppt/slides/slide8.xml><?xml version="1.0" encoding="utf-8"?>
 <p:sld xmlns:a="http://schemas.openxmlformats.org/drawingml/2006/main" xmlns:r="http://schemas.openxmlformats.org/officeDocument/2006/relationships" xmlns:p="http://schemas.openxmlformats.org/presentationml/2006/main">
   <p:cSld>
     <p:spTree>
@@ -12344,7 +12948,7 @@
 </p:sld>
 </file>
 
-<file path=ppt/slides/slide8.xml><?xml version="1.0" encoding="utf-8"?>
+<file path=ppt/slides/slide9.xml><?xml version="1.0" encoding="utf-8"?>
 <p:sld xmlns:a="http://schemas.openxmlformats.org/drawingml/2006/main" xmlns:r="http://schemas.openxmlformats.org/officeDocument/2006/relationships" xmlns:p="http://schemas.openxmlformats.org/presentationml/2006/main">
   <p:cSld>
     <p:spTree>
@@ -12684,350 +13288,6 @@
     <p:extLst>
       <p:ext uri="{BB962C8B-B14F-4D97-AF65-F5344CB8AC3E}">
         <p14:creationId xmlns:p14="http://schemas.microsoft.com/office/powerpoint/2010/main" val="3956362638"/>
-      </p:ext>
-    </p:extLst>
-  </p:cSld>
-  <p:clrMapOvr>
-    <a:masterClrMapping/>
-  </p:clrMapOvr>
-</p:sld>
-</file>
-
-<file path=ppt/slides/slide9.xml><?xml version="1.0" encoding="utf-8"?>
-<p:sld xmlns:a="http://schemas.openxmlformats.org/drawingml/2006/main" xmlns:r="http://schemas.openxmlformats.org/officeDocument/2006/relationships" xmlns:p="http://schemas.openxmlformats.org/presentationml/2006/main">
-  <p:cSld>
-    <p:spTree>
-      <p:nvGrpSpPr>
-        <p:cNvPr id="1" name="Shape 173"/>
-        <p:cNvGrpSpPr/>
-        <p:nvPr/>
-      </p:nvGrpSpPr>
-      <p:grpSpPr>
-        <a:xfrm>
-          <a:off x="0" y="0"/>
-          <a:ext cx="0" cy="0"/>
-          <a:chOff x="0" y="0"/>
-          <a:chExt cx="0" cy="0"/>
-        </a:xfrm>
-      </p:grpSpPr>
-      <p:pic>
-        <p:nvPicPr>
-          <p:cNvPr id="3" name="Picture 2" descr="Screen Shot 2022-04-07 at 1.01.16 PM.png"/>
-          <p:cNvPicPr>
-            <a:picLocks noChangeAspect="1"/>
-          </p:cNvPicPr>
-          <p:nvPr/>
-        </p:nvPicPr>
-        <p:blipFill>
-          <a:blip r:embed="rId3">
-            <a:extLst>
-              <a:ext uri="{28A0092B-C50C-407E-A947-70E740481C1C}">
-                <a14:useLocalDpi xmlns:a14="http://schemas.microsoft.com/office/drawing/2010/main" val="0"/>
-              </a:ext>
-            </a:extLst>
-          </a:blip>
-          <a:stretch>
-            <a:fillRect/>
-          </a:stretch>
-        </p:blipFill>
-        <p:spPr>
-          <a:xfrm>
-            <a:off x="1829983" y="1461640"/>
-            <a:ext cx="4369926" cy="2349731"/>
-          </a:xfrm>
-          <a:prstGeom prst="rect">
-            <a:avLst/>
-          </a:prstGeom>
-        </p:spPr>
-      </p:pic>
-      <p:sp>
-        <p:nvSpPr>
-          <p:cNvPr id="5" name="TextBox 4">
-            <a:extLst>
-              <a:ext uri="{FF2B5EF4-FFF2-40B4-BE49-F238E27FC236}">
-                <a16:creationId xmlns:a16="http://schemas.microsoft.com/office/drawing/2014/main" id="{6E8F0502-F26D-4842-97A7-E6A7B55ABA0B}"/>
-              </a:ext>
-            </a:extLst>
-          </p:cNvPr>
-          <p:cNvSpPr txBox="1"/>
-          <p:nvPr/>
-        </p:nvSpPr>
-        <p:spPr>
-          <a:xfrm>
-            <a:off x="355758" y="706927"/>
-            <a:ext cx="8321209" cy="990015"/>
-          </a:xfrm>
-          <a:prstGeom prst="rect">
-            <a:avLst/>
-          </a:prstGeom>
-          <a:noFill/>
-        </p:spPr>
-        <p:txBody>
-          <a:bodyPr wrap="square" rIns="36000" rtlCol="0">
-            <a:spAutoFit/>
-          </a:bodyPr>
-          <a:lstStyle/>
-          <a:p>
-            <a:pPr>
-              <a:spcAft>
-                <a:spcPts val="1000"/>
-              </a:spcAft>
-              <a:tabLst>
-                <a:tab pos="1584000" algn="l"/>
-              </a:tabLst>
-            </a:pPr>
-            <a:r>
-              <a:rPr lang="en-IN" sz="1800" b="1" dirty="0">
-                <a:solidFill>
-                  <a:srgbClr val="0078AE"/>
-                </a:solidFill>
-              </a:rPr>
-              <a:t>	</a:t>
-            </a:r>
-            <a:r>
-              <a:rPr lang="de-DE" sz="1800" b="1" dirty="0">
-                <a:solidFill>
-                  <a:srgbClr val="58585A"/>
-                </a:solidFill>
-              </a:rPr>
-              <a:t>Use an Inverse Variation Model</a:t>
-            </a:r>
-            <a:endParaRPr lang="en-US" sz="1800" b="1" dirty="0">
-              <a:solidFill>
-                <a:srgbClr val="58585A"/>
-              </a:solidFill>
-            </a:endParaRPr>
-          </a:p>
-          <a:p>
-            <a:pPr>
-              <a:spcAft>
-                <a:spcPts val="16800"/>
-              </a:spcAft>
-            </a:pPr>
-            <a:r>
-              <a:rPr lang="en-US" sz="1600" b="1" dirty="0"/>
-              <a:t>On a Greek bouzouki, the string length </a:t>
-            </a:r>
-            <a:r>
-              <a:rPr lang="en-US" sz="1600" b="1" i="1" dirty="0"/>
-              <a:t>s</a:t>
-            </a:r>
-            <a:r>
-              <a:rPr lang="en-US" sz="1600" b="1" dirty="0"/>
-              <a:t> varies inversely with the </a:t>
-            </a:r>
-            <a:br>
-              <a:rPr lang="en-US" sz="1600" b="1" dirty="0"/>
-            </a:br>
-            <a:r>
-              <a:rPr lang="en-US" sz="1600" b="1" dirty="0"/>
-              <a:t>frequency </a:t>
-            </a:r>
-            <a:r>
-              <a:rPr lang="en-US" sz="1600" b="1" i="1" dirty="0"/>
-              <a:t>f</a:t>
-            </a:r>
-            <a:r>
-              <a:rPr lang="en-US" sz="1600" b="1" dirty="0"/>
-              <a:t> of its vibrations.</a:t>
-            </a:r>
-          </a:p>
-        </p:txBody>
-      </p:sp>
-      <p:sp>
-        <p:nvSpPr>
-          <p:cNvPr id="6" name="Rectangle 5">
-            <a:extLst>
-              <a:ext uri="{FF2B5EF4-FFF2-40B4-BE49-F238E27FC236}">
-                <a16:creationId xmlns:a16="http://schemas.microsoft.com/office/drawing/2014/main" id="{33341DDE-51A7-BB4A-A5D0-B99BDB557C68}"/>
-              </a:ext>
-            </a:extLst>
-          </p:cNvPr>
-          <p:cNvSpPr/>
-          <p:nvPr/>
-        </p:nvSpPr>
-        <p:spPr>
-          <a:xfrm>
-            <a:off x="452746" y="749488"/>
-            <a:ext cx="1480557" cy="295175"/>
-          </a:xfrm>
-          <a:prstGeom prst="rect">
-            <a:avLst/>
-          </a:prstGeom>
-          <a:solidFill>
-            <a:srgbClr val="1A4F8D"/>
-          </a:solidFill>
-          <a:ln>
-            <a:noFill/>
-          </a:ln>
-        </p:spPr>
-        <p:style>
-          <a:lnRef idx="2">
-            <a:schemeClr val="accent1">
-              <a:shade val="50000"/>
-            </a:schemeClr>
-          </a:lnRef>
-          <a:fillRef idx="1">
-            <a:schemeClr val="accent1"/>
-          </a:fillRef>
-          <a:effectRef idx="0">
-            <a:schemeClr val="accent1"/>
-          </a:effectRef>
-          <a:fontRef idx="minor">
-            <a:schemeClr val="lt1"/>
-          </a:fontRef>
-        </p:style>
-        <p:txBody>
-          <a:bodyPr wrap="square" tIns="0" bIns="18000" rtlCol="0" anchor="ctr">
-            <a:spAutoFit/>
-          </a:bodyPr>
-          <a:lstStyle/>
-          <a:p>
-            <a:r>
-              <a:rPr lang="en-IN" sz="1800" b="1" cap="all" dirty="0">
-                <a:solidFill>
-                  <a:schemeClr val="bg1"/>
-                </a:solidFill>
-              </a:rPr>
-              <a:t>Example 3</a:t>
-            </a:r>
-            <a:endParaRPr lang="en-US" sz="1800" cap="all" dirty="0"/>
-          </a:p>
-        </p:txBody>
-      </p:sp>
-      <p:sp>
-        <p:nvSpPr>
-          <p:cNvPr id="8" name="TextBox 7">
-            <a:extLst>
-              <a:ext uri="{FF2B5EF4-FFF2-40B4-BE49-F238E27FC236}">
-                <a16:creationId xmlns:a16="http://schemas.microsoft.com/office/drawing/2014/main" id="{E2AF600D-6F8E-AF4F-9F8A-7A6BE3BFBF7F}"/>
-              </a:ext>
-            </a:extLst>
-          </p:cNvPr>
-          <p:cNvSpPr txBox="1"/>
-          <p:nvPr/>
-        </p:nvSpPr>
-        <p:spPr>
-          <a:xfrm>
-            <a:off x="355758" y="351588"/>
-            <a:ext cx="8341433" cy="369332"/>
-          </a:xfrm>
-          <a:prstGeom prst="rect">
-            <a:avLst/>
-          </a:prstGeom>
-          <a:noFill/>
-        </p:spPr>
-        <p:txBody>
-          <a:bodyPr wrap="square" rIns="36000" rtlCol="0">
-            <a:spAutoFit/>
-          </a:bodyPr>
-          <a:lstStyle/>
-          <a:p>
-            <a:r>
-              <a:rPr lang="en-IN" sz="1800" b="1" dirty="0">
-                <a:solidFill>
-                  <a:srgbClr val="137F97"/>
-                </a:solidFill>
-              </a:rPr>
-              <a:t>APPLICATION</a:t>
-            </a:r>
-            <a:endParaRPr lang="en-IN" sz="1800" dirty="0">
-              <a:solidFill>
-                <a:srgbClr val="137F97"/>
-              </a:solidFill>
-            </a:endParaRPr>
-          </a:p>
-        </p:txBody>
-      </p:sp>
-      <p:sp>
-        <p:nvSpPr>
-          <p:cNvPr id="2" name="Google Shape;195;g10c86f8f910_0_5">
-            <a:extLst>
-              <a:ext uri="{FF2B5EF4-FFF2-40B4-BE49-F238E27FC236}">
-                <a16:creationId xmlns:a16="http://schemas.microsoft.com/office/drawing/2014/main" id="{24C7DF14-301A-91C8-0A63-2BA080B601D5}"/>
-              </a:ext>
-            </a:extLst>
-          </p:cNvPr>
-          <p:cNvSpPr/>
-          <p:nvPr/>
-        </p:nvSpPr>
-        <p:spPr>
-          <a:xfrm>
-            <a:off x="280675" y="6385788"/>
-            <a:ext cx="8614500" cy="165000"/>
-          </a:xfrm>
-          <a:prstGeom prst="rect">
-            <a:avLst/>
-          </a:prstGeom>
-          <a:noFill/>
-          <a:ln>
-            <a:noFill/>
-          </a:ln>
-        </p:spPr>
-        <p:txBody>
-          <a:bodyPr spcFirstLastPara="1" wrap="square" lIns="91425" tIns="45700" rIns="91425" bIns="45700" anchor="t" anchorCtr="0">
-            <a:noAutofit/>
-          </a:bodyPr>
-          <a:lstStyle/>
-          <a:p>
-            <a:pPr lvl="0" algn="ctr">
-              <a:buSzPts val="1800"/>
-            </a:pPr>
-            <a:r>
-              <a:rPr lang="en-US" sz="800" dirty="0">
-                <a:solidFill>
-                  <a:srgbClr val="595959"/>
-                </a:solidFill>
-                <a:latin typeface="Arial" panose="020B0604020202020204" pitchFamily="34" charset="0"/>
-                <a:ea typeface="Avenir"/>
-                <a:cs typeface="Arial" panose="020B0604020202020204" pitchFamily="34" charset="0"/>
-                <a:sym typeface="Avenir"/>
-              </a:rPr>
-              <a:t>Photo credit: </a:t>
-            </a:r>
-            <a:r>
-              <a:rPr lang="en-US" sz="800" dirty="0" err="1">
-                <a:solidFill>
-                  <a:srgbClr val="595959"/>
-                </a:solidFill>
-                <a:latin typeface="Arial" panose="020B0604020202020204" pitchFamily="34" charset="0"/>
-                <a:ea typeface="Avenir"/>
-                <a:cs typeface="Arial" panose="020B0604020202020204" pitchFamily="34" charset="0"/>
-                <a:sym typeface="Avenir"/>
-              </a:rPr>
-              <a:t>Vectorshape</a:t>
-            </a:r>
-            <a:r>
-              <a:rPr lang="en-US" sz="800" dirty="0">
-                <a:solidFill>
-                  <a:srgbClr val="595959"/>
-                </a:solidFill>
-                <a:latin typeface="Arial" panose="020B0604020202020204" pitchFamily="34" charset="0"/>
-                <a:ea typeface="Avenir"/>
-                <a:cs typeface="Arial" panose="020B0604020202020204" pitchFamily="34" charset="0"/>
-                <a:sym typeface="Avenir"/>
-              </a:rPr>
-              <a:t>/Shutterstock</a:t>
-            </a:r>
-            <a:endParaRPr lang="en-US" sz="800" dirty="0">
-              <a:solidFill>
-                <a:schemeClr val="tx1">
-                  <a:lumMod val="50000"/>
-                  <a:lumOff val="50000"/>
-                </a:schemeClr>
-              </a:solidFill>
-              <a:latin typeface="Arial" panose="020B0604020202020204" pitchFamily="34" charset="0"/>
-              <a:ea typeface="Avenir"/>
-              <a:cs typeface="Arial" panose="020B0604020202020204" pitchFamily="34" charset="0"/>
-              <a:sym typeface="Avenir"/>
-            </a:endParaRPr>
-          </a:p>
-        </p:txBody>
-      </p:sp>
-    </p:spTree>
-    <p:extLst>
-      <p:ext uri="{BB962C8B-B14F-4D97-AF65-F5344CB8AC3E}">
-        <p14:creationId xmlns:p14="http://schemas.microsoft.com/office/powerpoint/2010/main" val="2370629198"/>
       </p:ext>
     </p:extLst>
   </p:cSld>

</xml_diff>

<commit_message>
L4-1 docx&pptx final form.  Pre L4-2 inclass presentation (already printed L4-2.docx)
</commit_message>
<xml_diff>
--- a/L4-1.pptx
+++ b/L4-1.pptx
@@ -275,7 +275,7 @@
       </p15:sldGuideLst>
     </p:ext>
     <p:ext uri="http://customooxmlschemas.google.com/">
-      <go:slidesCustomData xmlns:go="http://customooxmlschemas.google.com/" xmlns:ahyp="http://schemas.microsoft.com/office/drawing/2018/hyperlinkcolor" xmlns:p15="http://schemas.microsoft.com/office/powerpoint/2012/main" xmlns:p14="http://schemas.microsoft.com/office/powerpoint/2010/main" xmlns:com="http://schemas.openxmlformats.org/drawingml/2006/compatibility" xmlns:pvml="urn:schemas-microsoft-com:office:powerpoint" xmlns:v="urn:schemas-microsoft-com:vml" xmlns:o="urn:schemas-microsoft-com:office:office" xmlns:dgm="http://schemas.openxmlformats.org/drawingml/2006/diagram" xmlns:c="http://schemas.openxmlformats.org/drawingml/2006/chart" xmlns:mv="urn:schemas-microsoft-com:mac:vml" xmlns:mc="http://schemas.openxmlformats.org/markup-compatibility/2006" xmlns="" r:id="rId29" roundtripDataSignature="AMtx7mhuBirG7ZPSvPNLrAnDSwPhBAMDZQ=="/>
+      <go:slidesCustomData xmlns="" xmlns:mc="http://schemas.openxmlformats.org/markup-compatibility/2006" xmlns:mv="urn:schemas-microsoft-com:mac:vml" xmlns:c="http://schemas.openxmlformats.org/drawingml/2006/chart" xmlns:dgm="http://schemas.openxmlformats.org/drawingml/2006/diagram" xmlns:o="urn:schemas-microsoft-com:office:office" xmlns:v="urn:schemas-microsoft-com:vml" xmlns:pvml="urn:schemas-microsoft-com:office:powerpoint" xmlns:com="http://schemas.openxmlformats.org/drawingml/2006/compatibility" xmlns:p14="http://schemas.microsoft.com/office/powerpoint/2010/main" xmlns:p15="http://schemas.microsoft.com/office/powerpoint/2012/main" xmlns:ahyp="http://schemas.microsoft.com/office/drawing/2018/hyperlinkcolor" xmlns:go="http://customooxmlschemas.google.com/" r:id="rId29" roundtripDataSignature="AMtx7mhuBirG7ZPSvPNLrAnDSwPhBAMDZQ=="/>
     </p:ext>
   </p:extLst>
 </p:presentation>
@@ -284,7 +284,7 @@
 <file path=ppt/revisionInfo.xml><?xml version="1.0" encoding="utf-8"?>
 <p1510:revInfo xmlns:a="http://schemas.openxmlformats.org/drawingml/2006/main" xmlns:r="http://schemas.openxmlformats.org/officeDocument/2006/relationships" xmlns:p1510="http://schemas.microsoft.com/office/powerpoint/2015/10/main">
   <p1510:revLst>
-    <p1510:client id="{8EA9600F-9558-4455-AFBB-BDC15B20C410}" v="36" dt="2025-02-27T16:33:03.045"/>
+    <p1510:client id="{8EA9600F-9558-4455-AFBB-BDC15B20C410}" v="37" dt="2025-03-04T18:31:31.208"/>
   </p1510:revLst>
 </p1510:revInfo>
 </file>
@@ -294,7 +294,7 @@
   <pc:docChgLst>
     <pc:chgData name="Colson, Robert" userId="25586c2a-52f0-4ea1-8d29-b1cb0db384a0" providerId="ADAL" clId="{8EA9600F-9558-4455-AFBB-BDC15B20C410}"/>
     <pc:docChg chg="undo custSel addSld delSld modSld sldOrd">
-      <pc:chgData name="Colson, Robert" userId="25586c2a-52f0-4ea1-8d29-b1cb0db384a0" providerId="ADAL" clId="{8EA9600F-9558-4455-AFBB-BDC15B20C410}" dt="2025-03-03T16:04:43.035" v="122" actId="20577"/>
+      <pc:chgData name="Colson, Robert" userId="25586c2a-52f0-4ea1-8d29-b1cb0db384a0" providerId="ADAL" clId="{8EA9600F-9558-4455-AFBB-BDC15B20C410}" dt="2025-03-06T16:29:56.826" v="187" actId="403"/>
       <pc:docMkLst>
         <pc:docMk/>
       </pc:docMkLst>
@@ -313,21 +313,37 @@
         </pc:sldMkLst>
       </pc:sldChg>
       <pc:sldChg chg="delSp modSp mod">
-        <pc:chgData name="Colson, Robert" userId="25586c2a-52f0-4ea1-8d29-b1cb0db384a0" providerId="ADAL" clId="{8EA9600F-9558-4455-AFBB-BDC15B20C410}" dt="2025-03-03T15:22:12.556" v="117" actId="1076"/>
+        <pc:chgData name="Colson, Robert" userId="25586c2a-52f0-4ea1-8d29-b1cb0db384a0" providerId="ADAL" clId="{8EA9600F-9558-4455-AFBB-BDC15B20C410}" dt="2025-03-05T16:41:59.812" v="144" actId="20577"/>
         <pc:sldMkLst>
           <pc:docMk/>
           <pc:sldMk cId="1099024985" sldId="263"/>
         </pc:sldMkLst>
-        <pc:spChg chg="del">
-          <ac:chgData name="Colson, Robert" userId="25586c2a-52f0-4ea1-8d29-b1cb0db384a0" providerId="ADAL" clId="{8EA9600F-9558-4455-AFBB-BDC15B20C410}" dt="2025-03-03T15:21:49.845" v="115" actId="478"/>
+        <pc:spChg chg="mod">
+          <ac:chgData name="Colson, Robert" userId="25586c2a-52f0-4ea1-8d29-b1cb0db384a0" providerId="ADAL" clId="{8EA9600F-9558-4455-AFBB-BDC15B20C410}" dt="2025-03-05T16:41:59.812" v="144" actId="20577"/>
           <ac:spMkLst>
             <pc:docMk/>
             <pc:sldMk cId="1099024985" sldId="263"/>
-            <ac:spMk id="7" creationId="{D2050617-67D1-BB84-DF8A-1209E459E5AD}"/>
+            <ac:spMk id="14" creationId="{6E8F0502-F26D-4842-97A7-E6A7B55ABA0B}"/>
           </ac:spMkLst>
         </pc:spChg>
+        <pc:spChg chg="mod">
+          <ac:chgData name="Colson, Robert" userId="25586c2a-52f0-4ea1-8d29-b1cb0db384a0" providerId="ADAL" clId="{8EA9600F-9558-4455-AFBB-BDC15B20C410}" dt="2025-03-04T19:13:09.082" v="136" actId="790"/>
+          <ac:spMkLst>
+            <pc:docMk/>
+            <pc:sldMk cId="1099024985" sldId="263"/>
+            <ac:spMk id="15" creationId="{33341DDE-51A7-BB4A-A5D0-B99BDB557C68}"/>
+          </ac:spMkLst>
+        </pc:spChg>
+        <pc:graphicFrameChg chg="modGraphic">
+          <ac:chgData name="Colson, Robert" userId="25586c2a-52f0-4ea1-8d29-b1cb0db384a0" providerId="ADAL" clId="{8EA9600F-9558-4455-AFBB-BDC15B20C410}" dt="2025-03-04T19:13:09.082" v="136" actId="790"/>
+          <ac:graphicFrameMkLst>
+            <pc:docMk/>
+            <pc:sldMk cId="1099024985" sldId="263"/>
+            <ac:graphicFrameMk id="3" creationId="{069A29FC-C154-9D4D-B7D9-3B00886A339A}"/>
+          </ac:graphicFrameMkLst>
+        </pc:graphicFrameChg>
         <pc:picChg chg="mod modCrop">
-          <ac:chgData name="Colson, Robert" userId="25586c2a-52f0-4ea1-8d29-b1cb0db384a0" providerId="ADAL" clId="{8EA9600F-9558-4455-AFBB-BDC15B20C410}" dt="2025-03-03T15:22:12.556" v="117" actId="1076"/>
+          <ac:chgData name="Colson, Robert" userId="25586c2a-52f0-4ea1-8d29-b1cb0db384a0" providerId="ADAL" clId="{8EA9600F-9558-4455-AFBB-BDC15B20C410}" dt="2025-03-05T16:41:42.410" v="140" actId="1076"/>
           <ac:picMkLst>
             <pc:docMk/>
             <pc:sldMk cId="1099024985" sldId="263"/>
@@ -349,66 +365,324 @@
           <pc:sldMk cId="1389967839" sldId="274"/>
         </pc:sldMkLst>
       </pc:sldChg>
+      <pc:sldChg chg="modSp mod">
+        <pc:chgData name="Colson, Robert" userId="25586c2a-52f0-4ea1-8d29-b1cb0db384a0" providerId="ADAL" clId="{8EA9600F-9558-4455-AFBB-BDC15B20C410}" dt="2025-03-04T19:13:09.082" v="136" actId="790"/>
+        <pc:sldMkLst>
+          <pc:docMk/>
+          <pc:sldMk cId="2346685495" sldId="283"/>
+        </pc:sldMkLst>
+        <pc:spChg chg="mod">
+          <ac:chgData name="Colson, Robert" userId="25586c2a-52f0-4ea1-8d29-b1cb0db384a0" providerId="ADAL" clId="{8EA9600F-9558-4455-AFBB-BDC15B20C410}" dt="2025-03-04T19:13:09.082" v="136" actId="790"/>
+          <ac:spMkLst>
+            <pc:docMk/>
+            <pc:sldMk cId="2346685495" sldId="283"/>
+            <ac:spMk id="28" creationId="{7D1F45AF-857E-9C16-7605-271B8B8F524C}"/>
+          </ac:spMkLst>
+        </pc:spChg>
+        <pc:graphicFrameChg chg="modGraphic">
+          <ac:chgData name="Colson, Robert" userId="25586c2a-52f0-4ea1-8d29-b1cb0db384a0" providerId="ADAL" clId="{8EA9600F-9558-4455-AFBB-BDC15B20C410}" dt="2025-03-04T19:13:09.082" v="136" actId="790"/>
+          <ac:graphicFrameMkLst>
+            <pc:docMk/>
+            <pc:sldMk cId="2346685495" sldId="283"/>
+            <ac:graphicFrameMk id="69" creationId="{14CFF629-5891-302D-D872-D0C0491EA797}"/>
+          </ac:graphicFrameMkLst>
+        </pc:graphicFrameChg>
+      </pc:sldChg>
       <pc:sldChg chg="delSp modSp mod">
-        <pc:chgData name="Colson, Robert" userId="25586c2a-52f0-4ea1-8d29-b1cb0db384a0" providerId="ADAL" clId="{8EA9600F-9558-4455-AFBB-BDC15B20C410}" dt="2025-02-25T16:33:27.350" v="11" actId="20577"/>
+        <pc:chgData name="Colson, Robert" userId="25586c2a-52f0-4ea1-8d29-b1cb0db384a0" providerId="ADAL" clId="{8EA9600F-9558-4455-AFBB-BDC15B20C410}" dt="2025-03-04T19:13:09.082" v="136" actId="790"/>
         <pc:sldMkLst>
           <pc:docMk/>
           <pc:sldMk cId="1472477715" sldId="293"/>
         </pc:sldMkLst>
         <pc:spChg chg="mod">
-          <ac:chgData name="Colson, Robert" userId="25586c2a-52f0-4ea1-8d29-b1cb0db384a0" providerId="ADAL" clId="{8EA9600F-9558-4455-AFBB-BDC15B20C410}" dt="2025-02-25T16:33:27.350" v="11" actId="20577"/>
+          <ac:chgData name="Colson, Robert" userId="25586c2a-52f0-4ea1-8d29-b1cb0db384a0" providerId="ADAL" clId="{8EA9600F-9558-4455-AFBB-BDC15B20C410}" dt="2025-03-04T19:13:09.082" v="136" actId="790"/>
           <ac:spMkLst>
             <pc:docMk/>
             <pc:sldMk cId="1472477715" sldId="293"/>
             <ac:spMk id="5" creationId="{6E8F0502-F26D-4842-97A7-E6A7B55ABA0B}"/>
           </ac:spMkLst>
         </pc:spChg>
+        <pc:spChg chg="mod">
+          <ac:chgData name="Colson, Robert" userId="25586c2a-52f0-4ea1-8d29-b1cb0db384a0" providerId="ADAL" clId="{8EA9600F-9558-4455-AFBB-BDC15B20C410}" dt="2025-03-04T19:13:09.082" v="136" actId="790"/>
+          <ac:spMkLst>
+            <pc:docMk/>
+            <pc:sldMk cId="1472477715" sldId="293"/>
+            <ac:spMk id="6" creationId="{33341DDE-51A7-BB4A-A5D0-B99BDB557C68}"/>
+          </ac:spMkLst>
+        </pc:spChg>
+      </pc:sldChg>
+      <pc:sldChg chg="delSp modSp mod">
+        <pc:chgData name="Colson, Robert" userId="25586c2a-52f0-4ea1-8d29-b1cb0db384a0" providerId="ADAL" clId="{8EA9600F-9558-4455-AFBB-BDC15B20C410}" dt="2025-03-05T17:15:29.127" v="175" actId="14100"/>
+        <pc:sldMkLst>
+          <pc:docMk/>
+          <pc:sldMk cId="2070107329" sldId="332"/>
+        </pc:sldMkLst>
+        <pc:spChg chg="mod">
+          <ac:chgData name="Colson, Robert" userId="25586c2a-52f0-4ea1-8d29-b1cb0db384a0" providerId="ADAL" clId="{8EA9600F-9558-4455-AFBB-BDC15B20C410}" dt="2025-03-05T17:14:59.088" v="148" actId="404"/>
+          <ac:spMkLst>
+            <pc:docMk/>
+            <pc:sldMk cId="2070107329" sldId="332"/>
+            <ac:spMk id="4" creationId="{6E8F0502-F26D-4842-97A7-E6A7B55ABA0B}"/>
+          </ac:spMkLst>
+        </pc:spChg>
+        <pc:spChg chg="mod">
+          <ac:chgData name="Colson, Robert" userId="25586c2a-52f0-4ea1-8d29-b1cb0db384a0" providerId="ADAL" clId="{8EA9600F-9558-4455-AFBB-BDC15B20C410}" dt="2025-03-04T19:13:09.082" v="136" actId="790"/>
+          <ac:spMkLst>
+            <pc:docMk/>
+            <pc:sldMk cId="2070107329" sldId="332"/>
+            <ac:spMk id="7" creationId="{33341DDE-51A7-BB4A-A5D0-B99BDB557C68}"/>
+          </ac:spMkLst>
+        </pc:spChg>
+        <pc:picChg chg="mod modCrop">
+          <ac:chgData name="Colson, Robert" userId="25586c2a-52f0-4ea1-8d29-b1cb0db384a0" providerId="ADAL" clId="{8EA9600F-9558-4455-AFBB-BDC15B20C410}" dt="2025-03-04T16:28:32.393" v="125" actId="732"/>
+          <ac:picMkLst>
+            <pc:docMk/>
+            <pc:sldMk cId="2070107329" sldId="332"/>
+            <ac:picMk id="9" creationId="{9594DDC7-ACA0-2033-B657-8DAD90788321}"/>
+          </ac:picMkLst>
+        </pc:picChg>
+        <pc:picChg chg="mod modCrop">
+          <ac:chgData name="Colson, Robert" userId="25586c2a-52f0-4ea1-8d29-b1cb0db384a0" providerId="ADAL" clId="{8EA9600F-9558-4455-AFBB-BDC15B20C410}" dt="2025-03-05T17:15:08.997" v="151" actId="1076"/>
+          <ac:picMkLst>
+            <pc:docMk/>
+            <pc:sldMk cId="2070107329" sldId="332"/>
+            <ac:picMk id="11" creationId="{5B16DF89-F311-A3AA-421C-4F08F077B303}"/>
+          </ac:picMkLst>
+        </pc:picChg>
+        <pc:picChg chg="mod">
+          <ac:chgData name="Colson, Robert" userId="25586c2a-52f0-4ea1-8d29-b1cb0db384a0" providerId="ADAL" clId="{8EA9600F-9558-4455-AFBB-BDC15B20C410}" dt="2025-03-05T17:15:29.127" v="175" actId="14100"/>
+          <ac:picMkLst>
+            <pc:docMk/>
+            <pc:sldMk cId="2070107329" sldId="332"/>
+            <ac:picMk id="13" creationId="{2B0C4097-4177-7EFD-9768-9005062FC086}"/>
+          </ac:picMkLst>
+        </pc:picChg>
       </pc:sldChg>
       <pc:sldChg chg="modSp mod">
-        <pc:chgData name="Colson, Robert" userId="25586c2a-52f0-4ea1-8d29-b1cb0db384a0" providerId="ADAL" clId="{8EA9600F-9558-4455-AFBB-BDC15B20C410}" dt="2025-02-25T16:36:11.519" v="31" actId="5793"/>
+        <pc:chgData name="Colson, Robert" userId="25586c2a-52f0-4ea1-8d29-b1cb0db384a0" providerId="ADAL" clId="{8EA9600F-9558-4455-AFBB-BDC15B20C410}" dt="2025-03-04T19:13:09.082" v="136" actId="790"/>
         <pc:sldMkLst>
           <pc:docMk/>
           <pc:sldMk cId="1549766937" sldId="334"/>
         </pc:sldMkLst>
         <pc:spChg chg="mod">
-          <ac:chgData name="Colson, Robert" userId="25586c2a-52f0-4ea1-8d29-b1cb0db384a0" providerId="ADAL" clId="{8EA9600F-9558-4455-AFBB-BDC15B20C410}" dt="2025-02-25T16:36:11.519" v="31" actId="5793"/>
+          <ac:chgData name="Colson, Robert" userId="25586c2a-52f0-4ea1-8d29-b1cb0db384a0" providerId="ADAL" clId="{8EA9600F-9558-4455-AFBB-BDC15B20C410}" dt="2025-03-04T19:13:09.082" v="136" actId="790"/>
           <ac:spMkLst>
             <pc:docMk/>
             <pc:sldMk cId="1549766937" sldId="334"/>
             <ac:spMk id="5" creationId="{6E8F0502-F26D-4842-97A7-E6A7B55ABA0B}"/>
           </ac:spMkLst>
         </pc:spChg>
+        <pc:spChg chg="mod">
+          <ac:chgData name="Colson, Robert" userId="25586c2a-52f0-4ea1-8d29-b1cb0db384a0" providerId="ADAL" clId="{8EA9600F-9558-4455-AFBB-BDC15B20C410}" dt="2025-03-04T19:13:09.082" v="136" actId="790"/>
+          <ac:spMkLst>
+            <pc:docMk/>
+            <pc:sldMk cId="1549766937" sldId="334"/>
+            <ac:spMk id="6" creationId="{33341DDE-51A7-BB4A-A5D0-B99BDB557C68}"/>
+          </ac:spMkLst>
+        </pc:spChg>
       </pc:sldChg>
-      <pc:sldChg chg="delSp mod">
-        <pc:chgData name="Colson, Robert" userId="25586c2a-52f0-4ea1-8d29-b1cb0db384a0" providerId="ADAL" clId="{8EA9600F-9558-4455-AFBB-BDC15B20C410}" dt="2025-02-25T16:38:30.692" v="41" actId="478"/>
+      <pc:sldChg chg="delSp modSp mod">
+        <pc:chgData name="Colson, Robert" userId="25586c2a-52f0-4ea1-8d29-b1cb0db384a0" providerId="ADAL" clId="{8EA9600F-9558-4455-AFBB-BDC15B20C410}" dt="2025-03-04T19:13:09.082" v="136" actId="790"/>
         <pc:sldMkLst>
           <pc:docMk/>
           <pc:sldMk cId="2370629198" sldId="346"/>
         </pc:sldMkLst>
+        <pc:spChg chg="mod">
+          <ac:chgData name="Colson, Robert" userId="25586c2a-52f0-4ea1-8d29-b1cb0db384a0" providerId="ADAL" clId="{8EA9600F-9558-4455-AFBB-BDC15B20C410}" dt="2025-03-04T19:13:09.082" v="136" actId="790"/>
+          <ac:spMkLst>
+            <pc:docMk/>
+            <pc:sldMk cId="2370629198" sldId="346"/>
+            <ac:spMk id="2" creationId="{24C7DF14-301A-91C8-0A63-2BA080B601D5}"/>
+          </ac:spMkLst>
+        </pc:spChg>
+        <pc:spChg chg="mod">
+          <ac:chgData name="Colson, Robert" userId="25586c2a-52f0-4ea1-8d29-b1cb0db384a0" providerId="ADAL" clId="{8EA9600F-9558-4455-AFBB-BDC15B20C410}" dt="2025-03-04T19:13:09.082" v="136" actId="790"/>
+          <ac:spMkLst>
+            <pc:docMk/>
+            <pc:sldMk cId="2370629198" sldId="346"/>
+            <ac:spMk id="5" creationId="{6E8F0502-F26D-4842-97A7-E6A7B55ABA0B}"/>
+          </ac:spMkLst>
+        </pc:spChg>
+        <pc:spChg chg="mod">
+          <ac:chgData name="Colson, Robert" userId="25586c2a-52f0-4ea1-8d29-b1cb0db384a0" providerId="ADAL" clId="{8EA9600F-9558-4455-AFBB-BDC15B20C410}" dt="2025-03-04T19:13:09.082" v="136" actId="790"/>
+          <ac:spMkLst>
+            <pc:docMk/>
+            <pc:sldMk cId="2370629198" sldId="346"/>
+            <ac:spMk id="6" creationId="{33341DDE-51A7-BB4A-A5D0-B99BDB557C68}"/>
+          </ac:spMkLst>
+        </pc:spChg>
+        <pc:spChg chg="mod">
+          <ac:chgData name="Colson, Robert" userId="25586c2a-52f0-4ea1-8d29-b1cb0db384a0" providerId="ADAL" clId="{8EA9600F-9558-4455-AFBB-BDC15B20C410}" dt="2025-03-04T19:13:09.082" v="136" actId="790"/>
+          <ac:spMkLst>
+            <pc:docMk/>
+            <pc:sldMk cId="2370629198" sldId="346"/>
+            <ac:spMk id="8" creationId="{E2AF600D-6F8E-AF4F-9F8A-7A6BE3BFBF7F}"/>
+          </ac:spMkLst>
+        </pc:spChg>
+      </pc:sldChg>
+      <pc:sldChg chg="modSp mod">
+        <pc:chgData name="Colson, Robert" userId="25586c2a-52f0-4ea1-8d29-b1cb0db384a0" providerId="ADAL" clId="{8EA9600F-9558-4455-AFBB-BDC15B20C410}" dt="2025-03-04T19:13:09.082" v="136" actId="790"/>
+        <pc:sldMkLst>
+          <pc:docMk/>
+          <pc:sldMk cId="1039397992" sldId="349"/>
+        </pc:sldMkLst>
+        <pc:spChg chg="mod">
+          <ac:chgData name="Colson, Robert" userId="25586c2a-52f0-4ea1-8d29-b1cb0db384a0" providerId="ADAL" clId="{8EA9600F-9558-4455-AFBB-BDC15B20C410}" dt="2025-03-04T19:13:09.082" v="136" actId="790"/>
+          <ac:spMkLst>
+            <pc:docMk/>
+            <pc:sldMk cId="1039397992" sldId="349"/>
+            <ac:spMk id="15" creationId="{6E8F0502-F26D-4842-97A7-E6A7B55ABA0B}"/>
+          </ac:spMkLst>
+        </pc:spChg>
+        <pc:spChg chg="mod">
+          <ac:chgData name="Colson, Robert" userId="25586c2a-52f0-4ea1-8d29-b1cb0db384a0" providerId="ADAL" clId="{8EA9600F-9558-4455-AFBB-BDC15B20C410}" dt="2025-03-04T19:13:09.082" v="136" actId="790"/>
+          <ac:spMkLst>
+            <pc:docMk/>
+            <pc:sldMk cId="1039397992" sldId="349"/>
+            <ac:spMk id="16" creationId="{33341DDE-51A7-BB4A-A5D0-B99BDB557C68}"/>
+          </ac:spMkLst>
+        </pc:spChg>
       </pc:sldChg>
       <pc:sldChg chg="delSp modSp mod">
-        <pc:chgData name="Colson, Robert" userId="25586c2a-52f0-4ea1-8d29-b1cb0db384a0" providerId="ADAL" clId="{8EA9600F-9558-4455-AFBB-BDC15B20C410}" dt="2025-02-25T16:39:36.763" v="43" actId="6549"/>
+        <pc:chgData name="Colson, Robert" userId="25586c2a-52f0-4ea1-8d29-b1cb0db384a0" providerId="ADAL" clId="{8EA9600F-9558-4455-AFBB-BDC15B20C410}" dt="2025-03-04T19:13:09.082" v="136" actId="790"/>
         <pc:sldMkLst>
           <pc:docMk/>
           <pc:sldMk cId="2240166599" sldId="355"/>
         </pc:sldMkLst>
         <pc:spChg chg="mod">
-          <ac:chgData name="Colson, Robert" userId="25586c2a-52f0-4ea1-8d29-b1cb0db384a0" providerId="ADAL" clId="{8EA9600F-9558-4455-AFBB-BDC15B20C410}" dt="2025-02-25T16:39:36.763" v="43" actId="6549"/>
+          <ac:chgData name="Colson, Robert" userId="25586c2a-52f0-4ea1-8d29-b1cb0db384a0" providerId="ADAL" clId="{8EA9600F-9558-4455-AFBB-BDC15B20C410}" dt="2025-03-04T19:13:09.082" v="136" actId="790"/>
           <ac:spMkLst>
             <pc:docMk/>
             <pc:sldMk cId="2240166599" sldId="355"/>
             <ac:spMk id="5" creationId="{6E8F0502-F26D-4842-97A7-E6A7B55ABA0B}"/>
           </ac:spMkLst>
         </pc:spChg>
+        <pc:spChg chg="mod">
+          <ac:chgData name="Colson, Robert" userId="25586c2a-52f0-4ea1-8d29-b1cb0db384a0" providerId="ADAL" clId="{8EA9600F-9558-4455-AFBB-BDC15B20C410}" dt="2025-03-04T19:13:09.082" v="136" actId="790"/>
+          <ac:spMkLst>
+            <pc:docMk/>
+            <pc:sldMk cId="2240166599" sldId="355"/>
+            <ac:spMk id="6" creationId="{33341DDE-51A7-BB4A-A5D0-B99BDB557C68}"/>
+          </ac:spMkLst>
+        </pc:spChg>
+        <pc:spChg chg="mod">
+          <ac:chgData name="Colson, Robert" userId="25586c2a-52f0-4ea1-8d29-b1cb0db384a0" providerId="ADAL" clId="{8EA9600F-9558-4455-AFBB-BDC15B20C410}" dt="2025-03-04T19:13:09.082" v="136" actId="790"/>
+          <ac:spMkLst>
+            <pc:docMk/>
+            <pc:sldMk cId="2240166599" sldId="355"/>
+            <ac:spMk id="7" creationId="{E2AF600D-6F8E-AF4F-9F8A-7A6BE3BFBF7F}"/>
+          </ac:spMkLst>
+        </pc:spChg>
+        <pc:picChg chg="mod">
+          <ac:chgData name="Colson, Robert" userId="25586c2a-52f0-4ea1-8d29-b1cb0db384a0" providerId="ADAL" clId="{8EA9600F-9558-4455-AFBB-BDC15B20C410}" dt="2025-03-04T18:06:51.650" v="131" actId="1076"/>
+          <ac:picMkLst>
+            <pc:docMk/>
+            <pc:sldMk cId="2240166599" sldId="355"/>
+            <ac:picMk id="14" creationId="{2DE289AB-B82F-15C2-BCAF-9FC0291F0B5E}"/>
+          </ac:picMkLst>
+        </pc:picChg>
       </pc:sldChg>
       <pc:sldChg chg="modSp mod">
-        <pc:chgData name="Colson, Robert" userId="25586c2a-52f0-4ea1-8d29-b1cb0db384a0" providerId="ADAL" clId="{8EA9600F-9558-4455-AFBB-BDC15B20C410}" dt="2025-02-25T16:33:09.589" v="6" actId="1076"/>
+        <pc:chgData name="Colson, Robert" userId="25586c2a-52f0-4ea1-8d29-b1cb0db384a0" providerId="ADAL" clId="{8EA9600F-9558-4455-AFBB-BDC15B20C410}" dt="2025-03-04T19:13:09.082" v="136" actId="790"/>
+        <pc:sldMkLst>
+          <pc:docMk/>
+          <pc:sldMk cId="3691376732" sldId="357"/>
+        </pc:sldMkLst>
+        <pc:spChg chg="mod">
+          <ac:chgData name="Colson, Robert" userId="25586c2a-52f0-4ea1-8d29-b1cb0db384a0" providerId="ADAL" clId="{8EA9600F-9558-4455-AFBB-BDC15B20C410}" dt="2025-03-04T19:13:09.082" v="136" actId="790"/>
+          <ac:spMkLst>
+            <pc:docMk/>
+            <pc:sldMk cId="3691376732" sldId="357"/>
+            <ac:spMk id="2" creationId="{00000000-0000-0000-0000-000000000000}"/>
+          </ac:spMkLst>
+        </pc:spChg>
+        <pc:spChg chg="mod">
+          <ac:chgData name="Colson, Robert" userId="25586c2a-52f0-4ea1-8d29-b1cb0db384a0" providerId="ADAL" clId="{8EA9600F-9558-4455-AFBB-BDC15B20C410}" dt="2025-03-04T19:13:09.082" v="136" actId="790"/>
+          <ac:spMkLst>
+            <pc:docMk/>
+            <pc:sldMk cId="3691376732" sldId="357"/>
+            <ac:spMk id="8" creationId="{6E8F0502-F26D-4842-97A7-E6A7B55ABA0B}"/>
+          </ac:spMkLst>
+        </pc:spChg>
+        <pc:spChg chg="mod">
+          <ac:chgData name="Colson, Robert" userId="25586c2a-52f0-4ea1-8d29-b1cb0db384a0" providerId="ADAL" clId="{8EA9600F-9558-4455-AFBB-BDC15B20C410}" dt="2025-03-04T19:13:09.082" v="136" actId="790"/>
+          <ac:spMkLst>
+            <pc:docMk/>
+            <pc:sldMk cId="3691376732" sldId="357"/>
+            <ac:spMk id="9" creationId="{33341DDE-51A7-BB4A-A5D0-B99BDB557C68}"/>
+          </ac:spMkLst>
+        </pc:spChg>
+      </pc:sldChg>
+      <pc:sldChg chg="modSp mod">
+        <pc:chgData name="Colson, Robert" userId="25586c2a-52f0-4ea1-8d29-b1cb0db384a0" providerId="ADAL" clId="{8EA9600F-9558-4455-AFBB-BDC15B20C410}" dt="2025-03-04T19:13:09.082" v="136" actId="790"/>
+        <pc:sldMkLst>
+          <pc:docMk/>
+          <pc:sldMk cId="1522227569" sldId="358"/>
+        </pc:sldMkLst>
+        <pc:spChg chg="mod">
+          <ac:chgData name="Colson, Robert" userId="25586c2a-52f0-4ea1-8d29-b1cb0db384a0" providerId="ADAL" clId="{8EA9600F-9558-4455-AFBB-BDC15B20C410}" dt="2025-03-04T19:13:09.082" v="136" actId="790"/>
+          <ac:spMkLst>
+            <pc:docMk/>
+            <pc:sldMk cId="1522227569" sldId="358"/>
+            <ac:spMk id="7" creationId="{6E8F0502-F26D-4842-97A7-E6A7B55ABA0B}"/>
+          </ac:spMkLst>
+        </pc:spChg>
+        <pc:spChg chg="mod">
+          <ac:chgData name="Colson, Robert" userId="25586c2a-52f0-4ea1-8d29-b1cb0db384a0" providerId="ADAL" clId="{8EA9600F-9558-4455-AFBB-BDC15B20C410}" dt="2025-03-04T19:13:09.082" v="136" actId="790"/>
+          <ac:spMkLst>
+            <pc:docMk/>
+            <pc:sldMk cId="1522227569" sldId="358"/>
+            <ac:spMk id="11" creationId="{33341DDE-51A7-BB4A-A5D0-B99BDB557C68}"/>
+          </ac:spMkLst>
+        </pc:spChg>
+      </pc:sldChg>
+      <pc:sldChg chg="modSp mod">
+        <pc:chgData name="Colson, Robert" userId="25586c2a-52f0-4ea1-8d29-b1cb0db384a0" providerId="ADAL" clId="{8EA9600F-9558-4455-AFBB-BDC15B20C410}" dt="2025-03-04T19:13:09.082" v="136" actId="790"/>
+        <pc:sldMkLst>
+          <pc:docMk/>
+          <pc:sldMk cId="1417067264" sldId="360"/>
+        </pc:sldMkLst>
+        <pc:spChg chg="mod">
+          <ac:chgData name="Colson, Robert" userId="25586c2a-52f0-4ea1-8d29-b1cb0db384a0" providerId="ADAL" clId="{8EA9600F-9558-4455-AFBB-BDC15B20C410}" dt="2025-03-04T19:13:09.082" v="136" actId="790"/>
+          <ac:spMkLst>
+            <pc:docMk/>
+            <pc:sldMk cId="1417067264" sldId="360"/>
+            <ac:spMk id="8" creationId="{6E8F0502-F26D-4842-97A7-E6A7B55ABA0B}"/>
+          </ac:spMkLst>
+        </pc:spChg>
+        <pc:spChg chg="mod">
+          <ac:chgData name="Colson, Robert" userId="25586c2a-52f0-4ea1-8d29-b1cb0db384a0" providerId="ADAL" clId="{8EA9600F-9558-4455-AFBB-BDC15B20C410}" dt="2025-03-04T19:13:09.082" v="136" actId="790"/>
+          <ac:spMkLst>
+            <pc:docMk/>
+            <pc:sldMk cId="1417067264" sldId="360"/>
+            <ac:spMk id="9" creationId="{33341DDE-51A7-BB4A-A5D0-B99BDB557C68}"/>
+          </ac:spMkLst>
+        </pc:spChg>
+      </pc:sldChg>
+      <pc:sldChg chg="modSp mod">
+        <pc:chgData name="Colson, Robert" userId="25586c2a-52f0-4ea1-8d29-b1cb0db384a0" providerId="ADAL" clId="{8EA9600F-9558-4455-AFBB-BDC15B20C410}" dt="2025-03-05T16:41:33.549" v="137" actId="14100"/>
         <pc:sldMkLst>
           <pc:docMk/>
           <pc:sldMk cId="2474284426" sldId="361"/>
         </pc:sldMkLst>
+        <pc:spChg chg="mod">
+          <ac:chgData name="Colson, Robert" userId="25586c2a-52f0-4ea1-8d29-b1cb0db384a0" providerId="ADAL" clId="{8EA9600F-9558-4455-AFBB-BDC15B20C410}" dt="2025-03-04T19:13:09.082" v="136" actId="790"/>
+          <ac:spMkLst>
+            <pc:docMk/>
+            <pc:sldMk cId="2474284426" sldId="361"/>
+            <ac:spMk id="5" creationId="{9DCD1926-7996-29B5-1677-243A84927E5D}"/>
+          </ac:spMkLst>
+        </pc:spChg>
+        <pc:spChg chg="mod">
+          <ac:chgData name="Colson, Robert" userId="25586c2a-52f0-4ea1-8d29-b1cb0db384a0" providerId="ADAL" clId="{8EA9600F-9558-4455-AFBB-BDC15B20C410}" dt="2025-03-04T19:13:09.082" v="136" actId="790"/>
+          <ac:spMkLst>
+            <pc:docMk/>
+            <pc:sldMk cId="2474284426" sldId="361"/>
+            <ac:spMk id="7" creationId="{58271EFE-9001-F3C3-D300-18939E2B9CDE}"/>
+          </ac:spMkLst>
+        </pc:spChg>
         <pc:picChg chg="mod">
-          <ac:chgData name="Colson, Robert" userId="25586c2a-52f0-4ea1-8d29-b1cb0db384a0" providerId="ADAL" clId="{8EA9600F-9558-4455-AFBB-BDC15B20C410}" dt="2025-02-25T16:33:09.589" v="6" actId="1076"/>
+          <ac:chgData name="Colson, Robert" userId="25586c2a-52f0-4ea1-8d29-b1cb0db384a0" providerId="ADAL" clId="{8EA9600F-9558-4455-AFBB-BDC15B20C410}" dt="2025-03-05T16:41:33.549" v="137" actId="14100"/>
           <ac:picMkLst>
             <pc:docMk/>
             <pc:sldMk cId="2474284426" sldId="361"/>
@@ -424,27 +698,122 @@
         </pc:sldMkLst>
       </pc:sldChg>
       <pc:sldChg chg="delSp modSp mod">
-        <pc:chgData name="Colson, Robert" userId="25586c2a-52f0-4ea1-8d29-b1cb0db384a0" providerId="ADAL" clId="{8EA9600F-9558-4455-AFBB-BDC15B20C410}" dt="2025-02-25T16:38:22.465" v="40" actId="478"/>
+        <pc:chgData name="Colson, Robert" userId="25586c2a-52f0-4ea1-8d29-b1cb0db384a0" providerId="ADAL" clId="{8EA9600F-9558-4455-AFBB-BDC15B20C410}" dt="2025-03-04T19:13:09.082" v="136" actId="790"/>
         <pc:sldMkLst>
           <pc:docMk/>
           <pc:sldMk cId="3299242804" sldId="363"/>
         </pc:sldMkLst>
+        <pc:spChg chg="mod">
+          <ac:chgData name="Colson, Robert" userId="25586c2a-52f0-4ea1-8d29-b1cb0db384a0" providerId="ADAL" clId="{8EA9600F-9558-4455-AFBB-BDC15B20C410}" dt="2025-03-04T19:13:09.082" v="136" actId="790"/>
+          <ac:spMkLst>
+            <pc:docMk/>
+            <pc:sldMk cId="3299242804" sldId="363"/>
+            <ac:spMk id="3" creationId="{6CD1D25C-E8C2-A99D-0F3D-BE069B346573}"/>
+          </ac:spMkLst>
+        </pc:spChg>
+        <pc:spChg chg="mod">
+          <ac:chgData name="Colson, Robert" userId="25586c2a-52f0-4ea1-8d29-b1cb0db384a0" providerId="ADAL" clId="{8EA9600F-9558-4455-AFBB-BDC15B20C410}" dt="2025-03-04T19:13:09.082" v="136" actId="790"/>
+          <ac:spMkLst>
+            <pc:docMk/>
+            <pc:sldMk cId="3299242804" sldId="363"/>
+            <ac:spMk id="5" creationId="{6E8F0502-F26D-4842-97A7-E6A7B55ABA0B}"/>
+          </ac:spMkLst>
+        </pc:spChg>
+        <pc:spChg chg="mod">
+          <ac:chgData name="Colson, Robert" userId="25586c2a-52f0-4ea1-8d29-b1cb0db384a0" providerId="ADAL" clId="{8EA9600F-9558-4455-AFBB-BDC15B20C410}" dt="2025-03-04T19:13:09.082" v="136" actId="790"/>
+          <ac:spMkLst>
+            <pc:docMk/>
+            <pc:sldMk cId="3299242804" sldId="363"/>
+            <ac:spMk id="6" creationId="{33341DDE-51A7-BB4A-A5D0-B99BDB557C68}"/>
+          </ac:spMkLst>
+        </pc:spChg>
+        <pc:spChg chg="mod">
+          <ac:chgData name="Colson, Robert" userId="25586c2a-52f0-4ea1-8d29-b1cb0db384a0" providerId="ADAL" clId="{8EA9600F-9558-4455-AFBB-BDC15B20C410}" dt="2025-03-04T19:13:09.082" v="136" actId="790"/>
+          <ac:spMkLst>
+            <pc:docMk/>
+            <pc:sldMk cId="3299242804" sldId="363"/>
+            <ac:spMk id="8" creationId="{E2AF600D-6F8E-AF4F-9F8A-7A6BE3BFBF7F}"/>
+          </ac:spMkLst>
+        </pc:spChg>
       </pc:sldChg>
-      <pc:sldChg chg="delSp mod">
-        <pc:chgData name="Colson, Robert" userId="25586c2a-52f0-4ea1-8d29-b1cb0db384a0" providerId="ADAL" clId="{8EA9600F-9558-4455-AFBB-BDC15B20C410}" dt="2025-02-25T16:41:11" v="46" actId="478"/>
+      <pc:sldChg chg="modSp mod">
+        <pc:chgData name="Colson, Robert" userId="25586c2a-52f0-4ea1-8d29-b1cb0db384a0" providerId="ADAL" clId="{8EA9600F-9558-4455-AFBB-BDC15B20C410}" dt="2025-03-06T16:29:56.826" v="187" actId="403"/>
+        <pc:sldMkLst>
+          <pc:docMk/>
+          <pc:sldMk cId="2987614321" sldId="367"/>
+        </pc:sldMkLst>
+        <pc:spChg chg="mod">
+          <ac:chgData name="Colson, Robert" userId="25586c2a-52f0-4ea1-8d29-b1cb0db384a0" providerId="ADAL" clId="{8EA9600F-9558-4455-AFBB-BDC15B20C410}" dt="2025-03-06T16:29:56.826" v="187" actId="403"/>
+          <ac:spMkLst>
+            <pc:docMk/>
+            <pc:sldMk cId="2987614321" sldId="367"/>
+            <ac:spMk id="5" creationId="{6E8F0502-F26D-4842-97A7-E6A7B55ABA0B}"/>
+          </ac:spMkLst>
+        </pc:spChg>
+        <pc:spChg chg="mod">
+          <ac:chgData name="Colson, Robert" userId="25586c2a-52f0-4ea1-8d29-b1cb0db384a0" providerId="ADAL" clId="{8EA9600F-9558-4455-AFBB-BDC15B20C410}" dt="2025-03-04T19:13:09.082" v="136" actId="790"/>
+          <ac:spMkLst>
+            <pc:docMk/>
+            <pc:sldMk cId="2987614321" sldId="367"/>
+            <ac:spMk id="6" creationId="{33341DDE-51A7-BB4A-A5D0-B99BDB557C68}"/>
+          </ac:spMkLst>
+        </pc:spChg>
+        <pc:spChg chg="mod">
+          <ac:chgData name="Colson, Robert" userId="25586c2a-52f0-4ea1-8d29-b1cb0db384a0" providerId="ADAL" clId="{8EA9600F-9558-4455-AFBB-BDC15B20C410}" dt="2025-03-04T19:13:09.082" v="136" actId="790"/>
+          <ac:spMkLst>
+            <pc:docMk/>
+            <pc:sldMk cId="2987614321" sldId="367"/>
+            <ac:spMk id="7" creationId="{E2AF600D-6F8E-AF4F-9F8A-7A6BE3BFBF7F}"/>
+          </ac:spMkLst>
+        </pc:spChg>
+        <pc:picChg chg="mod">
+          <ac:chgData name="Colson, Robert" userId="25586c2a-52f0-4ea1-8d29-b1cb0db384a0" providerId="ADAL" clId="{8EA9600F-9558-4455-AFBB-BDC15B20C410}" dt="2025-03-06T16:29:54.834" v="183" actId="1076"/>
+          <ac:picMkLst>
+            <pc:docMk/>
+            <pc:sldMk cId="2987614321" sldId="367"/>
+            <ac:picMk id="3" creationId="{3D3638AB-B7F7-3AC5-AE7B-6D8B3B8A78FB}"/>
+          </ac:picMkLst>
+        </pc:picChg>
+        <pc:picChg chg="mod">
+          <ac:chgData name="Colson, Robert" userId="25586c2a-52f0-4ea1-8d29-b1cb0db384a0" providerId="ADAL" clId="{8EA9600F-9558-4455-AFBB-BDC15B20C410}" dt="2025-03-06T16:29:55.080" v="184" actId="1076"/>
+          <ac:picMkLst>
+            <pc:docMk/>
+            <pc:sldMk cId="2987614321" sldId="367"/>
+            <ac:picMk id="8" creationId="{F83DB12F-0A8D-EEA1-2B20-A5E362ABE6DF}"/>
+          </ac:picMkLst>
+        </pc:picChg>
+      </pc:sldChg>
+      <pc:sldChg chg="delSp modSp mod">
+        <pc:chgData name="Colson, Robert" userId="25586c2a-52f0-4ea1-8d29-b1cb0db384a0" providerId="ADAL" clId="{8EA9600F-9558-4455-AFBB-BDC15B20C410}" dt="2025-03-04T19:13:09.082" v="136" actId="790"/>
         <pc:sldMkLst>
           <pc:docMk/>
           <pc:sldMk cId="3767592872" sldId="368"/>
         </pc:sldMkLst>
+        <pc:spChg chg="mod">
+          <ac:chgData name="Colson, Robert" userId="25586c2a-52f0-4ea1-8d29-b1cb0db384a0" providerId="ADAL" clId="{8EA9600F-9558-4455-AFBB-BDC15B20C410}" dt="2025-03-04T19:13:09.082" v="136" actId="790"/>
+          <ac:spMkLst>
+            <pc:docMk/>
+            <pc:sldMk cId="3767592872" sldId="368"/>
+            <ac:spMk id="7" creationId="{6E8F0502-F26D-4842-97A7-E6A7B55ABA0B}"/>
+          </ac:spMkLst>
+        </pc:spChg>
+        <pc:spChg chg="mod">
+          <ac:chgData name="Colson, Robert" userId="25586c2a-52f0-4ea1-8d29-b1cb0db384a0" providerId="ADAL" clId="{8EA9600F-9558-4455-AFBB-BDC15B20C410}" dt="2025-03-04T19:13:09.082" v="136" actId="790"/>
+          <ac:spMkLst>
+            <pc:docMk/>
+            <pc:sldMk cId="3767592872" sldId="368"/>
+            <ac:spMk id="11" creationId="{33341DDE-51A7-BB4A-A5D0-B99BDB557C68}"/>
+          </ac:spMkLst>
+        </pc:spChg>
       </pc:sldChg>
       <pc:sldChg chg="addSp delSp modSp new mod ord">
-        <pc:chgData name="Colson, Robert" userId="25586c2a-52f0-4ea1-8d29-b1cb0db384a0" providerId="ADAL" clId="{8EA9600F-9558-4455-AFBB-BDC15B20C410}" dt="2025-03-03T16:04:43.035" v="122" actId="20577"/>
+        <pc:chgData name="Colson, Robert" userId="25586c2a-52f0-4ea1-8d29-b1cb0db384a0" providerId="ADAL" clId="{8EA9600F-9558-4455-AFBB-BDC15B20C410}" dt="2025-03-04T19:13:09.082" v="136" actId="790"/>
         <pc:sldMkLst>
           <pc:docMk/>
           <pc:sldMk cId="257288875" sldId="369"/>
         </pc:sldMkLst>
         <pc:spChg chg="add mod">
-          <ac:chgData name="Colson, Robert" userId="25586c2a-52f0-4ea1-8d29-b1cb0db384a0" providerId="ADAL" clId="{8EA9600F-9558-4455-AFBB-BDC15B20C410}" dt="2025-03-03T16:04:43.035" v="122" actId="20577"/>
+          <ac:chgData name="Colson, Robert" userId="25586c2a-52f0-4ea1-8d29-b1cb0db384a0" providerId="ADAL" clId="{8EA9600F-9558-4455-AFBB-BDC15B20C410}" dt="2025-03-04T19:13:09.082" v="136" actId="790"/>
           <ac:spMkLst>
             <pc:docMk/>
             <pc:sldMk cId="257288875" sldId="369"/>
@@ -453,32 +822,48 @@
         </pc:spChg>
       </pc:sldChg>
       <pc:sldChg chg="delSp modSp add mod">
-        <pc:chgData name="Colson, Robert" userId="25586c2a-52f0-4ea1-8d29-b1cb0db384a0" providerId="ADAL" clId="{8EA9600F-9558-4455-AFBB-BDC15B20C410}" dt="2025-02-25T16:35:15.968" v="27" actId="5793"/>
+        <pc:chgData name="Colson, Robert" userId="25586c2a-52f0-4ea1-8d29-b1cb0db384a0" providerId="ADAL" clId="{8EA9600F-9558-4455-AFBB-BDC15B20C410}" dt="2025-03-04T19:13:09.082" v="136" actId="790"/>
         <pc:sldMkLst>
           <pc:docMk/>
           <pc:sldMk cId="3989809570" sldId="370"/>
         </pc:sldMkLst>
         <pc:spChg chg="mod">
-          <ac:chgData name="Colson, Robert" userId="25586c2a-52f0-4ea1-8d29-b1cb0db384a0" providerId="ADAL" clId="{8EA9600F-9558-4455-AFBB-BDC15B20C410}" dt="2025-02-25T16:35:15.968" v="27" actId="5793"/>
+          <ac:chgData name="Colson, Robert" userId="25586c2a-52f0-4ea1-8d29-b1cb0db384a0" providerId="ADAL" clId="{8EA9600F-9558-4455-AFBB-BDC15B20C410}" dt="2025-03-04T19:13:09.082" v="136" actId="790"/>
           <ac:spMkLst>
             <pc:docMk/>
             <pc:sldMk cId="3989809570" sldId="370"/>
             <ac:spMk id="5" creationId="{27A5B7F4-EBDD-F5BF-C4D1-9ECF039B8777}"/>
           </ac:spMkLst>
         </pc:spChg>
+        <pc:spChg chg="mod">
+          <ac:chgData name="Colson, Robert" userId="25586c2a-52f0-4ea1-8d29-b1cb0db384a0" providerId="ADAL" clId="{8EA9600F-9558-4455-AFBB-BDC15B20C410}" dt="2025-03-04T19:13:09.082" v="136" actId="790"/>
+          <ac:spMkLst>
+            <pc:docMk/>
+            <pc:sldMk cId="3989809570" sldId="370"/>
+            <ac:spMk id="6" creationId="{EECAE462-247B-7872-2870-5D60CFBC5507}"/>
+          </ac:spMkLst>
+        </pc:spChg>
       </pc:sldChg>
       <pc:sldChg chg="modSp add mod">
-        <pc:chgData name="Colson, Robert" userId="25586c2a-52f0-4ea1-8d29-b1cb0db384a0" providerId="ADAL" clId="{8EA9600F-9558-4455-AFBB-BDC15B20C410}" dt="2025-02-25T16:36:28.303" v="37" actId="20577"/>
+        <pc:chgData name="Colson, Robert" userId="25586c2a-52f0-4ea1-8d29-b1cb0db384a0" providerId="ADAL" clId="{8EA9600F-9558-4455-AFBB-BDC15B20C410}" dt="2025-03-04T19:13:09.082" v="136" actId="790"/>
         <pc:sldMkLst>
           <pc:docMk/>
           <pc:sldMk cId="3956362638" sldId="371"/>
         </pc:sldMkLst>
         <pc:spChg chg="mod">
-          <ac:chgData name="Colson, Robert" userId="25586c2a-52f0-4ea1-8d29-b1cb0db384a0" providerId="ADAL" clId="{8EA9600F-9558-4455-AFBB-BDC15B20C410}" dt="2025-02-25T16:36:28.303" v="37" actId="20577"/>
+          <ac:chgData name="Colson, Robert" userId="25586c2a-52f0-4ea1-8d29-b1cb0db384a0" providerId="ADAL" clId="{8EA9600F-9558-4455-AFBB-BDC15B20C410}" dt="2025-03-04T19:13:09.082" v="136" actId="790"/>
           <ac:spMkLst>
             <pc:docMk/>
             <pc:sldMk cId="3956362638" sldId="371"/>
             <ac:spMk id="5" creationId="{CB91F443-0FD7-FF83-4862-D8BF30FE6AA2}"/>
+          </ac:spMkLst>
+        </pc:spChg>
+        <pc:spChg chg="mod">
+          <ac:chgData name="Colson, Robert" userId="25586c2a-52f0-4ea1-8d29-b1cb0db384a0" providerId="ADAL" clId="{8EA9600F-9558-4455-AFBB-BDC15B20C410}" dt="2025-03-04T19:13:09.082" v="136" actId="790"/>
+          <ac:spMkLst>
+            <pc:docMk/>
+            <pc:sldMk cId="3956362638" sldId="371"/>
+            <ac:spMk id="6" creationId="{C3245D67-9998-A783-D48B-1C4FE493CE03}"/>
           </ac:spMkLst>
         </pc:spChg>
       </pc:sldChg>
@@ -5354,8 +5739,8 @@
         </p:nvSpPr>
         <p:spPr bwMode="auto">
           <a:xfrm>
-            <a:off x="286438" y="1720839"/>
-            <a:ext cx="8769427" cy="3416320"/>
+            <a:off x="141514" y="236056"/>
+            <a:ext cx="8914351" cy="4893647"/>
           </a:xfrm>
           <a:prstGeom prst="rect">
             <a:avLst/>
@@ -5420,7 +5805,7 @@
               <a:tabLst/>
             </a:pPr>
             <a:r>
-              <a:rPr kumimoji="0" lang="en-US" altLang="ja-JP" sz="1800" b="1" i="0" u="none" strike="noStrike" cap="none" normalizeH="0" baseline="0" dirty="0">
+              <a:rPr kumimoji="0" lang="en-US" sz="2400" b="1" i="0" u="none" strike="noStrike" cap="none" normalizeH="0" baseline="0" noProof="0" dirty="0">
                 <a:ln>
                   <a:noFill/>
                 </a:ln>
@@ -5432,7 +5817,7 @@
               </a:rPr>
               <a:t>- **Asymptote**: A line that a graph approaches but never touches as it extends toward infinity</a:t>
             </a:r>
-            <a:endParaRPr lang="en-US" altLang="ja-JP" sz="1800" b="1" dirty="0">
+            <a:endParaRPr lang="en-US" sz="2400" b="1" noProof="0" dirty="0">
               <a:solidFill>
                 <a:schemeClr val="tx1"/>
               </a:solidFill>
@@ -5456,7 +5841,7 @@
               <a:buChar char="•"/>
               <a:tabLst/>
             </a:pPr>
-            <a:endParaRPr kumimoji="0" lang="en-US" altLang="ja-JP" sz="1800" b="1" i="0" u="none" strike="noStrike" cap="none" normalizeH="0" baseline="0" dirty="0">
+            <a:endParaRPr kumimoji="0" lang="en-US" sz="2400" b="1" i="0" u="none" strike="noStrike" cap="none" normalizeH="0" baseline="0" noProof="0" dirty="0">
               <a:ln>
                 <a:noFill/>
               </a:ln>
@@ -5485,7 +5870,7 @@
               <a:tabLst/>
             </a:pPr>
             <a:r>
-              <a:rPr kumimoji="0" lang="en-US" altLang="ja-JP" sz="1800" b="1" i="0" u="none" strike="noStrike" cap="none" normalizeH="0" baseline="0" dirty="0">
+              <a:rPr kumimoji="0" lang="en-US" sz="2400" b="1" i="0" u="none" strike="noStrike" cap="none" normalizeH="0" baseline="0" noProof="0" dirty="0">
                 <a:ln>
                   <a:noFill/>
                 </a:ln>
@@ -5497,7 +5882,7 @@
               </a:rPr>
               <a:t>- **Constant of variation**: A fixed number that relates two variables in a direct or inverse variation equation</a:t>
             </a:r>
-            <a:endParaRPr lang="en-US" altLang="ja-JP" sz="1800" b="1" dirty="0">
+            <a:endParaRPr lang="en-US" sz="2400" b="1" noProof="0" dirty="0">
               <a:solidFill>
                 <a:schemeClr val="tx1"/>
               </a:solidFill>
@@ -5521,7 +5906,7 @@
               <a:buChar char="•"/>
               <a:tabLst/>
             </a:pPr>
-            <a:endParaRPr kumimoji="0" lang="en-US" altLang="ja-JP" sz="1800" b="1" i="0" u="none" strike="noStrike" cap="none" normalizeH="0" baseline="0" dirty="0">
+            <a:endParaRPr kumimoji="0" lang="en-US" sz="2400" b="1" i="0" u="none" strike="noStrike" cap="none" normalizeH="0" baseline="0" noProof="0" dirty="0">
               <a:ln>
                 <a:noFill/>
               </a:ln>
@@ -5550,7 +5935,7 @@
               <a:tabLst/>
             </a:pPr>
             <a:r>
-              <a:rPr kumimoji="0" lang="en-US" altLang="ja-JP" sz="1800" b="1" i="0" u="none" strike="noStrike" cap="none" normalizeH="0" baseline="0" dirty="0">
+              <a:rPr kumimoji="0" lang="en-US" sz="2400" b="1" i="0" u="none" strike="noStrike" cap="none" normalizeH="0" baseline="0" noProof="0" dirty="0">
                 <a:ln>
                   <a:noFill/>
                 </a:ln>
@@ -5562,7 +5947,7 @@
               </a:rPr>
               <a:t>- **Inverse variation**: A relationship where one variable increases as the other decreases, typically expressed as y = k/x, where k is a constant. </a:t>
             </a:r>
-            <a:endParaRPr lang="en-US" altLang="ja-JP" sz="1800" b="1" dirty="0">
+            <a:endParaRPr lang="en-US" sz="2400" b="1" noProof="0" dirty="0">
               <a:solidFill>
                 <a:schemeClr val="tx1"/>
               </a:solidFill>
@@ -5586,7 +5971,7 @@
               <a:buChar char="•"/>
               <a:tabLst/>
             </a:pPr>
-            <a:endParaRPr kumimoji="0" lang="en-US" altLang="ja-JP" sz="1800" b="1" i="0" u="none" strike="noStrike" cap="none" normalizeH="0" baseline="0" dirty="0">
+            <a:endParaRPr kumimoji="0" lang="en-US" sz="2400" b="1" i="0" u="none" strike="noStrike" cap="none" normalizeH="0" baseline="0" noProof="0" dirty="0">
               <a:ln>
                 <a:noFill/>
               </a:ln>
@@ -5613,7 +5998,7 @@
               <a:tabLst/>
             </a:pPr>
             <a:r>
-              <a:rPr kumimoji="0" lang="en-US" altLang="ja-JP" sz="1800" b="1" i="0" u="none" strike="noStrike" cap="none" normalizeH="0" baseline="0" dirty="0">
+              <a:rPr kumimoji="0" lang="en-US" sz="2400" b="1" i="0" u="none" strike="noStrike" cap="none" normalizeH="0" baseline="0" noProof="0" dirty="0">
                 <a:ln>
                   <a:noFill/>
                 </a:ln>
@@ -5644,7 +6029,7 @@
               <a:tabLst/>
             </a:pPr>
             <a:r>
-              <a:rPr kumimoji="0" lang="en-US" altLang="ja-JP" sz="1800" b="1" i="0" u="none" strike="noStrike" cap="none" normalizeH="0" baseline="0" dirty="0">
+              <a:rPr kumimoji="0" lang="en-US" sz="2400" b="1" i="0" u="none" strike="noStrike" cap="none" normalizeH="0" baseline="0" noProof="0" dirty="0">
                 <a:ln>
                   <a:noFill/>
                 </a:ln>
@@ -5654,22 +6039,9 @@
                 <a:effectLst/>
                 <a:latin typeface="Arial" panose="020B0604020202020204" pitchFamily="34" charset="0"/>
               </a:rPr>
-              <a:t>- **Reciprocal function**: A function of the form f(x) = 1/x, where the output is the reciprocal of </a:t>
-            </a:r>
-            <a:r>
-              <a:rPr kumimoji="0" lang="en-US" altLang="ja-JP" sz="1800" b="1" i="0" u="none" strike="noStrike" cap="none" normalizeH="0" baseline="0">
-                <a:ln>
-                  <a:noFill/>
-                </a:ln>
-                <a:solidFill>
-                  <a:schemeClr val="tx1"/>
-                </a:solidFill>
-                <a:effectLst/>
-                <a:latin typeface="Arial" panose="020B0604020202020204" pitchFamily="34" charset="0"/>
-              </a:rPr>
-              <a:t>the input.</a:t>
-            </a:r>
-            <a:endParaRPr kumimoji="0" lang="ja-JP" altLang="ja-JP" sz="1800" b="0" i="0" u="none" strike="noStrike" cap="none" normalizeH="0" baseline="0" dirty="0">
+              <a:t>- **Reciprocal function**: A function of the form f(x) = 1/x, where the output is the reciprocal of the input.</a:t>
+            </a:r>
+            <a:endParaRPr kumimoji="0" lang="en-US" sz="2400" b="0" i="0" u="none" strike="noStrike" cap="none" normalizeH="0" baseline="0" noProof="0" dirty="0">
               <a:ln>
                 <a:noFill/>
               </a:ln>
@@ -5779,7 +6151,7 @@
               </a:tabLst>
             </a:pPr>
             <a:r>
-              <a:rPr lang="en-IN" sz="1800" b="1" dirty="0">
+              <a:rPr lang="en-US" sz="1800" b="1" noProof="0" dirty="0">
                 <a:solidFill>
                   <a:srgbClr val="0078AE"/>
                 </a:solidFill>
@@ -5787,18 +6159,13 @@
               <a:t>	</a:t>
             </a:r>
             <a:r>
-              <a:rPr lang="de-DE" sz="1800" b="1" dirty="0">
+              <a:rPr lang="en-US" sz="1800" b="1" noProof="0" dirty="0">
                 <a:solidFill>
                   <a:srgbClr val="58585A"/>
                 </a:solidFill>
               </a:rPr>
               <a:t>Use an Inverse Variation Model</a:t>
             </a:r>
-            <a:endParaRPr lang="en-US" sz="1800" b="1" dirty="0">
-              <a:solidFill>
-                <a:srgbClr val="58585A"/>
-              </a:solidFill>
-            </a:endParaRPr>
           </a:p>
           <a:p>
             <a:pPr>
@@ -5807,30 +6174,30 @@
               </a:spcAft>
             </a:pPr>
             <a:r>
-              <a:rPr lang="en-US" sz="1600" b="1" dirty="0"/>
+              <a:rPr lang="en-US" sz="1600" b="1" noProof="0" dirty="0"/>
               <a:t>On a Greek bouzouki, the string length </a:t>
             </a:r>
             <a:r>
-              <a:rPr lang="en-US" sz="1600" b="1" i="1" dirty="0"/>
+              <a:rPr lang="en-US" sz="1600" b="1" i="1" noProof="0" dirty="0"/>
               <a:t>s</a:t>
             </a:r>
             <a:r>
-              <a:rPr lang="en-US" sz="1600" b="1" dirty="0"/>
+              <a:rPr lang="en-US" sz="1600" b="1" noProof="0" dirty="0"/>
               <a:t> varies inversely with the </a:t>
             </a:r>
             <a:br>
-              <a:rPr lang="en-US" sz="1600" b="1" dirty="0"/>
+              <a:rPr lang="en-US" sz="1600" b="1" noProof="0" dirty="0"/>
             </a:br>
             <a:r>
-              <a:rPr lang="en-US" sz="1600" b="1" dirty="0"/>
+              <a:rPr lang="en-US" sz="1600" b="1" noProof="0" dirty="0"/>
               <a:t>frequency </a:t>
             </a:r>
             <a:r>
-              <a:rPr lang="en-US" sz="1600" b="1" i="1" dirty="0"/>
+              <a:rPr lang="en-US" sz="1600" b="1" i="1" noProof="0" dirty="0"/>
               <a:t>f</a:t>
             </a:r>
             <a:r>
-              <a:rPr lang="en-US" sz="1600" b="1" dirty="0"/>
+              <a:rPr lang="en-US" sz="1600" b="1" noProof="0" dirty="0"/>
               <a:t> of its vibrations.</a:t>
             </a:r>
           </a:p>
@@ -5886,14 +6253,14 @@
           <a:lstStyle/>
           <a:p>
             <a:r>
-              <a:rPr lang="en-IN" sz="1800" b="1" cap="all" dirty="0">
+              <a:rPr lang="en-US" sz="1800" b="1" cap="all" noProof="0" dirty="0">
                 <a:solidFill>
                   <a:schemeClr val="bg1"/>
                 </a:solidFill>
               </a:rPr>
               <a:t>Example 3</a:t>
             </a:r>
-            <a:endParaRPr lang="en-US" sz="1800" cap="all" dirty="0"/>
+            <a:endParaRPr lang="en-US" sz="1800" cap="all" noProof="0" dirty="0"/>
           </a:p>
         </p:txBody>
       </p:sp>
@@ -5926,14 +6293,14 @@
           <a:lstStyle/>
           <a:p>
             <a:r>
-              <a:rPr lang="en-IN" sz="1800" b="1" dirty="0">
+              <a:rPr lang="en-US" sz="1800" b="1" noProof="0" dirty="0">
                 <a:solidFill>
                   <a:srgbClr val="137F97"/>
                 </a:solidFill>
               </a:rPr>
               <a:t>APPLICATION</a:t>
             </a:r>
-            <a:endParaRPr lang="en-IN" sz="1800" dirty="0">
+            <a:endParaRPr lang="en-US" sz="1800" noProof="0" dirty="0">
               <a:solidFill>
                 <a:srgbClr val="137F97"/>
               </a:solidFill>
@@ -5976,7 +6343,7 @@
               <a:buSzPts val="1800"/>
             </a:pPr>
             <a:r>
-              <a:rPr lang="en-US" sz="800" dirty="0">
+              <a:rPr lang="en-US" sz="800" noProof="0" dirty="0">
                 <a:solidFill>
                   <a:srgbClr val="595959"/>
                 </a:solidFill>
@@ -5988,7 +6355,7 @@
               <a:t>Photo credit: </a:t>
             </a:r>
             <a:r>
-              <a:rPr lang="en-US" sz="800" dirty="0" err="1">
+              <a:rPr lang="en-US" sz="800" noProof="0" dirty="0" err="1">
                 <a:solidFill>
                   <a:srgbClr val="595959"/>
                 </a:solidFill>
@@ -6000,7 +6367,7 @@
               <a:t>Vectorshape</a:t>
             </a:r>
             <a:r>
-              <a:rPr lang="en-US" sz="800" dirty="0">
+              <a:rPr lang="en-US" sz="800" noProof="0" dirty="0">
                 <a:solidFill>
                   <a:srgbClr val="595959"/>
                 </a:solidFill>
@@ -6011,7 +6378,7 @@
               </a:rPr>
               <a:t>/Shutterstock</a:t>
             </a:r>
-            <a:endParaRPr lang="en-US" sz="800" dirty="0">
+            <a:endParaRPr lang="en-US" sz="800" noProof="0" dirty="0">
               <a:solidFill>
                 <a:schemeClr val="tx1">
                   <a:lumMod val="50000"/>
@@ -6093,7 +6460,7 @@
               </a:tabLst>
             </a:pPr>
             <a:r>
-              <a:rPr lang="en-IN" sz="1800" b="1" dirty="0">
+              <a:rPr lang="en-US" sz="1800" b="1" noProof="0" dirty="0">
                 <a:solidFill>
                   <a:srgbClr val="0078AE"/>
                 </a:solidFill>
@@ -6101,18 +6468,13 @@
               <a:t>	</a:t>
             </a:r>
             <a:r>
-              <a:rPr lang="de-DE" sz="1800" b="1" dirty="0">
+              <a:rPr lang="en-US" sz="1800" b="1" noProof="0" dirty="0">
                 <a:solidFill>
                   <a:srgbClr val="58585A"/>
                 </a:solidFill>
               </a:rPr>
               <a:t>Use an Inverse Variation Model</a:t>
             </a:r>
-            <a:endParaRPr lang="en-US" sz="1800" b="1" dirty="0">
-              <a:solidFill>
-                <a:srgbClr val="58585A"/>
-              </a:solidFill>
-            </a:endParaRPr>
           </a:p>
           <a:p>
             <a:pPr>
@@ -6121,19 +6483,19 @@
               </a:spcAft>
             </a:pPr>
             <a:r>
-              <a:rPr lang="en-US" b="1" dirty="0"/>
+              <a:rPr lang="en-US" b="1" noProof="0" dirty="0"/>
               <a:t>Step 1</a:t>
             </a:r>
             <a:r>
-              <a:rPr lang="en-US" dirty="0"/>
+              <a:rPr lang="en-US" noProof="0" dirty="0"/>
               <a:t>   Write the equation for an inverse variation and solve for </a:t>
             </a:r>
             <a:r>
-              <a:rPr lang="en-US" i="1" dirty="0"/>
+              <a:rPr lang="en-US" i="1" noProof="0" dirty="0"/>
               <a:t>k</a:t>
             </a:r>
             <a:r>
-              <a:rPr lang="en-US" dirty="0"/>
+              <a:rPr lang="en-US" noProof="0" dirty="0"/>
               <a:t>.</a:t>
             </a:r>
           </a:p>
@@ -6144,36 +6506,36 @@
               </a:spcAft>
             </a:pPr>
             <a:r>
-              <a:rPr lang="en-US" b="1" dirty="0"/>
+              <a:rPr lang="en-US" b="1" noProof="0" dirty="0"/>
               <a:t>Step 2</a:t>
             </a:r>
             <a:r>
-              <a:rPr lang="en-US" dirty="0"/>
+              <a:rPr lang="en-US" noProof="0" dirty="0"/>
               <a:t>   Substitute </a:t>
             </a:r>
             <a:r>
-              <a:rPr lang="en-US" i="1" dirty="0"/>
+              <a:rPr lang="en-US" i="1" noProof="0" dirty="0"/>
               <a:t>k</a:t>
             </a:r>
             <a:r>
-              <a:rPr lang="en-US" dirty="0"/>
+              <a:rPr lang="en-US" noProof="0" dirty="0"/>
               <a:t> = 8,570.38 in the inverse variation equation and then find </a:t>
             </a:r>
             <a:r>
-              <a:rPr lang="en-US" i="1" dirty="0"/>
+              <a:rPr lang="en-US" i="1" noProof="0" dirty="0"/>
               <a:t>f</a:t>
             </a:r>
             <a:r>
-              <a:rPr lang="en-US" dirty="0"/>
+              <a:rPr lang="en-US" noProof="0" dirty="0"/>
               <a:t>.</a:t>
             </a:r>
           </a:p>
           <a:p>
             <a:r>
-              <a:rPr lang="en-US" dirty="0"/>
+              <a:rPr lang="en-US" noProof="0" dirty="0"/>
               <a:t>So the frequency of the 13-inch string is 659.26 cycles per second.</a:t>
             </a:r>
-            <a:endParaRPr lang="en-IN" b="1" dirty="0">
+            <a:endParaRPr lang="en-US" b="1" noProof="0" dirty="0">
               <a:solidFill>
                 <a:schemeClr val="tx1"/>
               </a:solidFill>
@@ -6231,14 +6593,14 @@
           <a:lstStyle/>
           <a:p>
             <a:r>
-              <a:rPr lang="en-IN" sz="1800" b="1" cap="all" dirty="0">
+              <a:rPr lang="en-US" sz="1800" b="1" cap="all" noProof="0" dirty="0">
                 <a:solidFill>
                   <a:schemeClr val="bg1"/>
                 </a:solidFill>
               </a:rPr>
               <a:t>Example 3</a:t>
             </a:r>
-            <a:endParaRPr lang="en-US" sz="1800" cap="all" dirty="0"/>
+            <a:endParaRPr lang="en-US" sz="1800" cap="all" noProof="0" dirty="0"/>
           </a:p>
         </p:txBody>
       </p:sp>
@@ -6271,14 +6633,14 @@
           <a:lstStyle/>
           <a:p>
             <a:r>
-              <a:rPr lang="en-IN" sz="1800" b="1" dirty="0">
+              <a:rPr lang="en-US" sz="1800" b="1" noProof="0" dirty="0">
                 <a:solidFill>
                   <a:srgbClr val="137F97"/>
                 </a:solidFill>
               </a:rPr>
               <a:t>APPLICATION</a:t>
             </a:r>
-            <a:endParaRPr lang="en-IN" sz="1800" dirty="0">
+            <a:endParaRPr lang="en-US" sz="1800" noProof="0" dirty="0">
               <a:solidFill>
                 <a:srgbClr val="137F97"/>
               </a:solidFill>
@@ -6375,10 +6737,10 @@
           <a:lstStyle/>
           <a:p>
             <a:r>
-              <a:rPr lang="en-US" sz="1600" b="1" dirty="0"/>
+              <a:rPr lang="en-US" sz="1600" b="1" noProof="0" dirty="0"/>
               <a:t>The frequency of a 26-inch E-string is 329.63 cycles per second. What is the frequency when the string length is 13 inches?</a:t>
             </a:r>
-            <a:endParaRPr lang="en-IN" sz="1600" b="1" dirty="0">
+            <a:endParaRPr lang="en-US" sz="1600" b="1" noProof="0" dirty="0">
               <a:solidFill>
                 <a:schemeClr val="tx1"/>
               </a:solidFill>
@@ -6453,7 +6815,7 @@
               </a:tabLst>
             </a:pPr>
             <a:r>
-              <a:rPr lang="en-IN" sz="1800" b="1" dirty="0">
+              <a:rPr lang="en-US" sz="1800" b="1" noProof="0" dirty="0">
                 <a:solidFill>
                   <a:srgbClr val="0078AE"/>
                 </a:solidFill>
@@ -6461,26 +6823,13 @@
               <a:t>	</a:t>
             </a:r>
             <a:r>
-              <a:rPr lang="de-DE" sz="1800" b="1" dirty="0" err="1">
+              <a:rPr lang="en-US" sz="1800" b="1" noProof="0" dirty="0">
                 <a:solidFill>
                   <a:srgbClr val="58585A"/>
                 </a:solidFill>
               </a:rPr>
-              <a:t>Use</a:t>
-            </a:r>
-            <a:r>
-              <a:rPr lang="de-DE" sz="1800" b="1" dirty="0">
-                <a:solidFill>
-                  <a:srgbClr val="58585A"/>
-                </a:solidFill>
-              </a:rPr>
-              <a:t> an Inverse Variation Model</a:t>
-            </a:r>
-            <a:endParaRPr lang="en-IN" sz="1800" b="1" dirty="0">
-              <a:solidFill>
-                <a:srgbClr val="58585A"/>
-              </a:solidFill>
-            </a:endParaRPr>
+              <a:t>Use an Inverse Variation Model</a:t>
+            </a:r>
           </a:p>
           <a:p>
             <a:pPr marL="1476375" indent="-1466850">
@@ -6493,14 +6842,14 @@
               </a:tabLst>
             </a:pPr>
             <a:r>
-              <a:rPr lang="en-IN" sz="1800" b="1" dirty="0">
+              <a:rPr lang="en-US" sz="1800" b="1" noProof="0" dirty="0">
                 <a:solidFill>
                   <a:srgbClr val="D92B31"/>
                 </a:solidFill>
               </a:rPr>
               <a:t>Try It!</a:t>
             </a:r>
-            <a:endParaRPr lang="en-IN" sz="1800" b="1" dirty="0">
+            <a:endParaRPr lang="en-US" sz="1800" b="1" noProof="0" dirty="0">
               <a:solidFill>
                 <a:schemeClr val="tx1"/>
               </a:solidFill>
@@ -6512,18 +6861,18 @@
               <a:buAutoNum type="arabicPeriod" startAt="3"/>
             </a:pPr>
             <a:r>
-              <a:rPr lang="en-IN" sz="1600" b="1" dirty="0"/>
+              <a:rPr lang="en-US" sz="1600" b="1" noProof="0" dirty="0"/>
               <a:t>​</a:t>
             </a:r>
             <a:r>
-              <a:rPr lang="en-US" sz="1600" dirty="0"/>
+              <a:rPr lang="en-US" sz="1600" noProof="0" dirty="0"/>
               <a:t>The amount of time it takes for an ice cube to melt varies inversely to the air temperature, in degrees. At 20° Celsius, the ice will melt in 20 minutes.</a:t>
             </a:r>
             <a:br>
-              <a:rPr lang="en-US" sz="1600" dirty="0"/>
+              <a:rPr lang="en-US" sz="1600" noProof="0" dirty="0"/>
             </a:br>
             <a:r>
-              <a:rPr lang="en-US" sz="1600" dirty="0"/>
+              <a:rPr lang="en-US" sz="1600" noProof="0" dirty="0"/>
               <a:t>How long will it take the ice to melt if the temperature is 30° Celsius?</a:t>
             </a:r>
           </a:p>
@@ -6579,14 +6928,14 @@
           <a:lstStyle/>
           <a:p>
             <a:r>
-              <a:rPr lang="en-IN" sz="1800" b="1" cap="all" dirty="0">
+              <a:rPr lang="en-US" sz="1800" b="1" cap="all" noProof="0" dirty="0">
                 <a:solidFill>
                   <a:schemeClr val="bg1"/>
                 </a:solidFill>
               </a:rPr>
               <a:t>Example 3</a:t>
             </a:r>
-            <a:endParaRPr lang="en-US" sz="1800" cap="all" dirty="0"/>
+            <a:endParaRPr lang="en-US" sz="1800" cap="all" noProof="0" dirty="0"/>
           </a:p>
         </p:txBody>
       </p:sp>
@@ -6699,7 +7048,7 @@
               </a:tabLst>
             </a:pPr>
             <a:r>
-              <a:rPr lang="en-IN" sz="1800" b="1" dirty="0">
+              <a:rPr lang="en-US" sz="1800" b="1" noProof="0" dirty="0">
                 <a:solidFill>
                   <a:srgbClr val="0078AE"/>
                 </a:solidFill>
@@ -6707,18 +7056,13 @@
               <a:t>	</a:t>
             </a:r>
             <a:r>
-              <a:rPr lang="en-US" sz="1800" b="1" dirty="0">
+              <a:rPr lang="en-US" sz="1800" b="1" noProof="0" dirty="0">
                 <a:solidFill>
                   <a:srgbClr val="58585A"/>
                 </a:solidFill>
               </a:rPr>
               <a:t>Understand the Graph of the Reciprocal Function</a:t>
             </a:r>
-            <a:endParaRPr lang="en-IN" sz="1800" b="1" dirty="0">
-              <a:solidFill>
-                <a:srgbClr val="58585A"/>
-              </a:solidFill>
-            </a:endParaRPr>
           </a:p>
           <a:p>
             <a:pPr>
@@ -6727,7 +7071,7 @@
               </a:spcAft>
             </a:pPr>
             <a:r>
-              <a:rPr lang="en-IN" sz="1600" b="1" dirty="0">
+              <a:rPr lang="en-US" sz="1600" b="1" noProof="0" dirty="0">
                 <a:solidFill>
                   <a:schemeClr val="tx1"/>
                 </a:solidFill>
@@ -6735,7 +7079,7 @@
               <a:t>​</a:t>
             </a:r>
             <a:r>
-              <a:rPr lang="en-US" sz="1600" b="1" dirty="0"/>
+              <a:rPr lang="en-US" sz="1600" b="1" noProof="0" dirty="0"/>
               <a:t>What are the key features of the reciprocal function</a:t>
             </a:r>
           </a:p>
@@ -6746,11 +7090,11 @@
               </a:spcAft>
             </a:pPr>
             <a:r>
-              <a:rPr lang="en-US" dirty="0"/>
+              <a:rPr lang="en-US" noProof="0" dirty="0"/>
               <a:t>The </a:t>
             </a:r>
             <a:r>
-              <a:rPr lang="en-US" b="1" dirty="0">
+              <a:rPr lang="en-US" b="1" noProof="0" dirty="0">
                 <a:highlight>
                   <a:srgbClr val="FFFF00"/>
                 </a:highlight>
@@ -6758,7 +7102,7 @@
               <a:t>reciprocal function</a:t>
             </a:r>
             <a:r>
-              <a:rPr lang="en-US" dirty="0"/>
+              <a:rPr lang="en-US" noProof="0" dirty="0"/>
               <a:t>                 maps</a:t>
             </a:r>
           </a:p>
@@ -6769,14 +7113,14 @@
               </a:spcAft>
             </a:pPr>
             <a:r>
-              <a:rPr lang="en-US" dirty="0"/>
+              <a:rPr lang="en-US" noProof="0" dirty="0"/>
               <a:t>every non-zero real number to its reciprocal.</a:t>
             </a:r>
             <a:br>
-              <a:rPr lang="en-US" dirty="0"/>
+              <a:rPr lang="en-US" noProof="0" dirty="0"/>
             </a:br>
             <a:r>
-              <a:rPr lang="en-US" dirty="0"/>
+              <a:rPr lang="en-US" noProof="0" dirty="0"/>
               <a:t>Use technology to graph the function.</a:t>
             </a:r>
           </a:p>
@@ -6786,7 +7130,7 @@
                 <a:spcPts val="1200"/>
               </a:spcAft>
             </a:pPr>
-            <a:endParaRPr lang="en-US" dirty="0"/>
+            <a:endParaRPr lang="en-US" noProof="0" dirty="0"/>
           </a:p>
           <a:p>
             <a:pPr>
@@ -6794,7 +7138,7 @@
                 <a:spcPts val="1200"/>
               </a:spcAft>
             </a:pPr>
-            <a:endParaRPr lang="en-US" dirty="0"/>
+            <a:endParaRPr lang="en-US" noProof="0" dirty="0"/>
           </a:p>
         </p:txBody>
       </p:sp>
@@ -6848,14 +7192,14 @@
           <a:lstStyle/>
           <a:p>
             <a:r>
-              <a:rPr lang="en-IN" sz="1800" b="1" cap="all" dirty="0">
+              <a:rPr lang="en-US" sz="1800" b="1" cap="all" noProof="0" dirty="0">
                 <a:solidFill>
                   <a:schemeClr val="bg1"/>
                 </a:solidFill>
               </a:rPr>
               <a:t>Example 4</a:t>
             </a:r>
-            <a:endParaRPr lang="en-US" sz="1800" cap="all" dirty="0"/>
+            <a:endParaRPr lang="en-US" sz="1800" cap="all" noProof="0" dirty="0"/>
           </a:p>
         </p:txBody>
       </p:sp>
@@ -6888,14 +7232,14 @@
           <a:lstStyle/>
           <a:p>
             <a:r>
-              <a:rPr lang="en-IN" sz="1800" b="1" dirty="0">
+              <a:rPr lang="en-US" sz="1800" b="1" noProof="0" dirty="0">
                 <a:solidFill>
                   <a:srgbClr val="137F97"/>
                 </a:solidFill>
               </a:rPr>
               <a:t>CONCEPTUAL UNDERSTANDING</a:t>
             </a:r>
-            <a:endParaRPr lang="en-IN" sz="1800" dirty="0">
+            <a:endParaRPr lang="en-US" sz="1800" noProof="0" dirty="0">
               <a:solidFill>
                 <a:srgbClr val="137F97"/>
               </a:solidFill>
@@ -6955,68 +7299,8 @@
         </p:blipFill>
         <p:spPr>
           <a:xfrm>
-            <a:off x="3959820" y="1406726"/>
-            <a:ext cx="4279785" cy="2136307"/>
-          </a:xfrm>
-          <a:prstGeom prst="rect">
-            <a:avLst/>
-          </a:prstGeom>
-        </p:spPr>
-      </p:pic>
-      <p:pic>
-        <p:nvPicPr>
-          <p:cNvPr id="3" name="Picture 2">
-            <a:extLst>
-              <a:ext uri="{FF2B5EF4-FFF2-40B4-BE49-F238E27FC236}">
-                <a16:creationId xmlns:a16="http://schemas.microsoft.com/office/drawing/2014/main" id="{FA889227-1FB8-3069-6E1A-5957B65D6B29}"/>
-              </a:ext>
-            </a:extLst>
-          </p:cNvPr>
-          <p:cNvPicPr>
-            <a:picLocks noChangeAspect="1"/>
-          </p:cNvPicPr>
-          <p:nvPr/>
-        </p:nvPicPr>
-        <p:blipFill>
-          <a:blip r:embed="rId5"/>
-          <a:stretch>
-            <a:fillRect/>
-          </a:stretch>
-        </p:blipFill>
-        <p:spPr>
-          <a:xfrm>
-            <a:off x="2635927" y="3919282"/>
-            <a:ext cx="176336" cy="118570"/>
-          </a:xfrm>
-          <a:prstGeom prst="rect">
-            <a:avLst/>
-          </a:prstGeom>
-        </p:spPr>
-      </p:pic>
-      <p:pic>
-        <p:nvPicPr>
-          <p:cNvPr id="8" name="Picture 7">
-            <a:extLst>
-              <a:ext uri="{FF2B5EF4-FFF2-40B4-BE49-F238E27FC236}">
-                <a16:creationId xmlns:a16="http://schemas.microsoft.com/office/drawing/2014/main" id="{573459FF-011E-EA61-ABF7-695A5CF8B036}"/>
-              </a:ext>
-            </a:extLst>
-          </p:cNvPr>
-          <p:cNvPicPr>
-            <a:picLocks noChangeAspect="1"/>
-          </p:cNvPicPr>
-          <p:nvPr/>
-        </p:nvPicPr>
-        <p:blipFill>
-          <a:blip r:embed="rId6"/>
-          <a:stretch>
-            <a:fillRect/>
-          </a:stretch>
-        </p:blipFill>
-        <p:spPr>
-          <a:xfrm>
-            <a:off x="3057266" y="3922322"/>
-            <a:ext cx="300987" cy="112491"/>
+            <a:off x="311404" y="2361518"/>
+            <a:ext cx="8230515" cy="4108362"/>
           </a:xfrm>
           <a:prstGeom prst="rect">
             <a:avLst/>
@@ -7038,7 +7322,7 @@
           <p:nvPr/>
         </p:nvPicPr>
         <p:blipFill>
-          <a:blip r:embed="rId7"/>
+          <a:blip r:embed="rId5"/>
           <a:stretch>
             <a:fillRect/>
           </a:stretch>
@@ -7120,7 +7404,7 @@
               </a:tabLst>
             </a:pPr>
             <a:r>
-              <a:rPr lang="en-IN" sz="1800" b="1" dirty="0">
+              <a:rPr lang="en-US" sz="1800" b="1" noProof="0" dirty="0">
                 <a:solidFill>
                   <a:srgbClr val="0078AE"/>
                 </a:solidFill>
@@ -7128,18 +7412,13 @@
               <a:t>	</a:t>
             </a:r>
             <a:r>
-              <a:rPr lang="en-US" sz="1800" b="1" dirty="0">
+              <a:rPr lang="en-US" sz="1800" b="1" noProof="0" dirty="0">
                 <a:solidFill>
                   <a:srgbClr val="58585A"/>
                 </a:solidFill>
               </a:rPr>
               <a:t>Understand the Graph of the Reciprocal Function</a:t>
             </a:r>
-            <a:endParaRPr lang="en-IN" sz="1800" b="1" dirty="0">
-              <a:solidFill>
-                <a:srgbClr val="58585A"/>
-              </a:solidFill>
-            </a:endParaRPr>
           </a:p>
           <a:p>
             <a:pPr>
@@ -7148,7 +7427,7 @@
               </a:spcAft>
             </a:pPr>
             <a:r>
-              <a:rPr lang="en-IN" sz="1600" b="1" dirty="0">
+              <a:rPr lang="en-US" sz="1600" b="1" noProof="0" dirty="0">
                 <a:solidFill>
                   <a:schemeClr val="tx1"/>
                 </a:solidFill>
@@ -7156,7 +7435,7 @@
               <a:t>​</a:t>
             </a:r>
             <a:r>
-              <a:rPr lang="en-US" sz="1600" b="1" dirty="0"/>
+              <a:rPr lang="en-US" sz="1600" b="1" noProof="0" dirty="0"/>
               <a:t>What are the key features of the reciprocal function</a:t>
             </a:r>
           </a:p>
@@ -7167,42 +7446,42 @@
               </a:spcAft>
             </a:pPr>
             <a:r>
-              <a:rPr lang="en-US" dirty="0"/>
+              <a:rPr lang="en-US" noProof="0" dirty="0"/>
               <a:t>The graph of </a:t>
             </a:r>
             <a:r>
-              <a:rPr lang="en-US" i="1" dirty="0"/>
+              <a:rPr lang="en-US" i="1" noProof="0" dirty="0"/>
               <a:t>f</a:t>
             </a:r>
             <a:r>
-              <a:rPr lang="en-US" dirty="0"/>
+              <a:rPr lang="en-US" noProof="0" dirty="0"/>
               <a:t> has a horizontal </a:t>
             </a:r>
             <a:r>
-              <a:rPr lang="en-US" i="1" dirty="0"/>
+              <a:rPr lang="en-US" i="1" noProof="0" dirty="0"/>
               <a:t>asymptote</a:t>
             </a:r>
             <a:r>
-              <a:rPr lang="en-US" dirty="0"/>
+              <a:rPr lang="en-US" noProof="0" dirty="0"/>
               <a:t> </a:t>
             </a:r>
             <a:r>
-              <a:rPr lang="en-US" i="1" dirty="0"/>
+              <a:rPr lang="en-US" i="1" noProof="0" dirty="0"/>
               <a:t>y</a:t>
             </a:r>
             <a:r>
-              <a:rPr lang="en-US" dirty="0"/>
+              <a:rPr lang="en-US" noProof="0" dirty="0"/>
               <a:t> = 0.</a:t>
             </a:r>
             <a:br>
-              <a:rPr lang="en-US" dirty="0"/>
+              <a:rPr lang="en-US" noProof="0" dirty="0"/>
             </a:br>
             <a:r>
-              <a:rPr lang="en-US" dirty="0"/>
+              <a:rPr lang="en-US" noProof="0" dirty="0"/>
               <a:t>An </a:t>
             </a:r>
             <a:r>
-              <a:rPr lang="en-US" b="1" dirty="0">
+              <a:rPr lang="en-US" b="1" noProof="0" dirty="0">
                 <a:highlight>
                   <a:srgbClr val="FFFF00"/>
                 </a:highlight>
@@ -7210,7 +7489,7 @@
               <a:t>asymptote</a:t>
             </a:r>
             <a:r>
-              <a:rPr lang="en-US" dirty="0"/>
+              <a:rPr lang="en-US" noProof="0" dirty="0"/>
               <a:t> is a line that a graph approaches.</a:t>
             </a:r>
           </a:p>
@@ -7221,107 +7500,107 @@
               </a:spcAft>
             </a:pPr>
             <a:r>
-              <a:rPr lang="en-US" dirty="0"/>
+              <a:rPr lang="en-US" noProof="0" dirty="0"/>
               <a:t>Recall that a fraction with a denominator of 0 is</a:t>
             </a:r>
             <a:br>
-              <a:rPr lang="en-US" dirty="0"/>
+              <a:rPr lang="en-US" noProof="0" dirty="0"/>
             </a:br>
             <a:r>
-              <a:rPr lang="en-US" dirty="0"/>
+              <a:rPr lang="en-US" noProof="0" dirty="0"/>
               <a:t>undefined. Use the TRACE feature again with</a:t>
             </a:r>
             <a:br>
-              <a:rPr lang="en-US" dirty="0"/>
+              <a:rPr lang="en-US" noProof="0" dirty="0"/>
             </a:br>
             <a:r>
-              <a:rPr lang="en-US" i="1" dirty="0"/>
+              <a:rPr lang="en-US" i="1" noProof="0" dirty="0"/>
               <a:t>x</a:t>
             </a:r>
             <a:r>
-              <a:rPr lang="en-US" dirty="0"/>
+              <a:rPr lang="en-US" noProof="0" dirty="0"/>
               <a:t>-values close to 0. For positive </a:t>
             </a:r>
             <a:r>
-              <a:rPr lang="en-US" i="1" dirty="0"/>
+              <a:rPr lang="en-US" i="1" noProof="0" dirty="0"/>
               <a:t>x</a:t>
             </a:r>
             <a:r>
-              <a:rPr lang="en-US" dirty="0"/>
+              <a:rPr lang="en-US" noProof="0" dirty="0"/>
               <a:t>-values,</a:t>
             </a:r>
             <a:br>
-              <a:rPr lang="en-US" dirty="0"/>
+              <a:rPr lang="en-US" noProof="0" dirty="0"/>
             </a:br>
             <a:r>
-              <a:rPr lang="en-US" dirty="0"/>
+              <a:rPr lang="en-US" noProof="0" dirty="0"/>
               <a:t>as </a:t>
             </a:r>
             <a:r>
-              <a:rPr lang="en-US" i="1" dirty="0"/>
+              <a:rPr lang="en-US" i="1" noProof="0" dirty="0"/>
               <a:t>x</a:t>
             </a:r>
             <a:r>
-              <a:rPr lang="en-US" dirty="0"/>
+              <a:rPr lang="en-US" noProof="0" dirty="0"/>
               <a:t> approaches 0, </a:t>
             </a:r>
             <a:r>
-              <a:rPr lang="en-US" i="1" dirty="0"/>
+              <a:rPr lang="en-US" i="1" noProof="0" dirty="0"/>
               <a:t>f</a:t>
             </a:r>
             <a:r>
-              <a:rPr lang="en-US" dirty="0"/>
+              <a:rPr lang="en-US" noProof="0" dirty="0"/>
               <a:t>(</a:t>
             </a:r>
             <a:r>
-              <a:rPr lang="en-US" i="1" dirty="0"/>
+              <a:rPr lang="en-US" i="1" noProof="0" dirty="0"/>
               <a:t>x</a:t>
             </a:r>
             <a:r>
-              <a:rPr lang="en-US" dirty="0"/>
+              <a:rPr lang="en-US" noProof="0" dirty="0"/>
               <a:t>) goes to    . For negative</a:t>
             </a:r>
             <a:br>
-              <a:rPr lang="en-US" dirty="0"/>
+              <a:rPr lang="en-US" noProof="0" dirty="0"/>
             </a:br>
             <a:r>
-              <a:rPr lang="en-US" i="1" dirty="0"/>
+              <a:rPr lang="en-US" i="1" noProof="0" dirty="0"/>
               <a:t>x</a:t>
             </a:r>
             <a:r>
-              <a:rPr lang="en-US" dirty="0"/>
+              <a:rPr lang="en-US" noProof="0" dirty="0"/>
               <a:t>-values, as </a:t>
             </a:r>
             <a:r>
-              <a:rPr lang="en-US" i="1" dirty="0"/>
+              <a:rPr lang="en-US" i="1" noProof="0" dirty="0"/>
               <a:t>x</a:t>
             </a:r>
             <a:r>
-              <a:rPr lang="en-US" dirty="0"/>
+              <a:rPr lang="en-US" noProof="0" dirty="0"/>
               <a:t> approaches 0, </a:t>
             </a:r>
             <a:r>
-              <a:rPr lang="en-US" i="1" dirty="0"/>
+              <a:rPr lang="en-US" i="1" noProof="0" dirty="0"/>
               <a:t>f</a:t>
             </a:r>
             <a:r>
-              <a:rPr lang="en-US" dirty="0"/>
+              <a:rPr lang="en-US" noProof="0" dirty="0"/>
               <a:t>(</a:t>
             </a:r>
             <a:r>
-              <a:rPr lang="en-US" i="1" dirty="0"/>
+              <a:rPr lang="en-US" i="1" noProof="0" dirty="0"/>
               <a:t>x</a:t>
             </a:r>
             <a:r>
-              <a:rPr lang="en-US" dirty="0"/>
+              <a:rPr lang="en-US" noProof="0" dirty="0"/>
               <a:t>) goes to      </a:t>
             </a:r>
             <a:r>
-              <a:rPr lang="en-US" sz="900" dirty="0"/>
+              <a:rPr lang="en-US" sz="900" noProof="0" dirty="0"/>
               <a:t> </a:t>
             </a:r>
             <a:r>
-              <a:rPr lang="en-US" dirty="0"/>
+              <a:rPr lang="en-US" noProof="0" dirty="0"/>
               <a:t>.</a:t>
             </a:r>
           </a:p>
@@ -7332,23 +7611,23 @@
               </a:spcAft>
             </a:pPr>
             <a:r>
-              <a:rPr lang="en-US" dirty="0"/>
+              <a:rPr lang="en-US" noProof="0" dirty="0"/>
               <a:t>The graph of </a:t>
             </a:r>
             <a:r>
-              <a:rPr lang="en-US" i="1" dirty="0"/>
+              <a:rPr lang="en-US" i="1" noProof="0" dirty="0"/>
               <a:t>f</a:t>
             </a:r>
             <a:r>
-              <a:rPr lang="en-US" dirty="0"/>
+              <a:rPr lang="en-US" noProof="0" dirty="0"/>
               <a:t> has a vertical asymptote </a:t>
             </a:r>
             <a:r>
-              <a:rPr lang="en-US" i="1" dirty="0"/>
+              <a:rPr lang="en-US" i="1" noProof="0" dirty="0"/>
               <a:t>x</a:t>
             </a:r>
             <a:r>
-              <a:rPr lang="en-US" dirty="0"/>
+              <a:rPr lang="en-US" noProof="0" dirty="0"/>
               <a:t> = 0.</a:t>
             </a:r>
           </a:p>
@@ -7359,7 +7638,7 @@
               </a:spcAft>
             </a:pPr>
             <a:r>
-              <a:rPr lang="en-US" dirty="0"/>
+              <a:rPr lang="en-US" noProof="0" dirty="0"/>
               <a:t>The domain of                               . The range</a:t>
             </a:r>
           </a:p>
@@ -7370,23 +7649,23 @@
               </a:spcAft>
             </a:pPr>
             <a:r>
-              <a:rPr lang="en-US" dirty="0"/>
+              <a:rPr lang="en-US" noProof="0" dirty="0"/>
               <a:t>is {</a:t>
             </a:r>
             <a:r>
-              <a:rPr lang="en-US" i="1" dirty="0"/>
+              <a:rPr lang="en-US" i="1" noProof="0" dirty="0"/>
               <a:t>y</a:t>
             </a:r>
             <a:r>
-              <a:rPr lang="en-US" dirty="0"/>
+              <a:rPr lang="en-US" noProof="0" dirty="0"/>
               <a:t> | </a:t>
             </a:r>
             <a:r>
-              <a:rPr lang="en-US" i="1" dirty="0"/>
+              <a:rPr lang="en-US" i="1" noProof="0" dirty="0"/>
               <a:t>y</a:t>
             </a:r>
             <a:r>
-              <a:rPr lang="en-US" dirty="0"/>
+              <a:rPr lang="en-US" noProof="0" dirty="0"/>
               <a:t> ≠ 0}.</a:t>
             </a:r>
           </a:p>
@@ -7397,42 +7676,42 @@
               </a:spcAft>
             </a:pPr>
             <a:r>
-              <a:rPr lang="en-US" dirty="0"/>
+              <a:rPr lang="en-US" noProof="0" dirty="0"/>
               <a:t>The end behavior is </a:t>
             </a:r>
             <a:r>
-              <a:rPr lang="en-US" i="1" dirty="0"/>
+              <a:rPr lang="en-US" i="1" noProof="0" dirty="0"/>
               <a:t>f</a:t>
             </a:r>
             <a:r>
-              <a:rPr lang="en-US" dirty="0"/>
+              <a:rPr lang="en-US" noProof="0" dirty="0"/>
               <a:t>(</a:t>
             </a:r>
             <a:r>
-              <a:rPr lang="en-US" i="1" dirty="0"/>
+              <a:rPr lang="en-US" i="1" noProof="0" dirty="0"/>
               <a:t>x</a:t>
             </a:r>
             <a:r>
-              <a:rPr lang="en-US" dirty="0"/>
+              <a:rPr lang="en-US" noProof="0" dirty="0"/>
               <a:t>) → 0 as </a:t>
             </a:r>
             <a:r>
-              <a:rPr lang="en-US" i="1" dirty="0"/>
+              <a:rPr lang="en-US" i="1" noProof="0" dirty="0"/>
               <a:t>x</a:t>
             </a:r>
             <a:r>
-              <a:rPr lang="en-US" dirty="0"/>
+              <a:rPr lang="en-US" noProof="0" dirty="0"/>
               <a:t> → ±   </a:t>
             </a:r>
             <a:r>
-              <a:rPr lang="en-US" sz="1200" dirty="0"/>
+              <a:rPr lang="en-US" sz="1200" noProof="0" dirty="0"/>
               <a:t>  </a:t>
             </a:r>
             <a:r>
-              <a:rPr lang="en-US" dirty="0"/>
+              <a:rPr lang="en-US" noProof="0" dirty="0"/>
               <a:t>.</a:t>
             </a:r>
-            <a:endParaRPr lang="en-IN" b="1" dirty="0">
+            <a:endParaRPr lang="en-US" b="1" noProof="0" dirty="0">
               <a:solidFill>
                 <a:schemeClr val="tx1"/>
               </a:solidFill>
@@ -7490,14 +7769,14 @@
           <a:lstStyle/>
           <a:p>
             <a:r>
-              <a:rPr lang="en-IN" sz="1800" b="1" cap="all" dirty="0">
+              <a:rPr lang="en-US" sz="1800" b="1" cap="all" noProof="0" dirty="0">
                 <a:solidFill>
                   <a:schemeClr val="bg1"/>
                 </a:solidFill>
               </a:rPr>
               <a:t>Example 4</a:t>
             </a:r>
-            <a:endParaRPr lang="en-US" sz="1800" cap="all" dirty="0"/>
+            <a:endParaRPr lang="en-US" sz="1800" cap="all" noProof="0" dirty="0"/>
           </a:p>
         </p:txBody>
       </p:sp>
@@ -7530,14 +7809,14 @@
           <a:lstStyle/>
           <a:p>
             <a:r>
-              <a:rPr lang="en-IN" sz="1800" b="1" dirty="0">
+              <a:rPr lang="en-US" sz="1800" b="1" noProof="0" dirty="0">
                 <a:solidFill>
                   <a:srgbClr val="137F97"/>
                 </a:solidFill>
               </a:rPr>
               <a:t>CONCEPTUAL UNDERSTANDING</a:t>
             </a:r>
-            <a:endParaRPr lang="en-IN" sz="1800" dirty="0">
+            <a:endParaRPr lang="en-US" sz="1800" noProof="0" dirty="0">
               <a:solidFill>
                 <a:srgbClr val="137F97"/>
               </a:solidFill>
@@ -7792,7 +8071,7 @@
               </a:tabLst>
             </a:pPr>
             <a:r>
-              <a:rPr lang="en-IN" sz="1800" b="1" dirty="0">
+              <a:rPr lang="en-US" sz="1800" b="1" noProof="0" dirty="0">
                 <a:solidFill>
                   <a:srgbClr val="0078AE"/>
                 </a:solidFill>
@@ -7800,18 +8079,13 @@
               <a:t>	</a:t>
             </a:r>
             <a:r>
-              <a:rPr lang="en-US" sz="1800" b="1" dirty="0">
+              <a:rPr lang="en-US" sz="1800" b="1" noProof="0" dirty="0">
                 <a:solidFill>
                   <a:srgbClr val="58585A"/>
                 </a:solidFill>
               </a:rPr>
               <a:t>Understand the Graph of the Reciprocal Function</a:t>
             </a:r>
-            <a:endParaRPr lang="en-IN" sz="1800" b="1" dirty="0">
-              <a:solidFill>
-                <a:srgbClr val="58585A"/>
-              </a:solidFill>
-            </a:endParaRPr>
           </a:p>
           <a:p>
             <a:pPr marL="1476375" indent="-1466850">
@@ -7824,14 +8098,14 @@
               </a:tabLst>
             </a:pPr>
             <a:r>
-              <a:rPr lang="en-IN" sz="1800" b="1" dirty="0">
+              <a:rPr lang="en-US" sz="1800" b="1" noProof="0" dirty="0">
                 <a:solidFill>
                   <a:srgbClr val="D92B31"/>
                 </a:solidFill>
               </a:rPr>
               <a:t>Try It!</a:t>
             </a:r>
-            <a:endParaRPr lang="en-IN" sz="1800" b="1" dirty="0">
+            <a:endParaRPr lang="en-US" sz="1800" b="1" noProof="0" dirty="0">
               <a:solidFill>
                 <a:schemeClr val="tx1"/>
               </a:solidFill>
@@ -7846,19 +8120,19 @@
               <a:buAutoNum type="arabicPeriod" startAt="4"/>
             </a:pPr>
             <a:r>
-              <a:rPr lang="en-IN" sz="1600" b="1" dirty="0"/>
+              <a:rPr lang="en-US" sz="1600" b="1" noProof="0" dirty="0"/>
               <a:t>​</a:t>
             </a:r>
             <a:r>
-              <a:rPr lang="en-US" sz="1600" dirty="0"/>
+              <a:rPr lang="en-US" sz="1600" noProof="0" dirty="0"/>
               <a:t>Graph the function             </a:t>
             </a:r>
             <a:r>
-              <a:rPr lang="en-US" dirty="0"/>
+              <a:rPr lang="en-US" noProof="0" dirty="0"/>
               <a:t>   </a:t>
             </a:r>
             <a:r>
-              <a:rPr lang="en-US" sz="1600" dirty="0"/>
+              <a:rPr lang="en-US" sz="1600" noProof="0" dirty="0"/>
               <a:t>. What are the domain, range, and asymptotes of the function?</a:t>
             </a:r>
           </a:p>
@@ -7914,14 +8188,14 @@
           <a:lstStyle/>
           <a:p>
             <a:r>
-              <a:rPr lang="en-IN" sz="1800" b="1" cap="all" dirty="0">
+              <a:rPr lang="en-US" sz="1800" b="1" cap="all" noProof="0" dirty="0">
                 <a:solidFill>
                   <a:schemeClr val="bg1"/>
                 </a:solidFill>
               </a:rPr>
               <a:t>Example 4</a:t>
             </a:r>
-            <a:endParaRPr lang="en-US" sz="1800" cap="all" dirty="0"/>
+            <a:endParaRPr lang="en-US" sz="1800" cap="all" noProof="0" dirty="0"/>
           </a:p>
         </p:txBody>
       </p:sp>
@@ -7989,7 +8263,7 @@
           </a:bodyPr>
           <a:lstStyle/>
           <a:p>
-            <a:endParaRPr lang="en-US" dirty="0"/>
+            <a:endParaRPr lang="en-US" noProof="0" dirty="0"/>
           </a:p>
         </p:txBody>
       </p:sp>
@@ -8090,7 +8364,7 @@
               </a:tabLst>
             </a:pPr>
             <a:r>
-              <a:rPr lang="en-IN" sz="1800" b="1" dirty="0">
+              <a:rPr lang="en-US" sz="1800" b="1" noProof="0" dirty="0">
                 <a:solidFill>
                   <a:srgbClr val="0078AE"/>
                 </a:solidFill>
@@ -8098,10 +8372,10 @@
               <a:t>	</a:t>
             </a:r>
             <a:r>
-              <a:rPr lang="en-US" sz="1800" b="1" dirty="0"/>
+              <a:rPr lang="en-US" sz="1800" b="1" noProof="0" dirty="0"/>
               <a:t>Graph Translations of the Reciprocal Function</a:t>
             </a:r>
-            <a:endParaRPr lang="en-IN" sz="1800" b="1" dirty="0">
+            <a:endParaRPr lang="en-US" sz="1800" b="1" noProof="0" dirty="0">
               <a:solidFill>
                 <a:srgbClr val="58585A"/>
               </a:solidFill>
@@ -8114,7 +8388,7 @@
               </a:spcAft>
             </a:pPr>
             <a:r>
-              <a:rPr lang="en-IN" sz="1600" b="1" dirty="0">
+              <a:rPr lang="en-US" sz="1600" b="1" noProof="0" dirty="0">
                 <a:solidFill>
                   <a:schemeClr val="tx1"/>
                 </a:solidFill>
@@ -8122,15 +8396,15 @@
               <a:t>​</a:t>
             </a:r>
             <a:r>
-              <a:rPr lang="en-US" sz="1600" b="1" dirty="0"/>
+              <a:rPr lang="en-US" sz="1600" b="1" noProof="0" dirty="0"/>
               <a:t>Graph                            </a:t>
             </a:r>
             <a:r>
-              <a:rPr lang="en-US" sz="1050" b="1" dirty="0"/>
+              <a:rPr lang="en-US" sz="1050" b="1" noProof="0" dirty="0"/>
               <a:t>  </a:t>
             </a:r>
             <a:r>
-              <a:rPr lang="en-US" sz="1600" b="1" dirty="0"/>
+              <a:rPr lang="en-US" sz="1600" b="1" noProof="0" dirty="0"/>
               <a:t>What are the equations of the asymptotes?</a:t>
             </a:r>
           </a:p>
@@ -8141,7 +8415,7 @@
               </a:spcAft>
             </a:pPr>
             <a:r>
-              <a:rPr lang="en-US" sz="1600" b="1" dirty="0"/>
+              <a:rPr lang="en-US" sz="1600" b="1" noProof="0" dirty="0"/>
               <a:t>What are the domain and range?</a:t>
             </a:r>
           </a:p>
@@ -8152,7 +8426,7 @@
               </a:spcAft>
             </a:pPr>
             <a:r>
-              <a:rPr lang="en-US" dirty="0"/>
+              <a:rPr lang="en-US" noProof="0" dirty="0"/>
               <a:t>Use technology to graph the parent function, </a:t>
             </a:r>
           </a:p>
@@ -8162,7 +8436,7 @@
                 <a:spcPts val="600"/>
               </a:spcAft>
             </a:pPr>
-            <a:endParaRPr lang="en-US" dirty="0"/>
+            <a:endParaRPr lang="en-US" noProof="0" dirty="0"/>
           </a:p>
         </p:txBody>
       </p:sp>
@@ -8216,14 +8490,14 @@
           <a:lstStyle/>
           <a:p>
             <a:r>
-              <a:rPr lang="en-IN" sz="1800" b="1" cap="all" dirty="0">
+              <a:rPr lang="en-US" sz="1800" b="1" cap="all" noProof="0" dirty="0">
                 <a:solidFill>
                   <a:schemeClr val="bg1"/>
                 </a:solidFill>
               </a:rPr>
               <a:t>Example 5</a:t>
             </a:r>
-            <a:endParaRPr lang="en-US" sz="1800" cap="all" dirty="0"/>
+            <a:endParaRPr lang="en-US" sz="1800" cap="all" noProof="0" dirty="0"/>
           </a:p>
         </p:txBody>
       </p:sp>
@@ -8279,8 +8553,8 @@
         </p:blipFill>
         <p:spPr>
           <a:xfrm>
-            <a:off x="426580" y="1852094"/>
-            <a:ext cx="2265347" cy="2315528"/>
+            <a:off x="4261096" y="1759555"/>
+            <a:ext cx="4765906" cy="4871478"/>
           </a:xfrm>
           <a:prstGeom prst="rect">
             <a:avLst/>
@@ -8362,7 +8636,7 @@
         <p:spPr>
           <a:xfrm>
             <a:off x="355758" y="365205"/>
-            <a:ext cx="8321209" cy="5288627"/>
+            <a:ext cx="8321209" cy="6058069"/>
           </a:xfrm>
           <a:prstGeom prst="rect">
             <a:avLst/>
@@ -8384,7 +8658,7 @@
               </a:tabLst>
             </a:pPr>
             <a:r>
-              <a:rPr lang="en-IN" sz="1800" b="1" dirty="0">
+              <a:rPr lang="en-US" sz="1800" b="1" noProof="0" dirty="0">
                 <a:solidFill>
                   <a:srgbClr val="0078AE"/>
                 </a:solidFill>
@@ -8392,10 +8666,10 @@
               <a:t>	</a:t>
             </a:r>
             <a:r>
-              <a:rPr lang="en-US" sz="1800" b="1" dirty="0"/>
+              <a:rPr lang="en-US" sz="1800" b="1" noProof="0" dirty="0"/>
               <a:t>Graph Translations of the Reciprocal Function</a:t>
             </a:r>
-            <a:endParaRPr lang="en-IN" sz="1800" b="1" dirty="0">
+            <a:endParaRPr lang="en-US" sz="1800" b="1" noProof="0" dirty="0">
               <a:solidFill>
                 <a:srgbClr val="58585A"/>
               </a:solidFill>
@@ -8408,7 +8682,7 @@
               </a:spcAft>
             </a:pPr>
             <a:r>
-              <a:rPr lang="en-IN" sz="1600" b="1" dirty="0">
+              <a:rPr lang="en-US" sz="1600" b="1" noProof="0" dirty="0">
                 <a:solidFill>
                   <a:schemeClr val="tx1"/>
                 </a:solidFill>
@@ -8416,15 +8690,15 @@
               <a:t>​</a:t>
             </a:r>
             <a:r>
-              <a:rPr lang="en-US" sz="1600" b="1" dirty="0"/>
+              <a:rPr lang="en-US" sz="1600" b="1" noProof="0" dirty="0"/>
               <a:t>Graph                           </a:t>
             </a:r>
             <a:r>
-              <a:rPr lang="en-US" sz="1200" b="1" dirty="0"/>
+              <a:rPr lang="en-US" sz="1200" b="1" noProof="0" dirty="0"/>
               <a:t>   </a:t>
             </a:r>
             <a:r>
-              <a:rPr lang="en-US" sz="1600" b="1" dirty="0"/>
+              <a:rPr lang="en-US" sz="1600" b="1" noProof="0" dirty="0"/>
               <a:t>What are the equations of the asymptotes?</a:t>
             </a:r>
           </a:p>
@@ -8435,7 +8709,7 @@
               </a:spcAft>
             </a:pPr>
             <a:r>
-              <a:rPr lang="en-US" sz="1600" b="1" dirty="0"/>
+              <a:rPr lang="en-US" sz="1600" b="1" noProof="0" dirty="0"/>
               <a:t>What are the domain and range?</a:t>
             </a:r>
           </a:p>
@@ -8446,39 +8720,39 @@
               </a:spcAft>
             </a:pPr>
             <a:r>
-              <a:rPr lang="en-US" dirty="0"/>
+              <a:rPr lang="en-US" noProof="0" dirty="0"/>
               <a:t>In terms of </a:t>
             </a:r>
             <a:r>
-              <a:rPr lang="en-US" i="1" dirty="0"/>
+              <a:rPr lang="en-US" i="1" noProof="0" dirty="0"/>
               <a:t>f</a:t>
             </a:r>
             <a:r>
-              <a:rPr lang="en-US" dirty="0"/>
+              <a:rPr lang="en-US" noProof="0" dirty="0"/>
               <a:t>(</a:t>
             </a:r>
             <a:r>
-              <a:rPr lang="en-US" i="1" dirty="0"/>
+              <a:rPr lang="en-US" i="1" noProof="0" dirty="0"/>
               <a:t>x</a:t>
             </a:r>
             <a:r>
-              <a:rPr lang="en-US" dirty="0"/>
+              <a:rPr lang="en-US" noProof="0" dirty="0"/>
               <a:t>), you can write </a:t>
             </a:r>
             <a:r>
-              <a:rPr lang="en-US" i="1" dirty="0"/>
+              <a:rPr lang="en-US" i="1" noProof="0" dirty="0"/>
               <a:t>g</a:t>
             </a:r>
             <a:r>
-              <a:rPr lang="en-US" dirty="0"/>
+              <a:rPr lang="en-US" noProof="0" dirty="0"/>
               <a:t>(</a:t>
             </a:r>
             <a:r>
-              <a:rPr lang="en-US" i="1" dirty="0"/>
+              <a:rPr lang="en-US" i="1" noProof="0" dirty="0"/>
               <a:t>x</a:t>
             </a:r>
             <a:r>
-              <a:rPr lang="en-US" dirty="0"/>
+              <a:rPr lang="en-US" noProof="0" dirty="0"/>
               <a:t>) as </a:t>
             </a:r>
           </a:p>
@@ -8489,25 +8763,89 @@
               </a:spcAft>
             </a:pPr>
             <a:r>
-              <a:rPr lang="en-US" dirty="0"/>
+              <a:rPr lang="en-US" noProof="0" dirty="0"/>
               <a:t>Therefore, the graph of </a:t>
             </a:r>
             <a:r>
-              <a:rPr lang="en-US" i="1" dirty="0"/>
+              <a:rPr lang="en-US" i="1" noProof="0" dirty="0"/>
               <a:t>g</a:t>
             </a:r>
             <a:r>
-              <a:rPr lang="en-US" dirty="0"/>
+              <a:rPr lang="en-US" noProof="0" dirty="0"/>
               <a:t> is the graph of </a:t>
             </a:r>
             <a:r>
-              <a:rPr lang="en-US" i="1" dirty="0"/>
+              <a:rPr lang="en-US" i="1" noProof="0" dirty="0"/>
               <a:t>f</a:t>
             </a:r>
             <a:r>
-              <a:rPr lang="en-US" dirty="0"/>
+              <a:rPr lang="en-US" noProof="0" dirty="0"/>
               <a:t> translated 3 units right and 2 units up.</a:t>
             </a:r>
+          </a:p>
+          <a:p>
+            <a:pPr>
+              <a:spcAft>
+                <a:spcPts val="600"/>
+              </a:spcAft>
+            </a:pPr>
+            <a:endParaRPr lang="en-US" noProof="0" dirty="0"/>
+          </a:p>
+          <a:p>
+            <a:pPr>
+              <a:spcAft>
+                <a:spcPts val="600"/>
+              </a:spcAft>
+            </a:pPr>
+            <a:endParaRPr lang="en-US" noProof="0" dirty="0"/>
+          </a:p>
+          <a:p>
+            <a:pPr>
+              <a:spcAft>
+                <a:spcPts val="600"/>
+              </a:spcAft>
+            </a:pPr>
+            <a:endParaRPr lang="en-US" noProof="0" dirty="0"/>
+          </a:p>
+          <a:p>
+            <a:pPr>
+              <a:spcAft>
+                <a:spcPts val="600"/>
+              </a:spcAft>
+            </a:pPr>
+            <a:endParaRPr lang="en-US" noProof="0" dirty="0"/>
+          </a:p>
+          <a:p>
+            <a:pPr>
+              <a:spcAft>
+                <a:spcPts val="600"/>
+              </a:spcAft>
+            </a:pPr>
+            <a:endParaRPr lang="en-US" noProof="0" dirty="0"/>
+          </a:p>
+          <a:p>
+            <a:pPr>
+              <a:spcAft>
+                <a:spcPts val="600"/>
+              </a:spcAft>
+            </a:pPr>
+            <a:endParaRPr lang="en-US" noProof="0" dirty="0"/>
+          </a:p>
+          <a:p>
+            <a:pPr>
+              <a:spcAft>
+                <a:spcPts val="600"/>
+              </a:spcAft>
+            </a:pPr>
+            <a:endParaRPr lang="en-US" noProof="0" dirty="0"/>
+          </a:p>
+          <a:p>
+            <a:pPr>
+              <a:spcAft>
+                <a:spcPts val="600"/>
+              </a:spcAft>
+            </a:pPr>
+            <a:endParaRPr lang="en-US" noProof="0" dirty="0"/>
           </a:p>
           <a:p>
             <a:pPr>
@@ -8523,7 +8861,7 @@
                 <a:spcPts val="600"/>
               </a:spcAft>
             </a:pPr>
-            <a:endParaRPr lang="en-US" dirty="0"/>
+            <a:endParaRPr lang="en-US" noProof="0" dirty="0"/>
           </a:p>
           <a:p>
             <a:pPr>
@@ -8531,55 +8869,7 @@
                 <a:spcPts val="600"/>
               </a:spcAft>
             </a:pPr>
-            <a:endParaRPr lang="en-US" dirty="0"/>
-          </a:p>
-          <a:p>
-            <a:pPr>
-              <a:spcAft>
-                <a:spcPts val="600"/>
-              </a:spcAft>
-            </a:pPr>
-            <a:endParaRPr lang="en-US" dirty="0"/>
-          </a:p>
-          <a:p>
-            <a:pPr>
-              <a:spcAft>
-                <a:spcPts val="600"/>
-              </a:spcAft>
-            </a:pPr>
-            <a:endParaRPr lang="en-US" dirty="0"/>
-          </a:p>
-          <a:p>
-            <a:pPr>
-              <a:spcAft>
-                <a:spcPts val="600"/>
-              </a:spcAft>
-            </a:pPr>
-            <a:endParaRPr lang="en-US" dirty="0"/>
-          </a:p>
-          <a:p>
-            <a:pPr>
-              <a:spcAft>
-                <a:spcPts val="600"/>
-              </a:spcAft>
-            </a:pPr>
-            <a:endParaRPr lang="en-US" dirty="0"/>
-          </a:p>
-          <a:p>
-            <a:pPr>
-              <a:spcAft>
-                <a:spcPts val="600"/>
-              </a:spcAft>
-            </a:pPr>
-            <a:endParaRPr lang="en-US" dirty="0"/>
-          </a:p>
-          <a:p>
-            <a:pPr>
-              <a:spcAft>
-                <a:spcPts val="600"/>
-              </a:spcAft>
-            </a:pPr>
-            <a:endParaRPr lang="en-US" dirty="0"/>
+            <a:endParaRPr lang="en-US" noProof="0" dirty="0"/>
           </a:p>
           <a:p>
             <a:pPr>
@@ -8591,23 +8881,23 @@
               </a:spcAft>
             </a:pPr>
             <a:r>
-              <a:rPr lang="en-US" dirty="0"/>
+              <a:rPr lang="en-US" sz="1800" noProof="0" dirty="0"/>
               <a:t>The line </a:t>
             </a:r>
             <a:r>
-              <a:rPr lang="en-US" i="1" dirty="0"/>
+              <a:rPr lang="en-US" sz="1800" i="1" noProof="0" dirty="0"/>
               <a:t>x</a:t>
             </a:r>
             <a:r>
-              <a:rPr lang="en-US" dirty="0"/>
+              <a:rPr lang="en-US" sz="1800" noProof="0" dirty="0"/>
               <a:t> = 3 is a vertical asymptote. The line </a:t>
             </a:r>
             <a:r>
-              <a:rPr lang="en-US" i="1" dirty="0"/>
+              <a:rPr lang="en-US" sz="1800" i="1" noProof="0" dirty="0"/>
               <a:t>y</a:t>
             </a:r>
             <a:r>
-              <a:rPr lang="en-US" dirty="0"/>
+              <a:rPr lang="en-US" sz="1800" noProof="0" dirty="0"/>
               <a:t> = 2 is a horizontal asymptote.</a:t>
             </a:r>
           </a:p>
@@ -8618,23 +8908,23 @@
               </a:spcAft>
             </a:pPr>
             <a:r>
-              <a:rPr lang="en-US" dirty="0"/>
+              <a:rPr lang="en-US" sz="1800" noProof="0" dirty="0"/>
               <a:t>The domain is {</a:t>
             </a:r>
             <a:r>
-              <a:rPr lang="en-US" i="1" dirty="0"/>
+              <a:rPr lang="en-US" sz="1800" i="1" noProof="0" dirty="0"/>
               <a:t>x</a:t>
             </a:r>
             <a:r>
-              <a:rPr lang="en-US" dirty="0"/>
+              <a:rPr lang="en-US" sz="1800" noProof="0" dirty="0"/>
               <a:t> | </a:t>
             </a:r>
             <a:r>
-              <a:rPr lang="en-US" i="1" dirty="0"/>
+              <a:rPr lang="en-US" sz="1800" i="1" noProof="0" dirty="0"/>
               <a:t>x</a:t>
             </a:r>
             <a:r>
-              <a:rPr lang="en-US" dirty="0"/>
+              <a:rPr lang="en-US" sz="1800" noProof="0" dirty="0"/>
               <a:t> ≠ 3}.</a:t>
             </a:r>
           </a:p>
@@ -8645,23 +8935,23 @@
               </a:spcAft>
             </a:pPr>
             <a:r>
-              <a:rPr lang="en-US" dirty="0"/>
+              <a:rPr lang="en-US" sz="1800" noProof="0" dirty="0"/>
               <a:t>The range is {</a:t>
             </a:r>
             <a:r>
-              <a:rPr lang="en-US" i="1" dirty="0"/>
+              <a:rPr lang="en-US" sz="1800" i="1" noProof="0" dirty="0"/>
               <a:t>y</a:t>
             </a:r>
             <a:r>
-              <a:rPr lang="en-US" dirty="0"/>
+              <a:rPr lang="en-US" sz="1800" noProof="0" dirty="0"/>
               <a:t> | </a:t>
             </a:r>
             <a:r>
-              <a:rPr lang="en-US" i="1" dirty="0"/>
+              <a:rPr lang="en-US" sz="1800" i="1" noProof="0" dirty="0"/>
               <a:t>y</a:t>
             </a:r>
             <a:r>
-              <a:rPr lang="en-US" dirty="0"/>
+              <a:rPr lang="en-US" sz="1800" noProof="0" dirty="0"/>
               <a:t> ≠ 2}.</a:t>
             </a:r>
           </a:p>
@@ -8717,14 +9007,14 @@
           <a:lstStyle/>
           <a:p>
             <a:r>
-              <a:rPr lang="en-IN" sz="1800" b="1" cap="all" dirty="0">
+              <a:rPr lang="en-US" sz="1800" b="1" cap="all" noProof="0" dirty="0">
                 <a:solidFill>
                   <a:schemeClr val="bg1"/>
                 </a:solidFill>
               </a:rPr>
               <a:t>Example 5</a:t>
             </a:r>
-            <a:endParaRPr lang="en-US" sz="1800" cap="all" dirty="0"/>
+            <a:endParaRPr lang="en-US" sz="1800" cap="all" noProof="0" dirty="0"/>
           </a:p>
         </p:txBody>
       </p:sp>
@@ -8751,7 +9041,7 @@
         <p:spPr>
           <a:xfrm>
             <a:off x="394708" y="2223385"/>
-            <a:ext cx="4824615" cy="2394385"/>
+            <a:ext cx="6169378" cy="3061771"/>
           </a:xfrm>
           <a:prstGeom prst="rect">
             <a:avLst/>
@@ -8885,7 +9175,7 @@
               </a:tabLst>
             </a:pPr>
             <a:r>
-              <a:rPr lang="en-IN" sz="1800" b="1" dirty="0">
+              <a:rPr lang="en-US" sz="1800" b="1" noProof="0" dirty="0">
                 <a:solidFill>
                   <a:srgbClr val="0078AE"/>
                 </a:solidFill>
@@ -8893,18 +9183,13 @@
               <a:t>	</a:t>
             </a:r>
             <a:r>
-              <a:rPr lang="en-US" sz="1800" b="1" dirty="0">
+              <a:rPr lang="en-US" sz="1800" b="1" noProof="0" dirty="0">
                 <a:solidFill>
                   <a:srgbClr val="58585A"/>
                 </a:solidFill>
               </a:rPr>
               <a:t>Graph Translations of the Reciprocal Function</a:t>
             </a:r>
-            <a:endParaRPr lang="en-IN" sz="1800" b="1" dirty="0">
-              <a:solidFill>
-                <a:srgbClr val="58585A"/>
-              </a:solidFill>
-            </a:endParaRPr>
           </a:p>
           <a:p>
             <a:pPr marL="1476375" indent="-1466850">
@@ -8917,14 +9202,14 @@
               </a:tabLst>
             </a:pPr>
             <a:r>
-              <a:rPr lang="en-IN" sz="1800" b="1" dirty="0">
+              <a:rPr lang="en-US" sz="1800" b="1" noProof="0" dirty="0">
                 <a:solidFill>
                   <a:srgbClr val="D92B31"/>
                 </a:solidFill>
               </a:rPr>
               <a:t>Try It!</a:t>
             </a:r>
-            <a:endParaRPr lang="en-IN" sz="1800" b="1" dirty="0">
+            <a:endParaRPr lang="en-US" sz="1800" b="1" noProof="0" dirty="0">
               <a:solidFill>
                 <a:schemeClr val="tx1"/>
               </a:solidFill>
@@ -8939,29 +9224,29 @@
               <a:buAutoNum type="arabicPeriod" startAt="5"/>
             </a:pPr>
             <a:r>
-              <a:rPr lang="en-IN" sz="1600" b="1" dirty="0"/>
+              <a:rPr lang="en-US" sz="1600" b="1" noProof="0" dirty="0"/>
               <a:t>​​</a:t>
             </a:r>
             <a:r>
-              <a:rPr lang="en-US" sz="1600" dirty="0"/>
+              <a:rPr lang="en-US" sz="1600" noProof="0" dirty="0"/>
               <a:t>Graph                          </a:t>
             </a:r>
             <a:r>
-              <a:rPr lang="en-US" sz="1200" dirty="0"/>
+              <a:rPr lang="en-US" sz="1200" noProof="0" dirty="0"/>
               <a:t>  </a:t>
             </a:r>
             <a:r>
-              <a:rPr lang="en-US" sz="1600" dirty="0"/>
+              <a:rPr lang="en-US" sz="1600" noProof="0" dirty="0"/>
               <a:t>What are the equations of the asymptotes? </a:t>
             </a:r>
           </a:p>
           <a:p>
             <a:pPr marL="342000"/>
             <a:r>
-              <a:rPr lang="en-US" sz="1600" dirty="0"/>
+              <a:rPr lang="en-US" sz="1600" noProof="0" dirty="0"/>
               <a:t>What are the domain and range?</a:t>
             </a:r>
-            <a:endParaRPr lang="en-IN" sz="1600" dirty="0">
+            <a:endParaRPr lang="en-US" sz="1600" noProof="0" dirty="0">
               <a:solidFill>
                 <a:schemeClr val="tx1"/>
               </a:solidFill>
@@ -9019,14 +9304,14 @@
           <a:lstStyle/>
           <a:p>
             <a:r>
-              <a:rPr lang="en-IN" sz="1800" b="1" cap="all" dirty="0">
+              <a:rPr lang="en-US" sz="1800" b="1" cap="all" noProof="0" dirty="0">
                 <a:solidFill>
                   <a:schemeClr val="bg1"/>
                 </a:solidFill>
               </a:rPr>
               <a:t>Example 5</a:t>
             </a:r>
-            <a:endParaRPr lang="en-US" sz="1800" cap="all" dirty="0"/>
+            <a:endParaRPr lang="en-US" sz="1800" cap="all" noProof="0" dirty="0"/>
           </a:p>
         </p:txBody>
       </p:sp>
@@ -9166,7 +9451,7 @@
               </a:spcAft>
             </a:pPr>
             <a:r>
-              <a:rPr lang="en-IN" sz="1800" b="1" dirty="0">
+              <a:rPr lang="en-US" sz="1800" b="1" noProof="0" dirty="0">
                 <a:solidFill>
                   <a:srgbClr val="137F97"/>
                 </a:solidFill>
@@ -9176,18 +9461,13 @@
           </a:p>
           <a:p>
             <a:r>
-              <a:rPr lang="en-US" sz="1800" b="1" dirty="0">
+              <a:rPr lang="en-US" sz="1800" b="1" noProof="0" dirty="0">
                 <a:solidFill>
                   <a:srgbClr val="58585A"/>
                 </a:solidFill>
               </a:rPr>
               <a:t>Inverse Variation and the Reciprocal Function</a:t>
             </a:r>
-            <a:endParaRPr lang="en-IN" sz="1800" b="1" dirty="0">
-              <a:solidFill>
-                <a:srgbClr val="58585A"/>
-              </a:solidFill>
-            </a:endParaRPr>
           </a:p>
         </p:txBody>
       </p:sp>
@@ -9566,7 +9846,7 @@
           <p:nvPr>
             <p:extLst>
               <p:ext uri="{D42A27DB-BD31-4B8C-83A1-F6EECF244321}">
-                <p14:modId xmlns:p14="http://schemas.microsoft.com/office/powerpoint/2010/main" val="3811237551"/>
+                <p14:modId xmlns:p14="http://schemas.microsoft.com/office/powerpoint/2010/main" val="952393728"/>
               </p:ext>
             </p:extLst>
           </p:nvPr>
@@ -9611,7 +9891,7 @@
                     <a:lstStyle/>
                     <a:p>
                       <a:r>
-                        <a:rPr lang="en-US" dirty="0">
+                        <a:rPr lang="en-US" noProof="0" dirty="0">
                           <a:noFill/>
                         </a:rPr>
                         <a:t> </a:t>
@@ -9661,7 +9941,7 @@
                     <a:bodyPr/>
                     <a:lstStyle/>
                     <a:p>
-                      <a:endParaRPr lang="fr-FR" sz="1600" b="1" i="0" u="none" strike="noStrike" cap="none" baseline="0" dirty="0">
+                      <a:endParaRPr lang="en-US" sz="1600" b="1" i="0" u="none" strike="noStrike" cap="none" baseline="0" noProof="0" dirty="0">
                         <a:solidFill>
                           <a:srgbClr val="58585A"/>
                         </a:solidFill>
@@ -9673,7 +9953,7 @@
                     </a:p>
                     <a:p>
                       <a:r>
-                        <a:rPr lang="fr-FR" sz="1600" b="1" i="0" u="none" strike="noStrike" cap="none" baseline="0" dirty="0">
+                        <a:rPr lang="en-US" sz="1600" b="1" i="0" u="none" strike="noStrike" cap="none" baseline="0" noProof="0" dirty="0">
                           <a:solidFill>
                             <a:srgbClr val="58585A"/>
                           </a:solidFill>
@@ -9684,7 +9964,7 @@
                         </a:rPr>
                         <a:t>Inverse Variation</a:t>
                       </a:r>
-                      <a:endParaRPr lang="en-US" sz="1600" b="1" dirty="0">
+                      <a:endParaRPr lang="en-US" sz="1600" b="1" noProof="0" dirty="0">
                         <a:solidFill>
                           <a:srgbClr val="58585A"/>
                         </a:solidFill>
@@ -9733,7 +10013,7 @@
                     <a:lstStyle/>
                     <a:p>
                       <a:r>
-                        <a:rPr lang="en-US" sz="1600" b="1" i="0" u="none" strike="noStrike" cap="none" baseline="0" dirty="0">
+                        <a:rPr lang="en-US" sz="1600" b="1" i="0" u="none" strike="noStrike" cap="none" baseline="0" noProof="0" dirty="0">
                           <a:solidFill>
                             <a:srgbClr val="58585A"/>
                           </a:solidFill>
@@ -9744,7 +10024,7 @@
                         </a:rPr>
                         <a:t>Transformations of the Reciprocal Function</a:t>
                       </a:r>
-                      <a:endParaRPr lang="en-US" sz="1600" b="1" dirty="0">
+                      <a:endParaRPr lang="en-US" sz="1600" b="1" noProof="0" dirty="0">
                         <a:solidFill>
                           <a:srgbClr val="58585A"/>
                         </a:solidFill>
@@ -9802,7 +10082,7 @@
                     <a:lstStyle/>
                     <a:p>
                       <a:r>
-                        <a:rPr lang="en-US" sz="1600" b="1" i="0" u="none" strike="noStrike" cap="none" baseline="0" dirty="0">
+                        <a:rPr lang="en-US" sz="1600" b="1" i="0" u="none" strike="noStrike" cap="none" baseline="0" noProof="0" dirty="0">
                           <a:solidFill>
                             <a:srgbClr val="137F97"/>
                           </a:solidFill>
@@ -9813,7 +10093,7 @@
                         </a:rPr>
                         <a:t>WORDS</a:t>
                       </a:r>
-                      <a:endParaRPr lang="en-US" sz="1600" b="1" dirty="0">
+                      <a:endParaRPr lang="en-US" sz="1600" b="1" noProof="0" dirty="0">
                         <a:solidFill>
                           <a:srgbClr val="137F97"/>
                         </a:solidFill>
@@ -9866,7 +10146,7 @@
                     <a:lstStyle/>
                     <a:p>
                       <a:r>
-                        <a:rPr lang="en-US" sz="1400" b="0" i="0" u="none" strike="noStrike" cap="none" baseline="0" dirty="0">
+                        <a:rPr lang="en-US" sz="1400" b="0" i="0" u="none" strike="noStrike" cap="none" baseline="0" noProof="0" dirty="0">
                           <a:solidFill>
                             <a:schemeClr val="dk1"/>
                           </a:solidFill>
@@ -9877,7 +10157,7 @@
                         </a:rPr>
                         <a:t>An inverse variation is a relation between two variables such that as one variable increases, the other decreases proportionally.</a:t>
                       </a:r>
-                      <a:endParaRPr lang="en-US" sz="1400" dirty="0">
+                      <a:endParaRPr lang="en-US" sz="1400" noProof="0" dirty="0">
                         <a:solidFill>
                           <a:schemeClr val="tx1"/>
                         </a:solidFill>
@@ -9933,7 +10213,7 @@
                         </a:spcAft>
                       </a:pPr>
                       <a:r>
-                        <a:rPr lang="en-US" sz="1400" b="0" i="0" u="none" strike="noStrike" cap="none" baseline="0" dirty="0">
+                        <a:rPr lang="en-US" sz="1400" b="0" i="0" u="none" strike="noStrike" cap="none" baseline="0" noProof="0" dirty="0">
                           <a:solidFill>
                             <a:schemeClr val="dk1"/>
                           </a:solidFill>
@@ -9952,7 +10232,7 @@
                         </a:spcAft>
                       </a:pPr>
                       <a:r>
-                        <a:rPr lang="en-US" sz="1400" b="0" i="0" u="none" strike="noStrike" cap="none" baseline="0" dirty="0">
+                        <a:rPr lang="en-US" sz="1400" b="0" i="0" u="none" strike="noStrike" cap="none" baseline="0" noProof="0" dirty="0">
                           <a:solidFill>
                             <a:schemeClr val="dk1"/>
                           </a:solidFill>
@@ -9964,7 +10244,7 @@
                         <a:t>inverse variation,           </a:t>
                       </a:r>
                       <a:r>
-                        <a:rPr lang="en-US" sz="800" b="0" i="0" u="none" strike="noStrike" cap="none" baseline="0" dirty="0">
+                        <a:rPr lang="en-US" sz="800" b="0" i="0" u="none" strike="noStrike" cap="none" baseline="0" noProof="0" dirty="0">
                           <a:solidFill>
                             <a:schemeClr val="dk1"/>
                           </a:solidFill>
@@ -9976,7 +10256,7 @@
                         <a:t> </a:t>
                       </a:r>
                       <a:r>
-                        <a:rPr lang="en-US" sz="1400" b="0" i="0" u="none" strike="noStrike" cap="none" baseline="0" dirty="0">
+                        <a:rPr lang="en-US" sz="1400" b="0" i="0" u="none" strike="noStrike" cap="none" baseline="0" noProof="0" dirty="0">
                           <a:solidFill>
                             <a:schemeClr val="dk1"/>
                           </a:solidFill>
@@ -9990,7 +10270,7 @@
                     </a:p>
                     <a:p>
                       <a:r>
-                        <a:rPr lang="en-US" sz="1400" b="0" i="0" u="none" strike="noStrike" cap="none" baseline="0" dirty="0">
+                        <a:rPr lang="en-US" sz="1400" b="0" i="0" u="none" strike="noStrike" cap="none" baseline="0" noProof="0" dirty="0">
                           <a:solidFill>
                             <a:schemeClr val="dk1"/>
                           </a:solidFill>
@@ -10001,7 +10281,7 @@
                         </a:rPr>
                         <a:t>functions, it can be transformed.</a:t>
                       </a:r>
-                      <a:endParaRPr lang="mr-IN" sz="1400" b="0" i="0" u="none" strike="noStrike" cap="none" baseline="0" dirty="0">
+                      <a:endParaRPr lang="en-US" sz="1400" b="0" i="0" u="none" strike="noStrike" cap="none" baseline="0" noProof="0" dirty="0">
                         <a:solidFill>
                           <a:schemeClr val="dk1"/>
                         </a:solidFill>
@@ -10063,7 +10343,7 @@
                     <a:lstStyle/>
                     <a:p>
                       <a:r>
-                        <a:rPr lang="en-US" sz="1600" b="1" i="0" u="none" strike="noStrike" cap="none" baseline="0" dirty="0">
+                        <a:rPr lang="en-US" sz="1600" b="1" i="0" u="none" strike="noStrike" cap="none" baseline="0" noProof="0" dirty="0">
                           <a:solidFill>
                             <a:srgbClr val="137F97"/>
                           </a:solidFill>
@@ -10074,7 +10354,7 @@
                         </a:rPr>
                         <a:t>ALGEBRA</a:t>
                       </a:r>
-                      <a:endParaRPr lang="en-US" sz="1600" b="1" dirty="0">
+                      <a:endParaRPr lang="en-US" sz="1600" b="1" noProof="0" dirty="0">
                         <a:solidFill>
                           <a:srgbClr val="137F97"/>
                         </a:solidFill>
@@ -10132,7 +10412,7 @@
                         </a:spcAft>
                       </a:pPr>
                       <a:r>
-                        <a:rPr lang="en-US" sz="1400" dirty="0">
+                        <a:rPr lang="en-US" sz="1400" noProof="0" dirty="0">
                           <a:solidFill>
                             <a:schemeClr val="tx1"/>
                           </a:solidFill>
@@ -10141,7 +10421,7 @@
                         </a:rPr>
                         <a:t>        , </a:t>
                       </a:r>
-                      <a:endParaRPr lang="en-US" sz="1400" dirty="0">
+                      <a:endParaRPr lang="en-US" sz="1400" noProof="0" dirty="0">
                         <a:solidFill>
                           <a:schemeClr val="tx1"/>
                         </a:solidFill>
@@ -10196,7 +10476,7 @@
                           <a:spcPts val="300"/>
                         </a:spcAft>
                       </a:pPr>
-                      <a:endParaRPr lang="mr-IN" sz="1400" b="0" i="0" u="none" strike="noStrike" cap="none" baseline="0" dirty="0">
+                      <a:endParaRPr lang="en-US" sz="1400" b="0" i="0" u="none" strike="noStrike" cap="none" baseline="0" noProof="0" dirty="0">
                         <a:solidFill>
                           <a:schemeClr val="dk1"/>
                         </a:solidFill>
@@ -10258,7 +10538,7 @@
                     <a:lstStyle/>
                     <a:p>
                       <a:r>
-                        <a:rPr lang="en-US" sz="1600" b="1" i="0" u="none" strike="noStrike" cap="none" baseline="0" dirty="0">
+                        <a:rPr lang="en-US" sz="1600" b="1" i="0" u="none" strike="noStrike" cap="none" baseline="0" noProof="0" dirty="0">
                           <a:solidFill>
                             <a:srgbClr val="137F97"/>
                           </a:solidFill>
@@ -10269,7 +10549,7 @@
                         </a:rPr>
                         <a:t>EXAMPLES</a:t>
                       </a:r>
-                      <a:endParaRPr lang="en-US" sz="1600" b="1" dirty="0">
+                      <a:endParaRPr lang="en-US" sz="1600" b="1" noProof="0" dirty="0">
                         <a:solidFill>
                           <a:srgbClr val="137F97"/>
                         </a:solidFill>
@@ -10321,7 +10601,7 @@
                     <a:bodyPr/>
                     <a:lstStyle/>
                     <a:p>
-                      <a:endParaRPr lang="en-US" sz="1400" dirty="0">
+                      <a:endParaRPr lang="en-US" sz="1400" noProof="0" dirty="0">
                         <a:solidFill>
                           <a:schemeClr val="tx1"/>
                         </a:solidFill>
@@ -10338,7 +10618,7 @@
                           <a:spcPts val="300"/>
                         </a:spcAft>
                       </a:pPr>
-                      <a:endParaRPr lang="en-US" sz="1400" b="0" i="0" u="none" strike="noStrike" cap="none" baseline="0" dirty="0">
+                      <a:endParaRPr lang="en-US" sz="1400" b="0" i="0" u="none" strike="noStrike" cap="none" baseline="0" noProof="0" dirty="0">
                         <a:solidFill>
                           <a:schemeClr val="tx1"/>
                         </a:solidFill>
@@ -10357,7 +10637,7 @@
                           <a:spcPts val="300"/>
                         </a:spcAft>
                       </a:pPr>
-                      <a:endParaRPr lang="fi-FI" sz="1400" b="0" i="0" u="none" strike="noStrike" cap="none" baseline="0" dirty="0">
+                      <a:endParaRPr lang="en-US" sz="1400" b="0" i="0" u="none" strike="noStrike" cap="none" baseline="0" noProof="0" dirty="0">
                         <a:solidFill>
                           <a:schemeClr val="dk1"/>
                         </a:solidFill>
@@ -10409,7 +10689,7 @@
                     <a:bodyPr/>
                     <a:lstStyle/>
                     <a:p>
-                      <a:endParaRPr lang="mr-IN" sz="1400" b="0" i="0" u="none" strike="noStrike" cap="none" baseline="0" dirty="0">
+                      <a:endParaRPr lang="en-US" sz="1400" b="0" i="0" u="none" strike="noStrike" cap="none" baseline="0" noProof="0" dirty="0">
                         <a:solidFill>
                           <a:schemeClr val="dk1"/>
                         </a:solidFill>
@@ -10420,7 +10700,7 @@
                       </a:endParaRPr>
                     </a:p>
                     <a:p>
-                      <a:endParaRPr lang="mr-IN" sz="1400" b="0" i="0" u="none" strike="noStrike" cap="none" baseline="0" dirty="0">
+                      <a:endParaRPr lang="en-US" sz="1400" b="0" i="0" u="none" strike="noStrike" cap="none" baseline="0" noProof="0" dirty="0">
                         <a:solidFill>
                           <a:schemeClr val="dk1"/>
                         </a:solidFill>
@@ -10439,7 +10719,7 @@
                           <a:spcPts val="300"/>
                         </a:spcAft>
                       </a:pPr>
-                      <a:endParaRPr lang="fi-FI" sz="1400" b="0" i="0" u="none" strike="noStrike" cap="none" baseline="0" dirty="0">
+                      <a:endParaRPr lang="en-US" sz="1400" b="0" i="0" u="none" strike="noStrike" cap="none" baseline="0" noProof="0" dirty="0">
                         <a:solidFill>
                           <a:schemeClr val="dk1"/>
                         </a:solidFill>
@@ -10458,7 +10738,7 @@
                           <a:spcPts val="300"/>
                         </a:spcAft>
                       </a:pPr>
-                      <a:endParaRPr lang="fi-FI" sz="1400" b="0" i="0" u="none" strike="noStrike" cap="none" baseline="0" dirty="0">
+                      <a:endParaRPr lang="en-US" sz="1400" b="0" i="0" u="none" strike="noStrike" cap="none" baseline="0" noProof="0" dirty="0">
                         <a:solidFill>
                           <a:schemeClr val="dk1"/>
                         </a:solidFill>
@@ -10477,7 +10757,7 @@
                           <a:spcPts val="300"/>
                         </a:spcAft>
                       </a:pPr>
-                      <a:endParaRPr lang="fi-FI" sz="1400" b="0" i="0" u="none" strike="noStrike" cap="none" baseline="0" dirty="0">
+                      <a:endParaRPr lang="en-US" sz="1400" b="0" i="0" u="none" strike="noStrike" cap="none" baseline="0" noProof="0" dirty="0">
                         <a:solidFill>
                           <a:schemeClr val="dk1"/>
                         </a:solidFill>
@@ -10496,7 +10776,7 @@
                           <a:spcPts val="300"/>
                         </a:spcAft>
                       </a:pPr>
-                      <a:endParaRPr lang="fi-FI" sz="1400" b="0" i="0" u="none" strike="noStrike" cap="none" baseline="0" dirty="0">
+                      <a:endParaRPr lang="en-US" sz="1400" b="0" i="0" u="none" strike="noStrike" cap="none" baseline="0" noProof="0" dirty="0">
                         <a:solidFill>
                           <a:schemeClr val="dk1"/>
                         </a:solidFill>
@@ -10667,7 +10947,7 @@
           <p:nvPr>
             <p:extLst>
               <p:ext uri="{D42A27DB-BD31-4B8C-83A1-F6EECF244321}">
-                <p14:modId xmlns:p14="http://schemas.microsoft.com/office/powerpoint/2010/main" val="3728864790"/>
+                <p14:modId xmlns:p14="http://schemas.microsoft.com/office/powerpoint/2010/main" val="3836096399"/>
               </p:ext>
             </p:extLst>
           </p:nvPr>
@@ -10717,7 +10997,7 @@
                         <a:defRPr/>
                       </a:pPr>
                       <a:r>
-                        <a:rPr lang="en-IN" sz="1800" b="1" cap="all" baseline="0" dirty="0">
+                        <a:rPr lang="en-US" sz="1800" b="1" cap="all" baseline="0" noProof="0" dirty="0">
                           <a:solidFill>
                             <a:schemeClr val="bg1"/>
                           </a:solidFill>
@@ -10726,7 +11006,7 @@
                         </a:rPr>
                         <a:t>Essential Question</a:t>
                       </a:r>
-                      <a:endParaRPr lang="en-US" sz="1800" cap="all" baseline="0" dirty="0">
+                      <a:endParaRPr lang="en-US" sz="1800" cap="all" baseline="0" noProof="0" dirty="0">
                         <a:latin typeface="Arial" panose="020B0604020202020204" pitchFamily="34" charset="0"/>
                         <a:cs typeface="Arial" panose="020B0604020202020204" pitchFamily="34" charset="0"/>
                       </a:endParaRPr>
@@ -10787,7 +11067,7 @@
                     <a:lstStyle/>
                     <a:p>
                       <a:r>
-                        <a:rPr lang="en-US" sz="1600" b="1" i="0" u="none" strike="noStrike" cap="none" baseline="0" dirty="0">
+                        <a:rPr lang="en-US" sz="1600" b="1" i="0" u="none" strike="noStrike" cap="none" baseline="0" noProof="0" dirty="0">
                           <a:solidFill>
                             <a:schemeClr val="dk1"/>
                           </a:solidFill>
@@ -10798,7 +11078,7 @@
                         </a:rPr>
                         <a:t>How are inverse variations related to the reciprocal function?</a:t>
                       </a:r>
-                      <a:endParaRPr lang="en-US" sz="1600" b="1" spc="0" baseline="0" dirty="0">
+                      <a:endParaRPr lang="en-US" sz="1600" b="1" spc="0" baseline="0" noProof="0" dirty="0">
                         <a:latin typeface="Arial" panose="020B0604020202020204" pitchFamily="34" charset="0"/>
                         <a:cs typeface="Arial" panose="020B0604020202020204" pitchFamily="34" charset="0"/>
                       </a:endParaRPr>
@@ -10869,7 +11149,7 @@
         <p:spPr>
           <a:xfrm>
             <a:off x="355758" y="1340578"/>
-            <a:ext cx="8321209" cy="2652008"/>
+            <a:ext cx="8321209" cy="2959785"/>
           </a:xfrm>
           <a:prstGeom prst="rect">
             <a:avLst/>
@@ -10891,7 +11171,7 @@
               </a:tabLst>
             </a:pPr>
             <a:r>
-              <a:rPr lang="en-IN" sz="1800" b="1" dirty="0">
+              <a:rPr lang="en-US" sz="1800" b="1" noProof="0" dirty="0">
                 <a:solidFill>
                   <a:srgbClr val="0078AE"/>
                 </a:solidFill>
@@ -10899,18 +11179,13 @@
               <a:t>	</a:t>
             </a:r>
             <a:r>
-              <a:rPr lang="en-US" sz="1800" b="1" dirty="0">
+              <a:rPr lang="en-US" sz="1800" b="1" noProof="0" dirty="0">
                 <a:solidFill>
                   <a:srgbClr val="58585A"/>
                 </a:solidFill>
               </a:rPr>
               <a:t>Identify Inverse Variation</a:t>
             </a:r>
-            <a:endParaRPr lang="en-IN" sz="1800" b="1" dirty="0">
-              <a:solidFill>
-                <a:srgbClr val="58585A"/>
-              </a:solidFill>
-            </a:endParaRPr>
           </a:p>
           <a:p>
             <a:pPr>
@@ -10919,11 +11194,11 @@
               </a:spcAft>
             </a:pPr>
             <a:r>
-              <a:rPr lang="en-US" sz="1600" b="1" dirty="0"/>
+              <a:rPr lang="en-US" sz="1600" b="1" noProof="0" dirty="0"/>
               <a:t>How do you determine if a relationship represents an inverse variation</a:t>
             </a:r>
             <a:r>
-              <a:rPr lang="en-IN" sz="1600" b="1" dirty="0">
+              <a:rPr lang="en-US" sz="1600" b="1" noProof="0" dirty="0">
                 <a:solidFill>
                   <a:schemeClr val="tx1"/>
                 </a:solidFill>
@@ -10940,7 +11215,7 @@
               <a:buAutoNum type="alphaUcPeriod"/>
             </a:pPr>
             <a:r>
-              <a:rPr lang="en-IN" sz="1600" b="1" dirty="0">
+              <a:rPr lang="en-US" sz="1600" b="1" noProof="0" dirty="0">
                 <a:solidFill>
                   <a:schemeClr val="tx1"/>
                 </a:solidFill>
@@ -10948,10 +11223,10 @@
               <a:t>​</a:t>
             </a:r>
             <a:r>
-              <a:rPr lang="en-US" sz="1600" b="1" dirty="0"/>
+              <a:rPr lang="en-US" sz="1600" b="1" noProof="0" dirty="0"/>
               <a:t>Does the table of values represent an inverse variation?</a:t>
             </a:r>
-            <a:endParaRPr lang="en-IN" sz="1600" b="1" dirty="0">
+            <a:endParaRPr lang="en-US" sz="1600" b="1" noProof="0" dirty="0">
               <a:solidFill>
                 <a:schemeClr val="tx1"/>
               </a:solidFill>
@@ -10963,7 +11238,7 @@
                 <a:spcPts val="600"/>
               </a:spcAft>
             </a:pPr>
-            <a:endParaRPr lang="en-IN" sz="1800" dirty="0">
+            <a:endParaRPr lang="en-US" sz="1800" noProof="0" dirty="0">
               <a:solidFill>
                 <a:schemeClr val="tx1"/>
               </a:solidFill>
@@ -10975,55 +11250,59 @@
                 <a:spcPts val="600"/>
               </a:spcAft>
             </a:pPr>
-            <a:endParaRPr lang="en-IN" sz="1800" dirty="0">
-              <a:solidFill>
-                <a:schemeClr val="tx1"/>
-              </a:solidFill>
-            </a:endParaRPr>
-          </a:p>
-          <a:p>
-            <a:pPr marL="360000"/>
-            <a:r>
-              <a:rPr lang="en-US" dirty="0"/>
-              <a:t>An </a:t>
-            </a:r>
-            <a:r>
-              <a:rPr lang="en-US" b="1" dirty="0">
-                <a:highlight>
-                  <a:srgbClr val="FFFF00"/>
-                </a:highlight>
-              </a:rPr>
-              <a:t>inverse variation</a:t>
-            </a:r>
-            <a:r>
-              <a:rPr lang="en-US" dirty="0"/>
-              <a:t> is a relation between two variables such that as one variable increases, the other decreases proportionally. For the table to represent an inverse variation, the product of </a:t>
-            </a:r>
-            <a:r>
-              <a:rPr lang="en-US" i="1" dirty="0"/>
+            <a:endParaRPr lang="en-US" noProof="0" dirty="0"/>
+          </a:p>
+          <a:p>
+            <a:pPr marL="360000">
+              <a:spcAft>
+                <a:spcPts val="600"/>
+              </a:spcAft>
+            </a:pPr>
+            <a:endParaRPr lang="en-US" dirty="0"/>
+          </a:p>
+          <a:p>
+            <a:pPr marL="360000">
+              <a:spcAft>
+                <a:spcPts val="600"/>
+              </a:spcAft>
+            </a:pPr>
+            <a:endParaRPr lang="en-US" noProof="0" dirty="0"/>
+          </a:p>
+          <a:p>
+            <a:pPr marL="360000">
+              <a:spcAft>
+                <a:spcPts val="600"/>
+              </a:spcAft>
+            </a:pPr>
+            <a:r>
+              <a:rPr lang="en-US" noProof="0" dirty="0"/>
+              <a:t>For the table to represent an inverse variation, the product of </a:t>
+            </a:r>
+            <a:r>
+              <a:rPr lang="en-US" i="1" noProof="0" dirty="0"/>
               <a:t>x</a:t>
             </a:r>
             <a:r>
-              <a:rPr lang="en-US" dirty="0"/>
+              <a:rPr lang="en-US" noProof="0" dirty="0"/>
               <a:t> and </a:t>
             </a:r>
             <a:r>
-              <a:rPr lang="en-US" i="1" dirty="0"/>
+              <a:rPr lang="en-US" i="1" noProof="0" dirty="0"/>
               <a:t>y</a:t>
             </a:r>
             <a:r>
-              <a:rPr lang="en-US" dirty="0"/>
+              <a:rPr lang="en-US" noProof="0" dirty="0"/>
               <a:t> must be constant. Find the product, </a:t>
             </a:r>
             <a:r>
-              <a:rPr lang="en-US" i="1" dirty="0" err="1"/>
+              <a:rPr lang="en-US" i="1" noProof="0" dirty="0" err="1"/>
               <a:t>xy</a:t>
             </a:r>
             <a:r>
-              <a:rPr lang="en-US" dirty="0"/>
+              <a:rPr lang="en-US" noProof="0" dirty="0"/>
               <a:t>, for each column in the table.</a:t>
             </a:r>
-            <a:endParaRPr lang="en-IN" dirty="0">
+            <a:endParaRPr lang="en-US" noProof="0" dirty="0">
               <a:solidFill>
                 <a:schemeClr val="tx1"/>
               </a:solidFill>
@@ -11081,14 +11360,14 @@
           <a:lstStyle/>
           <a:p>
             <a:r>
-              <a:rPr lang="en-IN" sz="1800" b="1" cap="all" dirty="0">
+              <a:rPr lang="en-US" sz="1800" b="1" cap="all" noProof="0" dirty="0">
                 <a:solidFill>
                   <a:schemeClr val="bg1"/>
                 </a:solidFill>
               </a:rPr>
               <a:t>Example 1</a:t>
             </a:r>
-            <a:endParaRPr lang="en-US" sz="1800" cap="all" dirty="0"/>
+            <a:endParaRPr lang="en-US" sz="1800" cap="all" noProof="0" dirty="0"/>
           </a:p>
         </p:txBody>
       </p:sp>
@@ -11143,8 +11422,8 @@
         </p:blipFill>
         <p:spPr>
           <a:xfrm>
-            <a:off x="2482346" y="4357774"/>
-            <a:ext cx="3134684" cy="1219841"/>
+            <a:off x="1193024" y="4338366"/>
+            <a:ext cx="6094680" cy="2371703"/>
           </a:xfrm>
           <a:prstGeom prst="rect">
             <a:avLst/>
@@ -11231,14 +11510,14 @@
           <a:lstStyle/>
           <a:p>
             <a:r>
-              <a:rPr lang="en-IN" sz="1800" b="1" cap="all" dirty="0">
+              <a:rPr lang="en-US" sz="1800" b="1" cap="all" noProof="0" dirty="0">
                 <a:solidFill>
                   <a:schemeClr val="bg1"/>
                 </a:solidFill>
               </a:rPr>
               <a:t>Example 1</a:t>
             </a:r>
-            <a:endParaRPr lang="en-US" sz="1800" cap="all" dirty="0"/>
+            <a:endParaRPr lang="en-US" sz="1800" cap="all" noProof="0" dirty="0"/>
           </a:p>
         </p:txBody>
       </p:sp>
@@ -11300,8 +11579,8 @@
         </p:blipFill>
         <p:spPr>
           <a:xfrm>
-            <a:off x="452745" y="4078245"/>
-            <a:ext cx="7557025" cy="1786205"/>
+            <a:off x="452745" y="3820887"/>
+            <a:ext cx="8645852" cy="2043564"/>
           </a:xfrm>
           <a:prstGeom prst="rect">
             <a:avLst/>
@@ -11345,7 +11624,7 @@
               </a:tabLst>
             </a:pPr>
             <a:r>
-              <a:rPr lang="en-IN" sz="1800" b="1" dirty="0">
+              <a:rPr lang="en-US" sz="1800" b="1" noProof="0" dirty="0">
                 <a:solidFill>
                   <a:srgbClr val="0078AE"/>
                 </a:solidFill>
@@ -11353,18 +11632,13 @@
               <a:t>	</a:t>
             </a:r>
             <a:r>
-              <a:rPr lang="en-US" sz="1800" b="1" dirty="0">
+              <a:rPr lang="en-US" sz="1800" b="1" noProof="0" dirty="0">
                 <a:solidFill>
                   <a:srgbClr val="58585A"/>
                 </a:solidFill>
               </a:rPr>
               <a:t>Identify Inverse Variation</a:t>
             </a:r>
-            <a:endParaRPr lang="en-IN" sz="1800" b="1" dirty="0">
-              <a:solidFill>
-                <a:srgbClr val="58585A"/>
-              </a:solidFill>
-            </a:endParaRPr>
           </a:p>
           <a:p>
             <a:pPr>
@@ -11373,11 +11647,11 @@
               </a:spcAft>
             </a:pPr>
             <a:r>
-              <a:rPr lang="en-US" sz="1600" b="1" dirty="0"/>
+              <a:rPr lang="en-US" sz="1600" b="1" noProof="0" dirty="0"/>
               <a:t>How do you determine if a relationship represents an inverse variation</a:t>
             </a:r>
             <a:r>
-              <a:rPr lang="en-IN" sz="1600" b="1" dirty="0">
+              <a:rPr lang="en-US" sz="1600" b="1" noProof="0" dirty="0">
                 <a:solidFill>
                   <a:schemeClr val="tx1"/>
                 </a:solidFill>
@@ -11394,7 +11668,7 @@
               <a:buAutoNum type="alphaUcPeriod" startAt="2"/>
             </a:pPr>
             <a:r>
-              <a:rPr lang="en-IN" sz="1600" b="1" dirty="0">
+              <a:rPr lang="en-US" sz="1600" b="1" noProof="0" dirty="0">
                 <a:solidFill>
                   <a:schemeClr val="tx1"/>
                 </a:solidFill>
@@ -11402,10 +11676,10 @@
               <a:t>​</a:t>
             </a:r>
             <a:r>
-              <a:rPr lang="en-US" sz="1600" b="1" dirty="0"/>
+              <a:rPr lang="en-US" sz="1600" b="1" noProof="0" dirty="0"/>
               <a:t>Does the table of values represent an inverse variation?</a:t>
             </a:r>
-            <a:endParaRPr lang="en-IN" sz="1600" b="1" dirty="0">
+            <a:endParaRPr lang="en-US" sz="1600" b="1" noProof="0" dirty="0">
               <a:solidFill>
                 <a:schemeClr val="tx1"/>
               </a:solidFill>
@@ -11417,7 +11691,7 @@
                 <a:spcPts val="600"/>
               </a:spcAft>
             </a:pPr>
-            <a:endParaRPr lang="en-IN" sz="1800" dirty="0">
+            <a:endParaRPr lang="en-US" sz="1800" noProof="0" dirty="0">
               <a:solidFill>
                 <a:schemeClr val="tx1"/>
               </a:solidFill>
@@ -11429,7 +11703,7 @@
                 <a:spcPts val="600"/>
               </a:spcAft>
             </a:pPr>
-            <a:endParaRPr lang="en-IN" sz="1800" dirty="0">
+            <a:endParaRPr lang="en-US" sz="1800" noProof="0" dirty="0">
               <a:solidFill>
                 <a:schemeClr val="tx1"/>
               </a:solidFill>
@@ -11438,10 +11712,10 @@
           <a:p>
             <a:pPr marL="360000"/>
             <a:r>
-              <a:rPr lang="en-US" dirty="0"/>
+              <a:rPr lang="en-US" noProof="0" dirty="0"/>
               <a:t>Find the products.</a:t>
             </a:r>
-            <a:endParaRPr lang="en-IN" dirty="0">
+            <a:endParaRPr lang="en-US" noProof="0" dirty="0">
               <a:solidFill>
                 <a:schemeClr val="tx1"/>
               </a:solidFill>
@@ -11516,7 +11790,7 @@
               </a:tabLst>
             </a:pPr>
             <a:r>
-              <a:rPr lang="en-IN" sz="1800" b="1" dirty="0">
+              <a:rPr lang="en-US" sz="1800" b="1" noProof="0" dirty="0">
                 <a:solidFill>
                   <a:srgbClr val="0078AE"/>
                 </a:solidFill>
@@ -11524,18 +11798,13 @@
               <a:t>	</a:t>
             </a:r>
             <a:r>
-              <a:rPr lang="en-US" sz="1800" b="1" dirty="0">
+              <a:rPr lang="en-US" sz="1800" b="1" noProof="0" dirty="0">
                 <a:solidFill>
                   <a:srgbClr val="58585A"/>
                 </a:solidFill>
               </a:rPr>
               <a:t>Identify Inverse Variation</a:t>
             </a:r>
-            <a:endParaRPr lang="en-IN" sz="1800" b="1" dirty="0">
-              <a:solidFill>
-                <a:srgbClr val="58585A"/>
-              </a:solidFill>
-            </a:endParaRPr>
           </a:p>
           <a:p>
             <a:pPr marL="1476375" indent="-1466850">
@@ -11548,14 +11817,14 @@
               </a:tabLst>
             </a:pPr>
             <a:r>
-              <a:rPr lang="en-IN" sz="1800" b="1" dirty="0">
+              <a:rPr lang="en-US" sz="1800" b="1" noProof="0" dirty="0">
                 <a:solidFill>
                   <a:srgbClr val="D92B31"/>
                 </a:solidFill>
               </a:rPr>
               <a:t>Try It!</a:t>
             </a:r>
-            <a:endParaRPr lang="en-IN" sz="1800" b="1" dirty="0">
+            <a:endParaRPr lang="en-US" sz="1800" b="1" noProof="0" dirty="0">
               <a:solidFill>
                 <a:schemeClr val="tx1"/>
               </a:solidFill>
@@ -11570,11 +11839,11 @@
               <a:buAutoNum type="arabicPeriod"/>
             </a:pPr>
             <a:r>
-              <a:rPr lang="en-IN" sz="1600" b="1" dirty="0"/>
+              <a:rPr lang="en-US" sz="1600" b="1" noProof="0" dirty="0"/>
               <a:t>​​</a:t>
             </a:r>
             <a:r>
-              <a:rPr lang="en-US" sz="1600" dirty="0"/>
+              <a:rPr lang="en-US" sz="1600" noProof="0" dirty="0"/>
               <a:t>Determine if each table of values represents an inverse variation.</a:t>
             </a:r>
           </a:p>
@@ -11589,7 +11858,7 @@
               </a:tabLst>
             </a:pPr>
             <a:r>
-              <a:rPr lang="en-IN" sz="1600" b="1" dirty="0"/>
+              <a:rPr lang="en-US" sz="1600" b="1" noProof="0" dirty="0"/>
               <a:t>​</a:t>
             </a:r>
           </a:p>
@@ -11645,14 +11914,14 @@
           <a:lstStyle/>
           <a:p>
             <a:r>
-              <a:rPr lang="en-IN" sz="1800" b="1" cap="all" dirty="0">
+              <a:rPr lang="en-US" sz="1800" b="1" cap="all" noProof="0" dirty="0">
                 <a:solidFill>
                   <a:schemeClr val="bg1"/>
                 </a:solidFill>
               </a:rPr>
               <a:t>Example 1</a:t>
             </a:r>
-            <a:endParaRPr lang="en-US" sz="1800" cap="all" dirty="0"/>
+            <a:endParaRPr lang="en-US" sz="1800" cap="all" noProof="0" dirty="0"/>
           </a:p>
         </p:txBody>
       </p:sp>
@@ -11801,7 +12070,7 @@
               </a:tabLst>
             </a:pPr>
             <a:r>
-              <a:rPr lang="en-IN" sz="1800" b="1" dirty="0">
+              <a:rPr lang="en-US" sz="1800" b="1" noProof="0" dirty="0">
                 <a:solidFill>
                   <a:srgbClr val="0078AE"/>
                 </a:solidFill>
@@ -11809,18 +12078,13 @@
               <a:t>	</a:t>
             </a:r>
             <a:r>
-              <a:rPr lang="en-US" sz="1800" b="1" dirty="0">
+              <a:rPr lang="en-US" sz="1800" b="1" noProof="0" dirty="0">
                 <a:solidFill>
                   <a:srgbClr val="58585A"/>
                 </a:solidFill>
               </a:rPr>
               <a:t>Identify Inverse Variation</a:t>
             </a:r>
-            <a:endParaRPr lang="en-IN" sz="1800" b="1" dirty="0">
-              <a:solidFill>
-                <a:srgbClr val="58585A"/>
-              </a:solidFill>
-            </a:endParaRPr>
           </a:p>
           <a:p>
             <a:pPr marL="1476375" indent="-1466850">
@@ -11833,14 +12097,14 @@
               </a:tabLst>
             </a:pPr>
             <a:r>
-              <a:rPr lang="en-IN" sz="1800" b="1" dirty="0">
+              <a:rPr lang="en-US" sz="1800" b="1" noProof="0" dirty="0">
                 <a:solidFill>
                   <a:srgbClr val="D92B31"/>
                 </a:solidFill>
               </a:rPr>
               <a:t>Try It!</a:t>
             </a:r>
-            <a:endParaRPr lang="en-IN" sz="1800" b="1" dirty="0">
+            <a:endParaRPr lang="en-US" sz="1800" b="1" noProof="0" dirty="0">
               <a:solidFill>
                 <a:schemeClr val="tx1"/>
               </a:solidFill>
@@ -11855,11 +12119,11 @@
               <a:buAutoNum type="arabicPeriod"/>
             </a:pPr>
             <a:r>
-              <a:rPr lang="en-IN" sz="1600" b="1" dirty="0"/>
+              <a:rPr lang="en-US" sz="1600" b="1" noProof="0" dirty="0"/>
               <a:t>​​</a:t>
             </a:r>
             <a:r>
-              <a:rPr lang="en-US" sz="1600" dirty="0"/>
+              <a:rPr lang="en-US" sz="1600" noProof="0" dirty="0"/>
               <a:t>Determine if each table of values represents an inverse variation</a:t>
             </a:r>
           </a:p>
@@ -11871,7 +12135,7 @@
               <a:buFont typeface="+mj-lt"/>
               <a:buAutoNum type="arabicPeriod"/>
             </a:pPr>
-            <a:endParaRPr lang="en-US" sz="1600" dirty="0"/>
+            <a:endParaRPr lang="en-US" sz="1600" noProof="0" dirty="0"/>
           </a:p>
           <a:p>
             <a:pPr marL="342900" indent="-342900">
@@ -11881,7 +12145,7 @@
               <a:buFont typeface="+mj-lt"/>
               <a:buAutoNum type="arabicPeriod"/>
             </a:pPr>
-            <a:endParaRPr lang="en-US" sz="1600" dirty="0"/>
+            <a:endParaRPr lang="en-US" sz="1600" noProof="0" dirty="0"/>
           </a:p>
           <a:p>
             <a:pPr marL="342900" indent="-342900">
@@ -11891,7 +12155,7 @@
               <a:buFont typeface="+mj-lt"/>
               <a:buAutoNum type="arabicPeriod"/>
             </a:pPr>
-            <a:endParaRPr lang="en-US" sz="1600" dirty="0"/>
+            <a:endParaRPr lang="en-US" sz="1600" noProof="0" dirty="0"/>
           </a:p>
           <a:p>
             <a:pPr>
@@ -11900,7 +12164,7 @@
               </a:spcAft>
             </a:pPr>
             <a:r>
-              <a:rPr lang="en-US" sz="1600" dirty="0"/>
+              <a:rPr lang="en-US" sz="1600" noProof="0" dirty="0"/>
               <a:t>B.</a:t>
             </a:r>
           </a:p>
@@ -11956,14 +12220,14 @@
           <a:lstStyle/>
           <a:p>
             <a:r>
-              <a:rPr lang="en-IN" sz="1800" b="1" cap="all" dirty="0">
+              <a:rPr lang="en-US" sz="1800" b="1" cap="all" noProof="0" dirty="0">
                 <a:solidFill>
                   <a:schemeClr val="bg1"/>
                 </a:solidFill>
               </a:rPr>
               <a:t>Example 1</a:t>
             </a:r>
-            <a:endParaRPr lang="en-US" sz="1800" cap="all" dirty="0"/>
+            <a:endParaRPr lang="en-US" sz="1800" cap="all" noProof="0" dirty="0"/>
           </a:p>
         </p:txBody>
       </p:sp>
@@ -12090,7 +12354,7 @@
         <p:spPr>
           <a:xfrm>
             <a:off x="355758" y="373507"/>
-            <a:ext cx="8187878" cy="5637441"/>
+            <a:ext cx="8187878" cy="5883662"/>
           </a:xfrm>
           <a:prstGeom prst="rect">
             <a:avLst/>
@@ -12112,7 +12376,7 @@
               </a:tabLst>
             </a:pPr>
             <a:r>
-              <a:rPr lang="en-IN" sz="1800" b="1" dirty="0">
+              <a:rPr lang="en-US" sz="1800" b="1" noProof="0" dirty="0">
                 <a:solidFill>
                   <a:srgbClr val="0078AE"/>
                 </a:solidFill>
@@ -12120,46 +12384,33 @@
               <a:t>	</a:t>
             </a:r>
             <a:r>
-              <a:rPr lang="de-DE" sz="1800" b="1" dirty="0" err="1">
+              <a:rPr lang="en-US" sz="1800" b="1" noProof="0" dirty="0">
                 <a:solidFill>
                   <a:srgbClr val="58585A"/>
                 </a:solidFill>
               </a:rPr>
-              <a:t>Use</a:t>
-            </a:r>
-            <a:r>
-              <a:rPr lang="de-DE" sz="1800" b="1" dirty="0">
-                <a:solidFill>
-                  <a:srgbClr val="58585A"/>
-                </a:solidFill>
-              </a:rPr>
-              <a:t> Inverse Variation</a:t>
-            </a:r>
-            <a:endParaRPr lang="en-US" sz="1800" b="1" dirty="0">
-              <a:solidFill>
-                <a:srgbClr val="58585A"/>
-              </a:solidFill>
-            </a:endParaRPr>
-          </a:p>
-          <a:p>
-            <a:r>
-              <a:rPr lang="en-US" sz="1600" b="1" dirty="0"/>
+              <a:t>Use Inverse Variation</a:t>
+            </a:r>
+          </a:p>
+          <a:p>
+            <a:r>
+              <a:rPr lang="en-US" sz="1600" b="1" noProof="0" dirty="0"/>
               <a:t>In an inverse variation, </a:t>
             </a:r>
             <a:r>
-              <a:rPr lang="en-US" sz="1600" b="1" i="1" dirty="0"/>
+              <a:rPr lang="en-US" sz="1600" b="1" i="1" noProof="0" dirty="0"/>
               <a:t>x</a:t>
             </a:r>
             <a:r>
-              <a:rPr lang="en-US" sz="1600" b="1" dirty="0"/>
+              <a:rPr lang="en-US" sz="1600" b="1" noProof="0" dirty="0"/>
               <a:t> = 10 when </a:t>
             </a:r>
             <a:r>
-              <a:rPr lang="en-US" sz="1600" b="1" i="1" dirty="0"/>
+              <a:rPr lang="en-US" sz="1600" b="1" i="1" noProof="0" dirty="0"/>
               <a:t>y</a:t>
             </a:r>
             <a:r>
-              <a:rPr lang="en-US" sz="1600" b="1" dirty="0"/>
+              <a:rPr lang="en-US" sz="1600" b="1" noProof="0" dirty="0"/>
               <a:t> = 3. Write an equation to represent</a:t>
             </a:r>
           </a:p>
@@ -12170,23 +12421,23 @@
               </a:spcAft>
             </a:pPr>
             <a:r>
-              <a:rPr lang="en-US" sz="1600" b="1" dirty="0"/>
+              <a:rPr lang="en-US" sz="1600" b="1" noProof="0" dirty="0"/>
               <a:t>the inverse variation. Then find the value of </a:t>
             </a:r>
             <a:r>
-              <a:rPr lang="en-US" sz="1600" b="1" i="1" dirty="0"/>
+              <a:rPr lang="en-US" sz="1600" b="1" i="1" noProof="0" dirty="0"/>
               <a:t>y</a:t>
             </a:r>
             <a:r>
-              <a:rPr lang="en-US" sz="1600" b="1" dirty="0"/>
+              <a:rPr lang="en-US" sz="1600" b="1" noProof="0" dirty="0"/>
               <a:t> when </a:t>
             </a:r>
             <a:r>
-              <a:rPr lang="en-US" sz="1600" b="1" i="1" dirty="0"/>
+              <a:rPr lang="en-US" sz="1600" b="1" i="1" noProof="0" dirty="0"/>
               <a:t>x</a:t>
             </a:r>
             <a:r>
-              <a:rPr lang="en-US" sz="1600" b="1" dirty="0"/>
+              <a:rPr lang="en-US" sz="1600" b="1" noProof="0" dirty="0"/>
               <a:t> = − 6.</a:t>
             </a:r>
           </a:p>
@@ -12197,19 +12448,19 @@
               </a:spcAft>
             </a:pPr>
             <a:r>
-              <a:rPr lang="en-US" b="1" dirty="0"/>
+              <a:rPr lang="en-US" sz="1800" b="1" noProof="0" dirty="0"/>
               <a:t>Step 1   </a:t>
             </a:r>
             <a:r>
-              <a:rPr lang="en-US" dirty="0"/>
+              <a:rPr lang="en-US" sz="1800" noProof="0" dirty="0"/>
               <a:t>Write the equation for an inverse variation and solve for </a:t>
             </a:r>
             <a:r>
-              <a:rPr lang="en-US" i="1" dirty="0"/>
+              <a:rPr lang="en-US" sz="1800" i="1" noProof="0" dirty="0"/>
               <a:t>k</a:t>
             </a:r>
             <a:r>
-              <a:rPr lang="en-US" dirty="0"/>
+              <a:rPr lang="en-US" sz="1800" noProof="0" dirty="0"/>
               <a:t>.</a:t>
             </a:r>
           </a:p>
@@ -12220,48 +12471,48 @@
               </a:spcAft>
             </a:pPr>
             <a:r>
-              <a:rPr lang="en-US" b="1" dirty="0"/>
+              <a:rPr lang="en-US" sz="1800" b="1" noProof="0" dirty="0"/>
               <a:t>Step 2   </a:t>
             </a:r>
             <a:r>
-              <a:rPr lang="en-US" dirty="0"/>
+              <a:rPr lang="en-US" sz="1800" noProof="0" dirty="0"/>
               <a:t>Substitute </a:t>
             </a:r>
             <a:r>
-              <a:rPr lang="en-US" i="1" dirty="0"/>
+              <a:rPr lang="en-US" sz="1800" i="1" noProof="0" dirty="0"/>
               <a:t>k</a:t>
             </a:r>
             <a:r>
-              <a:rPr lang="en-US" dirty="0"/>
+              <a:rPr lang="en-US" sz="1800" noProof="0" dirty="0"/>
               <a:t> = 30 in the inverse variation equation and then find </a:t>
             </a:r>
             <a:r>
-              <a:rPr lang="en-US" i="1" dirty="0"/>
+              <a:rPr lang="en-US" sz="1800" i="1" noProof="0" dirty="0"/>
               <a:t>y.</a:t>
             </a:r>
           </a:p>
           <a:p>
             <a:r>
-              <a:rPr lang="en-US" dirty="0"/>
+              <a:rPr lang="en-US" sz="1800" noProof="0" dirty="0"/>
               <a:t>The equation that represents the inverse relation is               When </a:t>
             </a:r>
             <a:r>
-              <a:rPr lang="en-US" i="1" dirty="0"/>
+              <a:rPr lang="en-US" sz="1800" i="1" noProof="0" dirty="0"/>
               <a:t>x</a:t>
             </a:r>
             <a:r>
-              <a:rPr lang="en-US" dirty="0"/>
+              <a:rPr lang="en-US" sz="1800" noProof="0" dirty="0"/>
               <a:t> = −6, </a:t>
             </a:r>
             <a:r>
-              <a:rPr lang="en-US" i="1" dirty="0"/>
+              <a:rPr lang="en-US" sz="1800" i="1" noProof="0" dirty="0"/>
               <a:t>y</a:t>
             </a:r>
             <a:r>
-              <a:rPr lang="en-US" dirty="0"/>
+              <a:rPr lang="en-US" sz="1800" noProof="0" dirty="0"/>
               <a:t> = −5.</a:t>
             </a:r>
-            <a:endParaRPr lang="en-US" b="1" i="1" dirty="0"/>
+            <a:endParaRPr lang="en-US" sz="1800" b="1" i="1" noProof="0" dirty="0"/>
           </a:p>
           <a:p>
             <a:pPr marL="360000">
@@ -12269,7 +12520,7 @@
                 <a:spcPts val="600"/>
               </a:spcAft>
             </a:pPr>
-            <a:endParaRPr lang="en-IN" sz="1800" dirty="0">
+            <a:endParaRPr lang="en-US" sz="1800" noProof="0" dirty="0">
               <a:solidFill>
                 <a:schemeClr val="tx1"/>
               </a:solidFill>
@@ -12281,14 +12532,14 @@
                 <a:spcPts val="600"/>
               </a:spcAft>
             </a:pPr>
-            <a:endParaRPr lang="da-DK" dirty="0">
+            <a:endParaRPr lang="en-US" noProof="0" dirty="0">
               <a:solidFill>
                 <a:srgbClr val="256BB9"/>
               </a:solidFill>
             </a:endParaRPr>
           </a:p>
           <a:p>
-            <a:endParaRPr lang="en-US" dirty="0"/>
+            <a:endParaRPr lang="en-US" noProof="0" dirty="0"/>
           </a:p>
         </p:txBody>
       </p:sp>
@@ -12342,198 +12593,14 @@
           <a:lstStyle/>
           <a:p>
             <a:r>
-              <a:rPr lang="en-IN" sz="1800" b="1" cap="all" dirty="0">
+              <a:rPr lang="en-US" sz="1800" b="1" cap="all" noProof="0" dirty="0">
                 <a:solidFill>
                   <a:schemeClr val="bg1"/>
                 </a:solidFill>
               </a:rPr>
               <a:t>Example 2</a:t>
             </a:r>
-            <a:endParaRPr lang="en-US" sz="1800" cap="all" dirty="0"/>
-          </a:p>
-        </p:txBody>
-      </p:sp>
-      <p:sp>
-        <p:nvSpPr>
-          <p:cNvPr id="8" name="Rounded Rectangle 7">
-            <a:extLst>
-              <a:ext uri="{FF2B5EF4-FFF2-40B4-BE49-F238E27FC236}">
-                <a16:creationId xmlns:a16="http://schemas.microsoft.com/office/drawing/2014/main" id="{E7A370C1-14D5-AF43-A796-AF0540DA76D8}"/>
-              </a:ext>
-            </a:extLst>
-          </p:cNvPr>
-          <p:cNvSpPr/>
-          <p:nvPr/>
-        </p:nvSpPr>
-        <p:spPr>
-          <a:xfrm>
-            <a:off x="462196" y="5102722"/>
-            <a:ext cx="6310563" cy="733690"/>
-          </a:xfrm>
-          <a:prstGeom prst="roundRect">
-            <a:avLst/>
-          </a:prstGeom>
-          <a:noFill/>
-          <a:ln w="12700">
-            <a:solidFill>
-              <a:schemeClr val="tx1">
-                <a:lumMod val="50000"/>
-                <a:lumOff val="50000"/>
-              </a:schemeClr>
-            </a:solidFill>
-          </a:ln>
-        </p:spPr>
-        <p:style>
-          <a:lnRef idx="2">
-            <a:schemeClr val="accent1">
-              <a:shade val="50000"/>
-            </a:schemeClr>
-          </a:lnRef>
-          <a:fillRef idx="1">
-            <a:schemeClr val="accent1"/>
-          </a:fillRef>
-          <a:effectRef idx="0">
-            <a:schemeClr val="accent1"/>
-          </a:effectRef>
-          <a:fontRef idx="minor">
-            <a:schemeClr val="lt1"/>
-          </a:fontRef>
-        </p:style>
-        <p:txBody>
-          <a:bodyPr rtlCol="0" anchor="ctr"/>
-          <a:lstStyle/>
-          <a:p>
-            <a:pPr>
-              <a:spcAft>
-                <a:spcPts val="300"/>
-              </a:spcAft>
-            </a:pPr>
-            <a:r>
-              <a:rPr lang="x-none" sz="1200" b="1" dirty="0">
-                <a:solidFill>
-                  <a:srgbClr val="137F97"/>
-                </a:solidFill>
-              </a:rPr>
-              <a:t>COMMON ERROR</a:t>
-            </a:r>
-            <a:endParaRPr lang="en-IN" sz="1200" b="1" dirty="0">
-              <a:solidFill>
-                <a:srgbClr val="137F97"/>
-              </a:solidFill>
-            </a:endParaRPr>
-          </a:p>
-          <a:p>
-            <a:r>
-              <a:rPr lang="en-US" sz="1200" dirty="0">
-                <a:solidFill>
-                  <a:schemeClr val="tx1"/>
-                </a:solidFill>
-              </a:rPr>
-              <a:t>Remember in direct variation, </a:t>
-            </a:r>
-            <a:r>
-              <a:rPr lang="en-US" sz="1200" i="1" dirty="0">
-                <a:solidFill>
-                  <a:schemeClr val="tx1"/>
-                </a:solidFill>
-              </a:rPr>
-              <a:t>y</a:t>
-            </a:r>
-            <a:r>
-              <a:rPr lang="en-US" sz="1200" dirty="0">
-                <a:solidFill>
-                  <a:schemeClr val="tx1"/>
-                </a:solidFill>
-              </a:rPr>
-              <a:t> = </a:t>
-            </a:r>
-            <a:r>
-              <a:rPr lang="en-US" sz="1200" i="1" dirty="0" err="1">
-                <a:solidFill>
-                  <a:schemeClr val="tx1"/>
-                </a:solidFill>
-              </a:rPr>
-              <a:t>kx</a:t>
-            </a:r>
-            <a:r>
-              <a:rPr lang="en-US" sz="1200" dirty="0">
-                <a:solidFill>
-                  <a:schemeClr val="tx1"/>
-                </a:solidFill>
-              </a:rPr>
-              <a:t>, that </a:t>
-            </a:r>
-            <a:r>
-              <a:rPr lang="en-US" sz="1200" i="1" dirty="0">
-                <a:solidFill>
-                  <a:schemeClr val="tx1"/>
-                </a:solidFill>
-              </a:rPr>
-              <a:t>x</a:t>
-            </a:r>
-            <a:r>
-              <a:rPr lang="en-US" sz="1200" dirty="0">
-                <a:solidFill>
-                  <a:schemeClr val="tx1"/>
-                </a:solidFill>
-              </a:rPr>
-              <a:t> and </a:t>
-            </a:r>
-            <a:r>
-              <a:rPr lang="en-US" sz="1200" i="1" dirty="0">
-                <a:solidFill>
-                  <a:schemeClr val="tx1"/>
-                </a:solidFill>
-              </a:rPr>
-              <a:t>y</a:t>
-            </a:r>
-            <a:r>
-              <a:rPr lang="en-US" sz="1200" dirty="0">
-                <a:solidFill>
-                  <a:schemeClr val="tx1"/>
-                </a:solidFill>
-              </a:rPr>
-              <a:t> increase or decrease at the same time. In inverse variation </a:t>
-            </a:r>
-            <a:r>
-              <a:rPr lang="en-US" sz="1200" i="1" dirty="0" err="1">
-                <a:solidFill>
-                  <a:schemeClr val="tx1"/>
-                </a:solidFill>
-              </a:rPr>
-              <a:t>xy</a:t>
-            </a:r>
-            <a:r>
-              <a:rPr lang="en-US" sz="1200" dirty="0">
-                <a:solidFill>
-                  <a:schemeClr val="tx1"/>
-                </a:solidFill>
-              </a:rPr>
-              <a:t> = </a:t>
-            </a:r>
-            <a:r>
-              <a:rPr lang="en-US" sz="1200" i="1" dirty="0">
-                <a:solidFill>
-                  <a:schemeClr val="tx1"/>
-                </a:solidFill>
-              </a:rPr>
-              <a:t>k</a:t>
-            </a:r>
-            <a:r>
-              <a:rPr lang="en-US" sz="1200" dirty="0">
-                <a:solidFill>
-                  <a:schemeClr val="tx1"/>
-                </a:solidFill>
-              </a:rPr>
-              <a:t>, as one variable increases the other decreases.</a:t>
-            </a:r>
-            <a:endParaRPr lang="en-IN" sz="1200" dirty="0">
-              <a:solidFill>
-                <a:schemeClr val="tx1"/>
-              </a:solidFill>
-              <a:latin typeface="Arial" panose="020B0604020202020204" pitchFamily="34" charset="0"/>
-              <a:cs typeface="Arial" panose="020B0604020202020204" pitchFamily="34" charset="0"/>
-            </a:endParaRPr>
+            <a:endParaRPr lang="en-US" sz="1800" cap="all" noProof="0" dirty="0"/>
           </a:p>
         </p:txBody>
       </p:sp>
@@ -12553,14 +12620,13 @@
         </p:nvPicPr>
         <p:blipFill>
           <a:blip r:embed="rId3"/>
-          <a:stretch>
-            <a:fillRect/>
-          </a:stretch>
+          <a:srcRect r="69351"/>
+          <a:stretch/>
         </p:blipFill>
         <p:spPr>
           <a:xfrm>
             <a:off x="991846" y="1733714"/>
-            <a:ext cx="3071785" cy="1126800"/>
+            <a:ext cx="941457" cy="1126800"/>
           </a:xfrm>
           <a:prstGeom prst="rect">
             <a:avLst/>
@@ -12583,14 +12649,13 @@
         </p:nvPicPr>
         <p:blipFill>
           <a:blip r:embed="rId4"/>
-          <a:stretch>
-            <a:fillRect/>
-          </a:stretch>
+          <a:srcRect r="73301"/>
+          <a:stretch/>
         </p:blipFill>
         <p:spPr>
           <a:xfrm>
-            <a:off x="1142821" y="3402251"/>
-            <a:ext cx="2960724" cy="1147015"/>
+            <a:off x="2184484" y="3435871"/>
+            <a:ext cx="790482" cy="1147015"/>
           </a:xfrm>
           <a:prstGeom prst="rect">
             <a:avLst/>
@@ -12619,8 +12684,8 @@
         </p:blipFill>
         <p:spPr>
           <a:xfrm>
-            <a:off x="4472944" y="4563373"/>
-            <a:ext cx="664745" cy="377992"/>
+            <a:off x="5539744" y="4581924"/>
+            <a:ext cx="997172" cy="567019"/>
           </a:xfrm>
           <a:prstGeom prst="rect">
             <a:avLst/>
@@ -12694,7 +12759,7 @@
               </a:tabLst>
             </a:pPr>
             <a:r>
-              <a:rPr lang="en-IN" sz="1800" b="1" dirty="0">
+              <a:rPr lang="en-US" sz="1800" b="1" noProof="0" dirty="0">
                 <a:solidFill>
                   <a:srgbClr val="0078AE"/>
                 </a:solidFill>
@@ -12702,26 +12767,13 @@
               <a:t>	</a:t>
             </a:r>
             <a:r>
-              <a:rPr lang="de-DE" sz="1800" b="1" dirty="0" err="1">
+              <a:rPr lang="en-US" sz="1800" b="1" noProof="0" dirty="0">
                 <a:solidFill>
                   <a:srgbClr val="58585A"/>
                 </a:solidFill>
               </a:rPr>
-              <a:t>Use</a:t>
-            </a:r>
-            <a:r>
-              <a:rPr lang="de-DE" sz="1800" b="1" dirty="0">
-                <a:solidFill>
-                  <a:srgbClr val="58585A"/>
-                </a:solidFill>
-              </a:rPr>
-              <a:t> Inverse Variation</a:t>
-            </a:r>
-            <a:endParaRPr lang="en-IN" sz="1800" b="1" dirty="0">
-              <a:solidFill>
-                <a:srgbClr val="58585A"/>
-              </a:solidFill>
-            </a:endParaRPr>
+              <a:t>Use Inverse Variation</a:t>
+            </a:r>
           </a:p>
           <a:p>
             <a:pPr marL="1476375" indent="-1466850">
@@ -12734,14 +12786,14 @@
               </a:tabLst>
             </a:pPr>
             <a:r>
-              <a:rPr lang="en-IN" sz="1800" b="1" dirty="0">
+              <a:rPr lang="en-US" sz="1800" b="1" noProof="0" dirty="0">
                 <a:solidFill>
                   <a:srgbClr val="D92B31"/>
                 </a:solidFill>
               </a:rPr>
               <a:t>Try It!</a:t>
             </a:r>
-            <a:endParaRPr lang="en-IN" sz="1800" b="1" dirty="0">
+            <a:endParaRPr lang="en-US" sz="1800" b="1" noProof="0" dirty="0">
               <a:solidFill>
                 <a:schemeClr val="tx1"/>
               </a:solidFill>
@@ -12756,22 +12808,22 @@
               <a:buAutoNum type="arabicPeriod" startAt="2"/>
             </a:pPr>
             <a:r>
-              <a:rPr lang="en-IN" sz="1600" b="1" dirty="0"/>
+              <a:rPr lang="en-US" sz="1600" b="1" noProof="0" dirty="0"/>
               <a:t>​</a:t>
             </a:r>
             <a:r>
-              <a:rPr lang="en-US" sz="1600" dirty="0"/>
+              <a:rPr lang="en-US" sz="1600" noProof="0" dirty="0"/>
               <a:t>In an inverse variation, </a:t>
             </a:r>
             <a:r>
-              <a:rPr lang="en-US" sz="1600" i="1" dirty="0"/>
+              <a:rPr lang="en-US" sz="1600" i="1" noProof="0" dirty="0"/>
               <a:t>x</a:t>
             </a:r>
             <a:r>
-              <a:rPr lang="en-US" sz="1600" dirty="0"/>
+              <a:rPr lang="en-US" sz="1600" noProof="0" dirty="0"/>
               <a:t> = 6 and            </a:t>
             </a:r>
-            <a:endParaRPr lang="en-US" sz="1600" b="1" dirty="0"/>
+            <a:endParaRPr lang="en-US" sz="1600" b="1" noProof="0" dirty="0"/>
           </a:p>
           <a:p>
             <a:pPr marL="720000" indent="-360363">
@@ -12784,17 +12836,16 @@
               </a:tabLst>
             </a:pPr>
             <a:r>
-              <a:rPr lang="en-IN" sz="1600" b="1" dirty="0"/>
+              <a:rPr lang="en-US" sz="1600" b="1" noProof="0" dirty="0"/>
               <a:t>​</a:t>
             </a:r>
             <a:r>
-              <a:rPr lang="en-US" sz="1600" dirty="0"/>
+              <a:rPr lang="en-US" sz="1600" noProof="0" dirty="0"/>
               <a:t>What is the equation that represents the inverse variation?</a:t>
             </a:r>
-            <a:endParaRPr lang="en-IN" sz="1600" dirty="0"/>
-          </a:p>
-          <a:p>
-            <a:endParaRPr lang="en-IN" sz="1600" dirty="0">
+          </a:p>
+          <a:p>
+            <a:endParaRPr lang="en-US" sz="1600" noProof="0" dirty="0">
               <a:solidFill>
                 <a:schemeClr val="tx1"/>
               </a:solidFill>
@@ -12852,14 +12903,14 @@
           <a:lstStyle/>
           <a:p>
             <a:r>
-              <a:rPr lang="en-IN" sz="1800" b="1" cap="all" dirty="0">
+              <a:rPr lang="en-US" sz="1800" b="1" cap="all" noProof="0" dirty="0">
                 <a:solidFill>
                   <a:schemeClr val="bg1"/>
                 </a:solidFill>
               </a:rPr>
               <a:t>Example 2</a:t>
             </a:r>
-            <a:endParaRPr lang="en-US" sz="1800" cap="all" dirty="0"/>
+            <a:endParaRPr lang="en-US" sz="1800" cap="all" noProof="0" dirty="0"/>
           </a:p>
         </p:txBody>
       </p:sp>
@@ -13008,7 +13059,7 @@
               </a:tabLst>
             </a:pPr>
             <a:r>
-              <a:rPr lang="en-IN" sz="1800" b="1" dirty="0">
+              <a:rPr lang="en-US" sz="1800" b="1" noProof="0" dirty="0">
                 <a:solidFill>
                   <a:srgbClr val="0078AE"/>
                 </a:solidFill>
@@ -13016,26 +13067,13 @@
               <a:t>	</a:t>
             </a:r>
             <a:r>
-              <a:rPr lang="de-DE" sz="1800" b="1" dirty="0" err="1">
+              <a:rPr lang="en-US" sz="1800" b="1" noProof="0" dirty="0">
                 <a:solidFill>
                   <a:srgbClr val="58585A"/>
                 </a:solidFill>
               </a:rPr>
-              <a:t>Use</a:t>
-            </a:r>
-            <a:r>
-              <a:rPr lang="de-DE" sz="1800" b="1" dirty="0">
-                <a:solidFill>
-                  <a:srgbClr val="58585A"/>
-                </a:solidFill>
-              </a:rPr>
-              <a:t> Inverse Variation</a:t>
-            </a:r>
-            <a:endParaRPr lang="en-IN" sz="1800" b="1" dirty="0">
-              <a:solidFill>
-                <a:srgbClr val="58585A"/>
-              </a:solidFill>
-            </a:endParaRPr>
+              <a:t>Use Inverse Variation</a:t>
+            </a:r>
           </a:p>
           <a:p>
             <a:pPr marL="1476375" indent="-1466850">
@@ -13048,14 +13086,14 @@
               </a:tabLst>
             </a:pPr>
             <a:r>
-              <a:rPr lang="en-IN" sz="1800" b="1" dirty="0">
+              <a:rPr lang="en-US" sz="1800" b="1" noProof="0" dirty="0">
                 <a:solidFill>
                   <a:srgbClr val="D92B31"/>
                 </a:solidFill>
               </a:rPr>
               <a:t>Try It!</a:t>
             </a:r>
-            <a:endParaRPr lang="en-IN" sz="1800" b="1" dirty="0">
+            <a:endParaRPr lang="en-US" sz="1800" b="1" noProof="0" dirty="0">
               <a:solidFill>
                 <a:schemeClr val="tx1"/>
               </a:solidFill>
@@ -13070,22 +13108,22 @@
               <a:buAutoNum type="arabicPeriod" startAt="2"/>
             </a:pPr>
             <a:r>
-              <a:rPr lang="en-IN" sz="1600" b="1" dirty="0"/>
+              <a:rPr lang="en-US" sz="1600" b="1" noProof="0" dirty="0"/>
               <a:t>​</a:t>
             </a:r>
             <a:r>
-              <a:rPr lang="en-US" sz="1600" dirty="0"/>
+              <a:rPr lang="en-US" sz="1600" noProof="0" dirty="0"/>
               <a:t>In an inverse variation, </a:t>
             </a:r>
             <a:r>
-              <a:rPr lang="en-US" sz="1600" i="1" dirty="0"/>
+              <a:rPr lang="en-US" sz="1600" i="1" noProof="0" dirty="0"/>
               <a:t>x</a:t>
             </a:r>
             <a:r>
-              <a:rPr lang="en-US" sz="1600" dirty="0"/>
+              <a:rPr lang="en-US" sz="1600" noProof="0" dirty="0"/>
               <a:t> = 6 and            </a:t>
             </a:r>
-            <a:endParaRPr lang="en-US" sz="1600" b="1" dirty="0"/>
+            <a:endParaRPr lang="en-US" sz="1600" b="1" noProof="0" dirty="0"/>
           </a:p>
           <a:p>
             <a:pPr marL="720000" indent="-360363">
@@ -13097,7 +13135,7 @@
                 <a:tab pos="1103313" algn="l"/>
               </a:tabLst>
             </a:pPr>
-            <a:endParaRPr lang="en-IN" sz="1600" dirty="0"/>
+            <a:endParaRPr lang="en-US" sz="1600" noProof="0" dirty="0"/>
           </a:p>
           <a:p>
             <a:pPr marL="359637">
@@ -13109,30 +13147,30 @@
               </a:tabLst>
             </a:pPr>
             <a:r>
-              <a:rPr lang="en-IN" sz="1600" b="1" dirty="0"/>
+              <a:rPr lang="en-US" sz="1600" b="1" noProof="0" dirty="0"/>
               <a:t>b. ​</a:t>
             </a:r>
             <a:r>
-              <a:rPr lang="en-US" sz="1600" dirty="0"/>
+              <a:rPr lang="en-US" sz="1600" noProof="0" dirty="0"/>
               <a:t>What is the value of </a:t>
             </a:r>
             <a:r>
-              <a:rPr lang="en-US" sz="1600" i="1" dirty="0"/>
+              <a:rPr lang="en-US" sz="1600" i="1" noProof="0" dirty="0"/>
               <a:t>y</a:t>
             </a:r>
             <a:r>
-              <a:rPr lang="en-US" sz="1600" dirty="0"/>
+              <a:rPr lang="en-US" sz="1600" noProof="0" dirty="0"/>
               <a:t> when </a:t>
             </a:r>
             <a:r>
-              <a:rPr lang="en-US" sz="1600" i="1" dirty="0"/>
+              <a:rPr lang="en-US" sz="1600" i="1" noProof="0" dirty="0"/>
               <a:t>x</a:t>
             </a:r>
             <a:r>
-              <a:rPr lang="en-US" sz="1600" dirty="0"/>
+              <a:rPr lang="en-US" sz="1600" noProof="0" dirty="0"/>
               <a:t> = 15?</a:t>
             </a:r>
-            <a:endParaRPr lang="en-IN" sz="1600" b="1" dirty="0">
+            <a:endParaRPr lang="en-US" sz="1600" b="1" noProof="0" dirty="0">
               <a:solidFill>
                 <a:schemeClr val="tx1"/>
               </a:solidFill>
@@ -13143,7 +13181,7 @@
               <a:buFont typeface="+mj-lt"/>
               <a:buAutoNum type="arabicPeriod" startAt="2"/>
             </a:pPr>
-            <a:endParaRPr lang="en-IN" sz="1600" dirty="0">
+            <a:endParaRPr lang="en-US" sz="1600" noProof="0" dirty="0">
               <a:solidFill>
                 <a:schemeClr val="tx1"/>
               </a:solidFill>
@@ -13201,14 +13239,14 @@
           <a:lstStyle/>
           <a:p>
             <a:r>
-              <a:rPr lang="en-IN" sz="1800" b="1" cap="all" dirty="0">
+              <a:rPr lang="en-US" sz="1800" b="1" cap="all" noProof="0" dirty="0">
                 <a:solidFill>
                   <a:schemeClr val="bg1"/>
                 </a:solidFill>
               </a:rPr>
               <a:t>Example 2</a:t>
             </a:r>
-            <a:endParaRPr lang="en-US" sz="1800" cap="all" dirty="0"/>
+            <a:endParaRPr lang="en-US" sz="1800" cap="all" noProof="0" dirty="0"/>
           </a:p>
         </p:txBody>
       </p:sp>

</xml_diff>